<commit_message>
Add infrastructure cost management system to solution templates
- Add cost-breakdown.csv with 3-tier cloud architecture costs (Small/Medium/Large sizing)
- Add cost-breakdown.xlsx with 4 tabs (Cover, Cost Breakdown, Sizing Guidance, 3-Year TCO)
- Update solution-briefing.md and statement-of-work.md with cost summary tables
- Fix Word document generator to handle HTML comment markers in markdown
- Default pricing to Small implementation sizing (13K 3-year TCO)
- Cost tables now appear in all document formats (Word, PowerPoint, Excel)
</commit_message>
<xml_diff>
--- a/solution-template/sample-provider/sample-category/sample-solution/delivery/closeout-presentation.pptx
+++ b/solution-template/sample-provider/sample-category/sample-solution/delivery/closeout-presentation.pptx
@@ -5,16 +5,16 @@
     <p:sldMasterId id="2147483648" r:id="rId1"/>
   </p:sldMasterIdLst>
   <p:notesMasterIdLst>
-    <p:notesMasterId r:id="rId7"/>
+    <p:notesMasterId r:id="rId9"/>
   </p:notesMasterIdLst>
   <p:sldIdLst>
-    <p:sldId id="256" r:id="rId6"/>
-    <p:sldId id="257" r:id="rId5"/>
-    <p:sldId id="258" r:id="rId4"/>
-    <p:sldId id="259" r:id="rId3"/>
-    <p:sldId id="260" r:id="rId2"/>
-    <p:sldId id="261" r:id="rId12"/>
-    <p:sldId id="262" r:id="rId13"/>
+    <p:sldId id="256" r:id="rId7"/>
+    <p:sldId id="257" r:id="rId8"/>
+    <p:sldId id="258" r:id="rId6"/>
+    <p:sldId id="259" r:id="rId5"/>
+    <p:sldId id="260" r:id="rId4"/>
+    <p:sldId id="261" r:id="rId3"/>
+    <p:sldId id="262" r:id="rId2"/>
     <p:sldId id="263" r:id="rId14"/>
     <p:sldId id="264" r:id="rId15"/>
     <p:sldId id="265" r:id="rId16"/>
@@ -911,6 +911,258 @@
 
 <file path=ppt/slideLayouts/slideLayout3.xml><?xml version="1.0" encoding="utf-8"?>
 <p:sldLayout xmlns:a="http://schemas.openxmlformats.org/drawingml/2006/main" xmlns:r="http://schemas.openxmlformats.org/officeDocument/2006/relationships" xmlns:p="http://schemas.openxmlformats.org/presentationml/2006/main" preserve="1" userDrawn="1">
+  <p:cSld name="EO Bullet Points">
+    <p:spTree>
+      <p:nvGrpSpPr>
+        <p:cNvPr id="1" name=""/>
+        <p:cNvGrpSpPr/>
+        <p:nvPr/>
+      </p:nvGrpSpPr>
+      <p:grpSpPr>
+        <a:xfrm>
+          <a:off x="0" y="0"/>
+          <a:ext cx="0" cy="0"/>
+          <a:chOff x="0" y="0"/>
+          <a:chExt cx="0" cy="0"/>
+        </a:xfrm>
+      </p:grpSpPr>
+      <p:sp>
+        <p:nvSpPr>
+          <p:cNvPr id="3" name="Shape 1">
+            <a:extLst>
+              <a:ext uri="{FF2B5EF4-FFF2-40B4-BE49-F238E27FC236}">
+                <a16:creationId xmlns:a16="http://schemas.microsoft.com/office/drawing/2014/main" id="{4EA828A1-D5D6-9ADA-1918-E5FE226673A0}"/>
+              </a:ext>
+            </a:extLst>
+          </p:cNvPr>
+          <p:cNvSpPr/>
+          <p:nvPr userDrawn="1"/>
+        </p:nvSpPr>
+        <p:spPr>
+          <a:xfrm>
+            <a:off x="0" y="606304"/>
+            <a:ext cx="9144000" cy="0"/>
+          </a:xfrm>
+          <a:prstGeom prst="line">
+            <a:avLst/>
+          </a:prstGeom>
+          <a:noFill/>
+          <a:ln w="28575">
+            <a:solidFill>
+              <a:srgbClr val="CC0000"/>
+            </a:solidFill>
+            <a:prstDash val="solid"/>
+          </a:ln>
+        </p:spPr>
+        <p:txBody>
+          <a:bodyPr/>
+          <a:lstStyle/>
+          <a:p>
+            <a:endParaRPr lang="en-US"/>
+          </a:p>
+        </p:txBody>
+      </p:sp>
+      <p:sp>
+        <p:nvSpPr>
+          <p:cNvPr id="9" name="Text Placeholder 8">
+            <a:extLst>
+              <a:ext uri="{FF2B5EF4-FFF2-40B4-BE49-F238E27FC236}">
+                <a16:creationId xmlns:a16="http://schemas.microsoft.com/office/drawing/2014/main" id="{980A86D4-478F-6846-9F0A-B815F2A3AB2D}"/>
+              </a:ext>
+            </a:extLst>
+          </p:cNvPr>
+          <p:cNvSpPr>
+            <a:spLocks noGrp="1"/>
+          </p:cNvSpPr>
+          <p:nvPr>
+            <p:ph type="body" sz="quarter" idx="10" hasCustomPrompt="1"/>
+          </p:nvPr>
+        </p:nvSpPr>
+        <p:spPr>
+          <a:xfrm>
+            <a:off x="296863" y="0"/>
+            <a:ext cx="8509304" cy="527008"/>
+          </a:xfrm>
+          <a:prstGeom prst="rect">
+            <a:avLst/>
+          </a:prstGeom>
+        </p:spPr>
+        <p:txBody>
+          <a:bodyPr/>
+          <a:lstStyle>
+            <a:lvl1pPr marL="0" marR="0" indent="0" algn="l" defTabSz="914400" rtl="0" eaLnBrk="1" fontAlgn="auto" latinLnBrk="0" hangingPunct="1">
+              <a:lnSpc>
+                <a:spcPct val="100000"/>
+              </a:lnSpc>
+              <a:spcBef>
+                <a:spcPct val="20000"/>
+              </a:spcBef>
+              <a:spcAft>
+                <a:spcPts val="0"/>
+              </a:spcAft>
+              <a:buClrTx/>
+              <a:buSzTx/>
+              <a:buFont typeface="Arial" pitchFamily="34" charset="0"/>
+              <a:buNone/>
+              <a:tabLst/>
+              <a:defRPr sz="2700" b="1">
+                <a:latin typeface="Arial" panose="020B0604020202020204" pitchFamily="34" charset="0"/>
+                <a:cs typeface="Arial" panose="020B0604020202020204" pitchFamily="34" charset="0"/>
+              </a:defRPr>
+            </a:lvl1pPr>
+          </a:lstStyle>
+          <a:p>
+            <a:pPr lvl="0"/>
+            <a:r>
+              <a:rPr lang="en-US" dirty="0"/>
+              <a:t>Bullet Points</a:t>
+            </a:r>
+          </a:p>
+        </p:txBody>
+      </p:sp>
+      <p:sp>
+        <p:nvSpPr>
+          <p:cNvPr id="12" name="Picture Placeholder 13">
+            <a:extLst>
+              <a:ext uri="{FF2B5EF4-FFF2-40B4-BE49-F238E27FC236}">
+                <a16:creationId xmlns:a16="http://schemas.microsoft.com/office/drawing/2014/main" id="{2DB97592-C4D5-B315-7F11-AA14F6EE8A62}"/>
+              </a:ext>
+            </a:extLst>
+          </p:cNvPr>
+          <p:cNvSpPr>
+            <a:spLocks noGrp="1"/>
+          </p:cNvSpPr>
+          <p:nvPr>
+            <p:ph type="pic" sz="quarter" idx="13"/>
+          </p:nvPr>
+        </p:nvSpPr>
+        <p:spPr>
+          <a:xfrm>
+            <a:off x="313593" y="4536078"/>
+            <a:ext cx="2143858" cy="529698"/>
+          </a:xfrm>
+          <a:prstGeom prst="rect">
+            <a:avLst/>
+          </a:prstGeom>
+        </p:spPr>
+        <p:txBody>
+          <a:bodyPr/>
+          <a:lstStyle/>
+          <a:p>
+            <a:endParaRPr lang="en-US" dirty="0"/>
+          </a:p>
+        </p:txBody>
+      </p:sp>
+      <p:pic>
+        <p:nvPicPr>
+          <p:cNvPr id="13" name="Image 0" descr="/home/claude/eo-framework-logo.png">
+            <a:extLst>
+              <a:ext uri="{FF2B5EF4-FFF2-40B4-BE49-F238E27FC236}">
+                <a16:creationId xmlns:a16="http://schemas.microsoft.com/office/drawing/2014/main" id="{25116040-BB88-891D-9118-628A78E99872}"/>
+              </a:ext>
+            </a:extLst>
+          </p:cNvPr>
+          <p:cNvPicPr>
+            <a:picLocks noChangeAspect="1"/>
+          </p:cNvPicPr>
+          <p:nvPr userDrawn="1"/>
+        </p:nvPicPr>
+        <p:blipFill>
+          <a:blip r:embed="rId2"/>
+          <a:stretch>
+            <a:fillRect/>
+          </a:stretch>
+        </p:blipFill>
+        <p:spPr>
+          <a:xfrm>
+            <a:off x="6945879" y="4648200"/>
+            <a:ext cx="1952244" cy="417576"/>
+          </a:xfrm>
+          <a:prstGeom prst="rect">
+            <a:avLst/>
+          </a:prstGeom>
+        </p:spPr>
+      </p:pic>
+      <p:sp>
+        <p:nvSpPr>
+          <p:cNvPr id="4" name="Text Placeholder 3">
+            <a:extLst>
+              <a:ext uri="{FF2B5EF4-FFF2-40B4-BE49-F238E27FC236}">
+                <a16:creationId xmlns:a16="http://schemas.microsoft.com/office/drawing/2014/main" id="{54BEE1A0-720D-187D-95F8-429F3DF3D64E}"/>
+              </a:ext>
+            </a:extLst>
+          </p:cNvPr>
+          <p:cNvSpPr>
+            <a:spLocks noGrp="1"/>
+          </p:cNvSpPr>
+          <p:nvPr>
+            <p:ph type="body" sz="quarter" idx="14" hasCustomPrompt="1"/>
+          </p:nvPr>
+        </p:nvSpPr>
+        <p:spPr>
+          <a:xfrm>
+            <a:off x="296863" y="685601"/>
+            <a:ext cx="8548687" cy="3811657"/>
+          </a:xfrm>
+          <a:prstGeom prst="rect">
+            <a:avLst/>
+          </a:prstGeom>
+        </p:spPr>
+        <p:txBody>
+          <a:bodyPr/>
+          <a:lstStyle>
+            <a:lvl1pPr>
+              <a:defRPr sz="2000" baseline="0">
+                <a:solidFill>
+                  <a:schemeClr val="tx1"/>
+                </a:solidFill>
+              </a:defRPr>
+            </a:lvl1pPr>
+            <a:lvl2pPr>
+              <a:buFont typeface="Arial" panose="020B0604020202020204" pitchFamily="34" charset="0"/>
+              <a:buChar char="•"/>
+              <a:defRPr sz="1600"/>
+            </a:lvl2pPr>
+            <a:lvl3pPr>
+              <a:defRPr sz="1400"/>
+            </a:lvl3pPr>
+            <a:lvl4pPr>
+              <a:buFont typeface="Arial" panose="020B0604020202020204" pitchFamily="34" charset="0"/>
+              <a:buChar char="•"/>
+              <a:defRPr sz="1200"/>
+            </a:lvl4pPr>
+          </a:lstStyle>
+          <a:p>
+            <a:pPr lvl="0"/>
+            <a:r>
+              <a:rPr lang="en-US" dirty="0"/>
+              <a:t>Bullet Point 1</a:t>
+            </a:r>
+          </a:p>
+          <a:p>
+            <a:pPr lvl="0"/>
+            <a:r>
+              <a:rPr lang="en-US" dirty="0"/>
+              <a:t>Bullet Point 2</a:t>
+            </a:r>
+          </a:p>
+        </p:txBody>
+      </p:sp>
+    </p:spTree>
+    <p:extLst>
+      <p:ext uri="{BB962C8B-B14F-4D97-AF65-F5344CB8AC3E}">
+        <p14:creationId xmlns:p14="http://schemas.microsoft.com/office/powerpoint/2010/main" val="1090737763"/>
+      </p:ext>
+    </p:extLst>
+  </p:cSld>
+  <p:clrMapOvr>
+    <a:masterClrMapping/>
+  </p:clrMapOvr>
+</p:sldLayout>
+</file>
+
+<file path=ppt/slideLayouts/slideLayout4.xml><?xml version="1.0" encoding="utf-8"?>
+<p:sldLayout xmlns:a="http://schemas.openxmlformats.org/drawingml/2006/main" xmlns:r="http://schemas.openxmlformats.org/officeDocument/2006/relationships" xmlns:p="http://schemas.openxmlformats.org/presentationml/2006/main" preserve="1" userDrawn="1">
   <p:cSld name="EO Two Column">
     <p:spTree>
       <p:nvGrpSpPr>
@@ -1266,7 +1518,7 @@
 </p:sldLayout>
 </file>
 
-<file path=ppt/slideLayouts/slideLayout4.xml><?xml version="1.0" encoding="utf-8"?>
+<file path=ppt/slideLayouts/slideLayout5.xml><?xml version="1.0" encoding="utf-8"?>
 <p:sldLayout xmlns:a="http://schemas.openxmlformats.org/drawingml/2006/main" xmlns:r="http://schemas.openxmlformats.org/officeDocument/2006/relationships" xmlns:p="http://schemas.openxmlformats.org/presentationml/2006/main" preserve="1" userDrawn="1">
   <p:cSld name="EO Table">
     <p:spTree>
@@ -1513,7 +1765,7 @@
 </p:sldLayout>
 </file>
 
-<file path=ppt/slideLayouts/slideLayout5.xml><?xml version="1.0" encoding="utf-8"?>
+<file path=ppt/slideLayouts/slideLayout6.xml><?xml version="1.0" encoding="utf-8"?>
 <p:sldLayout xmlns:a="http://schemas.openxmlformats.org/drawingml/2006/main" xmlns:r="http://schemas.openxmlformats.org/officeDocument/2006/relationships" xmlns:p="http://schemas.openxmlformats.org/presentationml/2006/main" preserve="1" userDrawn="1">
   <p:cSld name="EO Visual Content">
     <p:spTree>
@@ -1818,7 +2070,7 @@
 </p:sldLayout>
 </file>
 
-<file path=ppt/slideLayouts/slideLayout6.xml><?xml version="1.0" encoding="utf-8"?>
+<file path=ppt/slideLayouts/slideLayout7.xml><?xml version="1.0" encoding="utf-8"?>
 <p:sldLayout xmlns:a="http://schemas.openxmlformats.org/drawingml/2006/main" xmlns:r="http://schemas.openxmlformats.org/officeDocument/2006/relationships" xmlns:p="http://schemas.openxmlformats.org/presentationml/2006/main" preserve="1" userDrawn="1">
   <p:cSld name="EO Data Visualization">
     <p:spTree>
@@ -2123,7 +2375,7 @@
 </p:sldLayout>
 </file>
 
-<file path=ppt/slideLayouts/slideLayout7.xml><?xml version="1.0" encoding="utf-8"?>
+<file path=ppt/slideLayouts/slideLayout8.xml><?xml version="1.0" encoding="utf-8"?>
 <p:sldLayout xmlns:a="http://schemas.openxmlformats.org/drawingml/2006/main" xmlns:r="http://schemas.openxmlformats.org/officeDocument/2006/relationships" xmlns:p="http://schemas.openxmlformats.org/presentationml/2006/main" preserve="1" userDrawn="1">
   <p:cSld name="EO Thank You">
     <p:spTree>
@@ -2221,7 +2473,7 @@
         </p:nvSpPr>
         <p:spPr>
           <a:xfrm>
-            <a:off x="538528" y="1886679"/>
+            <a:off x="736356" y="2247927"/>
             <a:ext cx="7671288" cy="527050"/>
           </a:xfrm>
           <a:prstGeom prst="rect">
@@ -2259,6 +2511,14 @@
               </a:rPr>
               <a:t>Thank You</a:t>
             </a:r>
+          </a:p>
+          <a:p>
+            <a:pPr marL="0" indent="0" algn="ctr">
+              <a:lnSpc>
+                <a:spcPts val="3600"/>
+              </a:lnSpc>
+              <a:buNone/>
+            </a:pPr>
             <a:endParaRPr lang="en-US" sz="3600" dirty="0"/>
           </a:p>
         </p:txBody>
@@ -2352,7 +2612,7 @@
         </p:nvSpPr>
         <p:spPr>
           <a:xfrm>
-            <a:off x="1059473" y="2437679"/>
+            <a:off x="1024304" y="1874962"/>
             <a:ext cx="6629399" cy="334598"/>
           </a:xfrm>
           <a:prstGeom prst="rect">
@@ -2513,6 +2773,83 @@
                 </a:schemeClr>
               </a:solidFill>
             </a:endParaRPr>
+          </a:p>
+        </p:txBody>
+      </p:sp>
+      <p:sp>
+        <p:nvSpPr>
+          <p:cNvPr id="16" name="Text Placeholder 9">
+            <a:extLst>
+              <a:ext uri="{FF2B5EF4-FFF2-40B4-BE49-F238E27FC236}">
+                <a16:creationId xmlns:a16="http://schemas.microsoft.com/office/drawing/2014/main" id="{2DED039B-C555-DCF4-1CA7-CA1E44823784}"/>
+              </a:ext>
+            </a:extLst>
+          </p:cNvPr>
+          <p:cNvSpPr>
+            <a:spLocks noGrp="1"/>
+          </p:cNvSpPr>
+          <p:nvPr>
+            <p:ph type="body" sz="quarter" idx="15" hasCustomPrompt="1"/>
+          </p:nvPr>
+        </p:nvSpPr>
+        <p:spPr>
+          <a:xfrm>
+            <a:off x="268165" y="3131272"/>
+            <a:ext cx="8480181" cy="334598"/>
+          </a:xfrm>
+          <a:prstGeom prst="rect">
+            <a:avLst/>
+          </a:prstGeom>
+        </p:spPr>
+        <p:txBody>
+          <a:bodyPr/>
+          <a:lstStyle>
+            <a:lvl1pPr marL="0" marR="0" indent="0" algn="ctr" defTabSz="914400" rtl="0" eaLnBrk="1" fontAlgn="auto" latinLnBrk="0" hangingPunct="1">
+              <a:lnSpc>
+                <a:spcPct val="100000"/>
+              </a:lnSpc>
+              <a:spcBef>
+                <a:spcPct val="20000"/>
+              </a:spcBef>
+              <a:spcAft>
+                <a:spcPts val="0"/>
+              </a:spcAft>
+              <a:buClrTx/>
+              <a:buSzTx/>
+              <a:buFont typeface="Arial" pitchFamily="34" charset="0"/>
+              <a:buNone/>
+              <a:tabLst/>
+              <a:defRPr sz="1800" b="0">
+                <a:solidFill>
+                  <a:schemeClr val="tx1"/>
+                </a:solidFill>
+                <a:latin typeface="Arial" panose="020B0604020202020204" pitchFamily="34" charset="0"/>
+                <a:cs typeface="Arial" panose="020B0604020202020204" pitchFamily="34" charset="0"/>
+              </a:defRPr>
+            </a:lvl1pPr>
+          </a:lstStyle>
+          <a:p>
+            <a:pPr>
+              <a:spcAft>
+                <a:spcPts val="1200"/>
+              </a:spcAft>
+            </a:pPr>
+            <a:r>
+              <a:rPr lang="en-US" sz="1800" b="1" dirty="0">
+                <a:solidFill>
+                  <a:srgbClr val="000000"/>
+                </a:solidFill>
+              </a:rPr>
+              <a:t>Account Manager:</a:t>
+            </a:r>
+            <a:r>
+              <a:rPr lang="en-US" sz="1800" dirty="0">
+                <a:solidFill>
+                  <a:srgbClr val="000000"/>
+                </a:solidFill>
+              </a:rPr>
+              <a:t> [Name, Title] | [Email] | [Phone]</a:t>
+            </a:r>
           </a:p>
         </p:txBody>
       </p:sp>
@@ -2557,11 +2894,12 @@
   <p:sldLayoutIdLst>
     <p:sldLayoutId id="2147483651" r:id="rId1"/>
     <p:sldLayoutId id="2147483653" r:id="rId2"/>
-    <p:sldLayoutId id="2147483654" r:id="rId3"/>
-    <p:sldLayoutId id="2147483655" r:id="rId4"/>
-    <p:sldLayoutId id="2147483656" r:id="rId5"/>
-    <p:sldLayoutId id="2147483657" r:id="rId6"/>
-    <p:sldLayoutId id="2147483658" r:id="rId7"/>
+    <p:sldLayoutId id="2147483659" r:id="rId3"/>
+    <p:sldLayoutId id="2147483654" r:id="rId4"/>
+    <p:sldLayoutId id="2147483655" r:id="rId5"/>
+    <p:sldLayoutId id="2147483656" r:id="rId6"/>
+    <p:sldLayoutId id="2147483657" r:id="rId7"/>
+    <p:sldLayoutId id="2147483658" r:id="rId8"/>
   </p:sldLayoutIdLst>
   <p:hf sldNum="0" hdr="0" ftr="0" dt="0"/>
   <p:txStyles>
@@ -2909,7 +3247,7 @@
           <a:lstStyle/>
           <a:p>
             <a:r>
-              <a:t>Presenter Name | November 10, 2025</a:t>
+              <a:t>Presenter Name | November 11, 2025</a:t>
             </a:r>
           </a:p>
         </p:txBody>
@@ -3181,7 +3519,9 @@
           <a:bodyPr/>
           <a:lstStyle/>
           <a:p>
-            <a:r>
+            <a:pPr algn="l"/>
+            <a:r>
+              <a:rPr b="1"/>
               <a:t>**Slide 12: Business Value Delivered**</a:t>
             </a:r>
           </a:p>
@@ -3199,142 +3539,492 @@
         </p:nvSpPr>
         <p:spPr/>
       </p:sp>
-      <p:sp>
-        <p:nvSpPr>
-          <p:cNvPr id="4" name="Text Placeholder 3"/>
-          <p:cNvSpPr>
-            <a:spLocks noGrp="1"/>
-          </p:cNvSpPr>
-          <p:nvPr>
-            <p:ph type="body" idx="14" sz="quarter"/>
-          </p:nvPr>
-        </p:nvSpPr>
-        <p:spPr/>
-        <p:txBody>
-          <a:bodyPr/>
-          <a:lstStyle/>
-          <a:p>
-            <a:pPr/>
-            <a:r>
-              <a:t>Benefit Category: Cost Savings</a:t>
-            </a:r>
-          </a:p>
-          <a:p>
-            <a:pPr lvl="1"/>
-            <a:r>
-              <a:t>Target: [Target amount]</a:t>
-            </a:r>
-          </a:p>
-          <a:p>
-            <a:pPr lvl="1"/>
-            <a:r>
-              <a:t>Achieved: [Actual/Projected]</a:t>
-            </a:r>
-          </a:p>
-          <a:p>
-            <a:pPr lvl="1"/>
-            <a:r>
-              <a:t>Measurement Method: [How measured]</a:t>
-            </a:r>
-          </a:p>
-          <a:p>
-            <a:pPr lvl="1"/>
-            <a:r>
-              <a:t>Timeline to Full Benefit: [Timeline]</a:t>
-            </a:r>
-          </a:p>
-          <a:p>
-            <a:pPr/>
-            <a:r>
-              <a:t>Benefit Category: Revenue Enhancement</a:t>
-            </a:r>
-          </a:p>
-          <a:p>
-            <a:pPr lvl="1"/>
-            <a:r>
-              <a:t>Target: [Target amount]</a:t>
-            </a:r>
-          </a:p>
-          <a:p>
-            <a:pPr lvl="1"/>
-            <a:r>
-              <a:t>Achieved: [Actual/Projected]</a:t>
-            </a:r>
-          </a:p>
-          <a:p>
-            <a:pPr lvl="1"/>
-            <a:r>
-              <a:t>Measurement Method: [How measured]</a:t>
-            </a:r>
-          </a:p>
-          <a:p>
-            <a:pPr lvl="1"/>
-            <a:r>
-              <a:t>Timeline to Full Benefit: [Timeline]</a:t>
-            </a:r>
-          </a:p>
-          <a:p>
-            <a:pPr/>
-            <a:r>
-              <a:t>Benefit Category: Efficiency Gains</a:t>
-            </a:r>
-          </a:p>
-          <a:p>
-            <a:pPr lvl="1"/>
-            <a:r>
-              <a:t>Target: [Target %]</a:t>
-            </a:r>
-          </a:p>
-          <a:p>
-            <a:pPr lvl="1"/>
-            <a:r>
-              <a:t>Achieved: [Actual %]</a:t>
-            </a:r>
-          </a:p>
-          <a:p>
-            <a:pPr lvl="1"/>
-            <a:r>
-              <a:t>Measurement Method: [How measured]</a:t>
-            </a:r>
-          </a:p>
-          <a:p>
-            <a:pPr lvl="1"/>
-            <a:r>
-              <a:t>Timeline to Full Benefit: [Timeline]</a:t>
-            </a:r>
-          </a:p>
-          <a:p>
-            <a:pPr/>
-            <a:r>
-              <a:t>Benefit Category: Risk Reduction</a:t>
-            </a:r>
-          </a:p>
-          <a:p>
-            <a:pPr lvl="1"/>
-            <a:r>
-              <a:t>Target: [Risk level]</a:t>
-            </a:r>
-          </a:p>
-          <a:p>
-            <a:pPr lvl="1"/>
-            <a:r>
-              <a:t>Achieved: [Achieved level]</a:t>
-            </a:r>
-          </a:p>
-          <a:p>
-            <a:pPr lvl="1"/>
-            <a:r>
-              <a:t>Measurement Method: [How measured]</a:t>
-            </a:r>
-          </a:p>
-          <a:p>
-            <a:pPr lvl="1"/>
-            <a:r>
-              <a:t>Timeline to Full Benefit: [Timeline]</a:t>
-            </a:r>
-          </a:p>
-        </p:txBody>
-      </p:sp>
+      <p:graphicFrame>
+        <p:nvGraphicFramePr>
+          <p:cNvPr id="4" name="Table Placeholder 3"/>
+          <p:cNvGraphicFramePr>
+            <a:graphicFrameLocks noGrp="1"/>
+          </p:cNvGraphicFramePr>
+          <p:nvPr>
+            <p:ph type="tbl" idx="14" sz="quarter"/>
+          </p:nvPr>
+        </p:nvGraphicFramePr>
+        <p:xfrm>
+          <a:off x="256855" y="677011"/>
+          <a:ext cx="8710929" cy="1854200"/>
+        </p:xfrm>
+        <a:graphic>
+          <a:graphicData uri="http://schemas.openxmlformats.org/drawingml/2006/table">
+            <a:tbl>
+              <a:tblPr firstRow="1" bandRow="1">
+                <a:tableStyleId>{5C22544A-7EE6-4342-B048-85BDC9FD1C3A}</a:tableStyleId>
+              </a:tblPr>
+              <a:tblGrid>
+                <a:gridCol w="2177733"/>
+                <a:gridCol w="1306639"/>
+                <a:gridCol w="1045311"/>
+                <a:gridCol w="1567967"/>
+                <a:gridCol w="2613279"/>
+              </a:tblGrid>
+              <a:tr h="370840">
+                <a:tc>
+                  <a:txBody>
+                    <a:bodyPr/>
+                    <a:lstStyle/>
+                    <a:p>
+                      <a:r>
+                        <a:rPr b="1" sz="1400">
+                          <a:solidFill>
+                            <a:srgbClr val="FFFFFF"/>
+                          </a:solidFill>
+                        </a:rPr>
+                        <a:t>Benefit Category</a:t>
+                      </a:r>
+                    </a:p>
+                  </a:txBody>
+                  <a:tcPr>
+                    <a:solidFill>
+                      <a:srgbClr val="A01C02"/>
+                    </a:solidFill>
+                  </a:tcPr>
+                </a:tc>
+                <a:tc>
+                  <a:txBody>
+                    <a:bodyPr/>
+                    <a:lstStyle/>
+                    <a:p>
+                      <a:r>
+                        <a:rPr b="1" sz="1400">
+                          <a:solidFill>
+                            <a:srgbClr val="FFFFFF"/>
+                          </a:solidFill>
+                        </a:rPr>
+                        <a:t>Target</a:t>
+                      </a:r>
+                    </a:p>
+                  </a:txBody>
+                  <a:tcPr>
+                    <a:solidFill>
+                      <a:srgbClr val="A01C02"/>
+                    </a:solidFill>
+                  </a:tcPr>
+                </a:tc>
+                <a:tc>
+                  <a:txBody>
+                    <a:bodyPr/>
+                    <a:lstStyle/>
+                    <a:p>
+                      <a:r>
+                        <a:rPr b="1" sz="1400">
+                          <a:solidFill>
+                            <a:srgbClr val="FFFFFF"/>
+                          </a:solidFill>
+                        </a:rPr>
+                        <a:t>Achieved</a:t>
+                      </a:r>
+                    </a:p>
+                  </a:txBody>
+                  <a:tcPr>
+                    <a:solidFill>
+                      <a:srgbClr val="A01C02"/>
+                    </a:solidFill>
+                  </a:tcPr>
+                </a:tc>
+                <a:tc>
+                  <a:txBody>
+                    <a:bodyPr/>
+                    <a:lstStyle/>
+                    <a:p>
+                      <a:r>
+                        <a:rPr b="1" sz="1400">
+                          <a:solidFill>
+                            <a:srgbClr val="FFFFFF"/>
+                          </a:solidFill>
+                        </a:rPr>
+                        <a:t>Measurement Method</a:t>
+                      </a:r>
+                    </a:p>
+                  </a:txBody>
+                  <a:tcPr>
+                    <a:solidFill>
+                      <a:srgbClr val="A01C02"/>
+                    </a:solidFill>
+                  </a:tcPr>
+                </a:tc>
+                <a:tc>
+                  <a:txBody>
+                    <a:bodyPr/>
+                    <a:lstStyle/>
+                    <a:p>
+                      <a:r>
+                        <a:rPr b="1" sz="1400">
+                          <a:solidFill>
+                            <a:srgbClr val="FFFFFF"/>
+                          </a:solidFill>
+                        </a:rPr>
+                        <a:t>Timeline to Full Benefit</a:t>
+                      </a:r>
+                    </a:p>
+                  </a:txBody>
+                  <a:tcPr>
+                    <a:solidFill>
+                      <a:srgbClr val="A01C02"/>
+                    </a:solidFill>
+                  </a:tcPr>
+                </a:tc>
+              </a:tr>
+              <a:tr h="370840">
+                <a:tc>
+                  <a:txBody>
+                    <a:bodyPr/>
+                    <a:lstStyle/>
+                    <a:p>
+                      <a:r>
+                        <a:rPr sz="1100"/>
+                        <a:t>Cost Savings</a:t>
+                      </a:r>
+                    </a:p>
+                  </a:txBody>
+                  <a:tcPr>
+                    <a:solidFill>
+                      <a:srgbClr val="E7E6E6"/>
+                    </a:solidFill>
+                  </a:tcPr>
+                </a:tc>
+                <a:tc>
+                  <a:txBody>
+                    <a:bodyPr/>
+                    <a:lstStyle/>
+                    <a:p>
+                      <a:r>
+                        <a:rPr sz="1100"/>
+                        <a:t>[Target amount]</a:t>
+                      </a:r>
+                    </a:p>
+                  </a:txBody>
+                  <a:tcPr>
+                    <a:solidFill>
+                      <a:srgbClr val="E7E6E6"/>
+                    </a:solidFill>
+                  </a:tcPr>
+                </a:tc>
+                <a:tc>
+                  <a:txBody>
+                    <a:bodyPr/>
+                    <a:lstStyle/>
+                    <a:p>
+                      <a:r>
+                        <a:rPr sz="1100"/>
+                        <a:t>[Actual/Projected]</a:t>
+                      </a:r>
+                    </a:p>
+                  </a:txBody>
+                  <a:tcPr>
+                    <a:solidFill>
+                      <a:srgbClr val="E7E6E6"/>
+                    </a:solidFill>
+                  </a:tcPr>
+                </a:tc>
+                <a:tc>
+                  <a:txBody>
+                    <a:bodyPr/>
+                    <a:lstStyle/>
+                    <a:p>
+                      <a:r>
+                        <a:rPr sz="1100"/>
+                        <a:t>[How measured]</a:t>
+                      </a:r>
+                    </a:p>
+                  </a:txBody>
+                  <a:tcPr>
+                    <a:solidFill>
+                      <a:srgbClr val="E7E6E6"/>
+                    </a:solidFill>
+                  </a:tcPr>
+                </a:tc>
+                <a:tc>
+                  <a:txBody>
+                    <a:bodyPr/>
+                    <a:lstStyle/>
+                    <a:p>
+                      <a:r>
+                        <a:rPr sz="1100"/>
+                        <a:t>[Timeline]</a:t>
+                      </a:r>
+                    </a:p>
+                  </a:txBody>
+                  <a:tcPr>
+                    <a:solidFill>
+                      <a:srgbClr val="E7E6E6"/>
+                    </a:solidFill>
+                  </a:tcPr>
+                </a:tc>
+              </a:tr>
+              <a:tr h="370840">
+                <a:tc>
+                  <a:txBody>
+                    <a:bodyPr/>
+                    <a:lstStyle/>
+                    <a:p>
+                      <a:r>
+                        <a:rPr sz="1100"/>
+                        <a:t>Revenue Enhancement</a:t>
+                      </a:r>
+                    </a:p>
+                  </a:txBody>
+                  <a:tcPr>
+                    <a:solidFill>
+                      <a:srgbClr val="E7E6E6"/>
+                    </a:solidFill>
+                  </a:tcPr>
+                </a:tc>
+                <a:tc>
+                  <a:txBody>
+                    <a:bodyPr/>
+                    <a:lstStyle/>
+                    <a:p>
+                      <a:r>
+                        <a:rPr sz="1100"/>
+                        <a:t>[Target amount]</a:t>
+                      </a:r>
+                    </a:p>
+                  </a:txBody>
+                  <a:tcPr>
+                    <a:solidFill>
+                      <a:srgbClr val="E7E6E6"/>
+                    </a:solidFill>
+                  </a:tcPr>
+                </a:tc>
+                <a:tc>
+                  <a:txBody>
+                    <a:bodyPr/>
+                    <a:lstStyle/>
+                    <a:p>
+                      <a:r>
+                        <a:rPr sz="1100"/>
+                        <a:t>[Actual/Projected]</a:t>
+                      </a:r>
+                    </a:p>
+                  </a:txBody>
+                  <a:tcPr>
+                    <a:solidFill>
+                      <a:srgbClr val="E7E6E6"/>
+                    </a:solidFill>
+                  </a:tcPr>
+                </a:tc>
+                <a:tc>
+                  <a:txBody>
+                    <a:bodyPr/>
+                    <a:lstStyle/>
+                    <a:p>
+                      <a:r>
+                        <a:rPr sz="1100"/>
+                        <a:t>[How measured]</a:t>
+                      </a:r>
+                    </a:p>
+                  </a:txBody>
+                  <a:tcPr>
+                    <a:solidFill>
+                      <a:srgbClr val="E7E6E6"/>
+                    </a:solidFill>
+                  </a:tcPr>
+                </a:tc>
+                <a:tc>
+                  <a:txBody>
+                    <a:bodyPr/>
+                    <a:lstStyle/>
+                    <a:p>
+                      <a:r>
+                        <a:rPr sz="1100"/>
+                        <a:t>[Timeline]</a:t>
+                      </a:r>
+                    </a:p>
+                  </a:txBody>
+                  <a:tcPr>
+                    <a:solidFill>
+                      <a:srgbClr val="E7E6E6"/>
+                    </a:solidFill>
+                  </a:tcPr>
+                </a:tc>
+              </a:tr>
+              <a:tr h="370840">
+                <a:tc>
+                  <a:txBody>
+                    <a:bodyPr/>
+                    <a:lstStyle/>
+                    <a:p>
+                      <a:r>
+                        <a:rPr sz="1100"/>
+                        <a:t>Efficiency Gains</a:t>
+                      </a:r>
+                    </a:p>
+                  </a:txBody>
+                  <a:tcPr>
+                    <a:solidFill>
+                      <a:srgbClr val="E7E6E6"/>
+                    </a:solidFill>
+                  </a:tcPr>
+                </a:tc>
+                <a:tc>
+                  <a:txBody>
+                    <a:bodyPr/>
+                    <a:lstStyle/>
+                    <a:p>
+                      <a:r>
+                        <a:rPr sz="1100"/>
+                        <a:t>[Target %]</a:t>
+                      </a:r>
+                    </a:p>
+                  </a:txBody>
+                  <a:tcPr>
+                    <a:solidFill>
+                      <a:srgbClr val="E7E6E6"/>
+                    </a:solidFill>
+                  </a:tcPr>
+                </a:tc>
+                <a:tc>
+                  <a:txBody>
+                    <a:bodyPr/>
+                    <a:lstStyle/>
+                    <a:p>
+                      <a:r>
+                        <a:rPr sz="1100"/>
+                        <a:t>[Actual %]</a:t>
+                      </a:r>
+                    </a:p>
+                  </a:txBody>
+                  <a:tcPr>
+                    <a:solidFill>
+                      <a:srgbClr val="E7E6E6"/>
+                    </a:solidFill>
+                  </a:tcPr>
+                </a:tc>
+                <a:tc>
+                  <a:txBody>
+                    <a:bodyPr/>
+                    <a:lstStyle/>
+                    <a:p>
+                      <a:r>
+                        <a:rPr sz="1100"/>
+                        <a:t>[How measured]</a:t>
+                      </a:r>
+                    </a:p>
+                  </a:txBody>
+                  <a:tcPr>
+                    <a:solidFill>
+                      <a:srgbClr val="E7E6E6"/>
+                    </a:solidFill>
+                  </a:tcPr>
+                </a:tc>
+                <a:tc>
+                  <a:txBody>
+                    <a:bodyPr/>
+                    <a:lstStyle/>
+                    <a:p>
+                      <a:r>
+                        <a:rPr sz="1100"/>
+                        <a:t>[Timeline]</a:t>
+                      </a:r>
+                    </a:p>
+                  </a:txBody>
+                  <a:tcPr>
+                    <a:solidFill>
+                      <a:srgbClr val="E7E6E6"/>
+                    </a:solidFill>
+                  </a:tcPr>
+                </a:tc>
+              </a:tr>
+              <a:tr h="370840">
+                <a:tc>
+                  <a:txBody>
+                    <a:bodyPr/>
+                    <a:lstStyle/>
+                    <a:p>
+                      <a:r>
+                        <a:rPr sz="1100"/>
+                        <a:t>Risk Reduction</a:t>
+                      </a:r>
+                    </a:p>
+                  </a:txBody>
+                  <a:tcPr>
+                    <a:solidFill>
+                      <a:srgbClr val="E7E6E6"/>
+                    </a:solidFill>
+                  </a:tcPr>
+                </a:tc>
+                <a:tc>
+                  <a:txBody>
+                    <a:bodyPr/>
+                    <a:lstStyle/>
+                    <a:p>
+                      <a:r>
+                        <a:rPr sz="1100"/>
+                        <a:t>[Risk level]</a:t>
+                      </a:r>
+                    </a:p>
+                  </a:txBody>
+                  <a:tcPr>
+                    <a:solidFill>
+                      <a:srgbClr val="E7E6E6"/>
+                    </a:solidFill>
+                  </a:tcPr>
+                </a:tc>
+                <a:tc>
+                  <a:txBody>
+                    <a:bodyPr/>
+                    <a:lstStyle/>
+                    <a:p>
+                      <a:r>
+                        <a:rPr sz="1100"/>
+                        <a:t>[Achieved level]</a:t>
+                      </a:r>
+                    </a:p>
+                  </a:txBody>
+                  <a:tcPr>
+                    <a:solidFill>
+                      <a:srgbClr val="E7E6E6"/>
+                    </a:solidFill>
+                  </a:tcPr>
+                </a:tc>
+                <a:tc>
+                  <a:txBody>
+                    <a:bodyPr/>
+                    <a:lstStyle/>
+                    <a:p>
+                      <a:r>
+                        <a:rPr sz="1100"/>
+                        <a:t>[How measured]</a:t>
+                      </a:r>
+                    </a:p>
+                  </a:txBody>
+                  <a:tcPr>
+                    <a:solidFill>
+                      <a:srgbClr val="E7E6E6"/>
+                    </a:solidFill>
+                  </a:tcPr>
+                </a:tc>
+                <a:tc>
+                  <a:txBody>
+                    <a:bodyPr/>
+                    <a:lstStyle/>
+                    <a:p>
+                      <a:r>
+                        <a:rPr sz="1100"/>
+                        <a:t>[Timeline]</a:t>
+                      </a:r>
+                    </a:p>
+                  </a:txBody>
+                  <a:tcPr>
+                    <a:solidFill>
+                      <a:srgbClr val="E7E6E6"/>
+                    </a:solidFill>
+                  </a:tcPr>
+                </a:tc>
+              </a:tr>
+            </a:tbl>
+          </a:graphicData>
+        </a:graphic>
+      </p:graphicFrame>
     </p:spTree>
   </p:cSld>
   <p:clrMapOvr>
@@ -3799,7 +4489,9 @@
           <a:bodyPr/>
           <a:lstStyle/>
           <a:p>
-            <a:r>
+            <a:pPr algn="l"/>
+            <a:r>
+              <a:rPr b="1"/>
               <a:t>**Slide 17: Challenges Overcome**</a:t>
             </a:r>
           </a:p>
@@ -3817,94 +4509,332 @@
         </p:nvSpPr>
         <p:spPr/>
       </p:sp>
-      <p:sp>
-        <p:nvSpPr>
-          <p:cNvPr id="4" name="Text Placeholder 3"/>
-          <p:cNvSpPr>
-            <a:spLocks noGrp="1"/>
-          </p:cNvSpPr>
-          <p:nvPr>
-            <p:ph type="body" idx="14" sz="quarter"/>
-          </p:nvPr>
-        </p:nvSpPr>
-        <p:spPr/>
-        <p:txBody>
-          <a:bodyPr/>
-          <a:lstStyle/>
-          <a:p>
-            <a:pPr/>
-            <a:r>
-              <a:t>Challenge: [Challenge 1]</a:t>
-            </a:r>
-          </a:p>
-          <a:p>
-            <a:pPr lvl="1"/>
-            <a:r>
-              <a:t>Impact: [Business/technical impact]</a:t>
-            </a:r>
-          </a:p>
-          <a:p>
-            <a:pPr lvl="1"/>
-            <a:r>
-              <a:t>Resolution: [How resolved]</a:t>
-            </a:r>
-          </a:p>
-          <a:p>
-            <a:pPr lvl="1"/>
-            <a:r>
-              <a:t>Prevention for Future: [Future prevention]</a:t>
-            </a:r>
-          </a:p>
-          <a:p>
-            <a:pPr/>
-            <a:r>
-              <a:t>Challenge: [Challenge 2]</a:t>
-            </a:r>
-          </a:p>
-          <a:p>
-            <a:pPr lvl="1"/>
-            <a:r>
-              <a:t>Impact: [Business/technical impact]</a:t>
-            </a:r>
-          </a:p>
-          <a:p>
-            <a:pPr lvl="1"/>
-            <a:r>
-              <a:t>Resolution: [How resolved]</a:t>
-            </a:r>
-          </a:p>
-          <a:p>
-            <a:pPr lvl="1"/>
-            <a:r>
-              <a:t>Prevention for Future: [Future prevention]</a:t>
-            </a:r>
-          </a:p>
-          <a:p>
-            <a:pPr/>
-            <a:r>
-              <a:t>Challenge: [Challenge 3]</a:t>
-            </a:r>
-          </a:p>
-          <a:p>
-            <a:pPr lvl="1"/>
-            <a:r>
-              <a:t>Impact: [Business/technical impact]</a:t>
-            </a:r>
-          </a:p>
-          <a:p>
-            <a:pPr lvl="1"/>
-            <a:r>
-              <a:t>Resolution: [How resolved]</a:t>
-            </a:r>
-          </a:p>
-          <a:p>
-            <a:pPr lvl="1"/>
-            <a:r>
-              <a:t>Prevention for Future: [Future prevention]</a:t>
-            </a:r>
-          </a:p>
-        </p:txBody>
-      </p:sp>
+      <p:graphicFrame>
+        <p:nvGraphicFramePr>
+          <p:cNvPr id="4" name="Table Placeholder 3"/>
+          <p:cNvGraphicFramePr>
+            <a:graphicFrameLocks noGrp="1"/>
+          </p:cNvGraphicFramePr>
+          <p:nvPr>
+            <p:ph type="tbl" idx="14" sz="quarter"/>
+          </p:nvPr>
+        </p:nvGraphicFramePr>
+        <p:xfrm>
+          <a:off x="256855" y="677011"/>
+          <a:ext cx="8710930" cy="1483360"/>
+        </p:xfrm>
+        <a:graphic>
+          <a:graphicData uri="http://schemas.openxmlformats.org/drawingml/2006/table">
+            <a:tbl>
+              <a:tblPr firstRow="1" bandRow="1">
+                <a:tableStyleId>{5C22544A-7EE6-4342-B048-85BDC9FD1C3A}</a:tableStyleId>
+              </a:tblPr>
+              <a:tblGrid>
+                <a:gridCol w="1045311"/>
+                <a:gridCol w="2177733"/>
+                <a:gridCol w="1045311"/>
+                <a:gridCol w="4442575"/>
+              </a:tblGrid>
+              <a:tr h="370840">
+                <a:tc>
+                  <a:txBody>
+                    <a:bodyPr/>
+                    <a:lstStyle/>
+                    <a:p>
+                      <a:r>
+                        <a:rPr b="1" sz="1400">
+                          <a:solidFill>
+                            <a:srgbClr val="FFFFFF"/>
+                          </a:solidFill>
+                        </a:rPr>
+                        <a:t>Challenge</a:t>
+                      </a:r>
+                    </a:p>
+                  </a:txBody>
+                  <a:tcPr>
+                    <a:solidFill>
+                      <a:srgbClr val="A01C02"/>
+                    </a:solidFill>
+                  </a:tcPr>
+                </a:tc>
+                <a:tc>
+                  <a:txBody>
+                    <a:bodyPr/>
+                    <a:lstStyle/>
+                    <a:p>
+                      <a:r>
+                        <a:rPr b="1" sz="1400">
+                          <a:solidFill>
+                            <a:srgbClr val="FFFFFF"/>
+                          </a:solidFill>
+                        </a:rPr>
+                        <a:t>Impact</a:t>
+                      </a:r>
+                    </a:p>
+                  </a:txBody>
+                  <a:tcPr>
+                    <a:solidFill>
+                      <a:srgbClr val="A01C02"/>
+                    </a:solidFill>
+                  </a:tcPr>
+                </a:tc>
+                <a:tc>
+                  <a:txBody>
+                    <a:bodyPr/>
+                    <a:lstStyle/>
+                    <a:p>
+                      <a:r>
+                        <a:rPr b="1" sz="1400">
+                          <a:solidFill>
+                            <a:srgbClr val="FFFFFF"/>
+                          </a:solidFill>
+                        </a:rPr>
+                        <a:t>Resolution</a:t>
+                      </a:r>
+                    </a:p>
+                  </a:txBody>
+                  <a:tcPr>
+                    <a:solidFill>
+                      <a:srgbClr val="A01C02"/>
+                    </a:solidFill>
+                  </a:tcPr>
+                </a:tc>
+                <a:tc>
+                  <a:txBody>
+                    <a:bodyPr/>
+                    <a:lstStyle/>
+                    <a:p>
+                      <a:r>
+                        <a:rPr b="1" sz="1400">
+                          <a:solidFill>
+                            <a:srgbClr val="FFFFFF"/>
+                          </a:solidFill>
+                        </a:rPr>
+                        <a:t>Prevention for Future</a:t>
+                      </a:r>
+                    </a:p>
+                  </a:txBody>
+                  <a:tcPr>
+                    <a:solidFill>
+                      <a:srgbClr val="A01C02"/>
+                    </a:solidFill>
+                  </a:tcPr>
+                </a:tc>
+              </a:tr>
+              <a:tr h="370840">
+                <a:tc>
+                  <a:txBody>
+                    <a:bodyPr/>
+                    <a:lstStyle/>
+                    <a:p>
+                      <a:r>
+                        <a:rPr sz="1100"/>
+                        <a:t>[Challenge 1]</a:t>
+                      </a:r>
+                    </a:p>
+                  </a:txBody>
+                  <a:tcPr>
+                    <a:solidFill>
+                      <a:srgbClr val="E7E6E6"/>
+                    </a:solidFill>
+                  </a:tcPr>
+                </a:tc>
+                <a:tc>
+                  <a:txBody>
+                    <a:bodyPr/>
+                    <a:lstStyle/>
+                    <a:p>
+                      <a:r>
+                        <a:rPr sz="1100"/>
+                        <a:t>[Business/technical impact]</a:t>
+                      </a:r>
+                    </a:p>
+                  </a:txBody>
+                  <a:tcPr>
+                    <a:solidFill>
+                      <a:srgbClr val="E7E6E6"/>
+                    </a:solidFill>
+                  </a:tcPr>
+                </a:tc>
+                <a:tc>
+                  <a:txBody>
+                    <a:bodyPr/>
+                    <a:lstStyle/>
+                    <a:p>
+                      <a:r>
+                        <a:rPr sz="1100"/>
+                        <a:t>[How resolved]</a:t>
+                      </a:r>
+                    </a:p>
+                  </a:txBody>
+                  <a:tcPr>
+                    <a:solidFill>
+                      <a:srgbClr val="E7E6E6"/>
+                    </a:solidFill>
+                  </a:tcPr>
+                </a:tc>
+                <a:tc>
+                  <a:txBody>
+                    <a:bodyPr/>
+                    <a:lstStyle/>
+                    <a:p>
+                      <a:r>
+                        <a:rPr sz="1100"/>
+                        <a:t>[Future prevention]</a:t>
+                      </a:r>
+                    </a:p>
+                  </a:txBody>
+                  <a:tcPr>
+                    <a:solidFill>
+                      <a:srgbClr val="E7E6E6"/>
+                    </a:solidFill>
+                  </a:tcPr>
+                </a:tc>
+              </a:tr>
+              <a:tr h="370840">
+                <a:tc>
+                  <a:txBody>
+                    <a:bodyPr/>
+                    <a:lstStyle/>
+                    <a:p>
+                      <a:r>
+                        <a:rPr sz="1100"/>
+                        <a:t>[Challenge 2]</a:t>
+                      </a:r>
+                    </a:p>
+                  </a:txBody>
+                  <a:tcPr>
+                    <a:solidFill>
+                      <a:srgbClr val="E7E6E6"/>
+                    </a:solidFill>
+                  </a:tcPr>
+                </a:tc>
+                <a:tc>
+                  <a:txBody>
+                    <a:bodyPr/>
+                    <a:lstStyle/>
+                    <a:p>
+                      <a:r>
+                        <a:rPr sz="1100"/>
+                        <a:t>[Business/technical impact]</a:t>
+                      </a:r>
+                    </a:p>
+                  </a:txBody>
+                  <a:tcPr>
+                    <a:solidFill>
+                      <a:srgbClr val="E7E6E6"/>
+                    </a:solidFill>
+                  </a:tcPr>
+                </a:tc>
+                <a:tc>
+                  <a:txBody>
+                    <a:bodyPr/>
+                    <a:lstStyle/>
+                    <a:p>
+                      <a:r>
+                        <a:rPr sz="1100"/>
+                        <a:t>[How resolved]</a:t>
+                      </a:r>
+                    </a:p>
+                  </a:txBody>
+                  <a:tcPr>
+                    <a:solidFill>
+                      <a:srgbClr val="E7E6E6"/>
+                    </a:solidFill>
+                  </a:tcPr>
+                </a:tc>
+                <a:tc>
+                  <a:txBody>
+                    <a:bodyPr/>
+                    <a:lstStyle/>
+                    <a:p>
+                      <a:r>
+                        <a:rPr sz="1100"/>
+                        <a:t>[Future prevention]</a:t>
+                      </a:r>
+                    </a:p>
+                  </a:txBody>
+                  <a:tcPr>
+                    <a:solidFill>
+                      <a:srgbClr val="E7E6E6"/>
+                    </a:solidFill>
+                  </a:tcPr>
+                </a:tc>
+              </a:tr>
+              <a:tr h="370840">
+                <a:tc>
+                  <a:txBody>
+                    <a:bodyPr/>
+                    <a:lstStyle/>
+                    <a:p>
+                      <a:r>
+                        <a:rPr sz="1100"/>
+                        <a:t>[Challenge 3]</a:t>
+                      </a:r>
+                    </a:p>
+                  </a:txBody>
+                  <a:tcPr>
+                    <a:solidFill>
+                      <a:srgbClr val="E7E6E6"/>
+                    </a:solidFill>
+                  </a:tcPr>
+                </a:tc>
+                <a:tc>
+                  <a:txBody>
+                    <a:bodyPr/>
+                    <a:lstStyle/>
+                    <a:p>
+                      <a:r>
+                        <a:rPr sz="1100"/>
+                        <a:t>[Business/technical impact]</a:t>
+                      </a:r>
+                    </a:p>
+                  </a:txBody>
+                  <a:tcPr>
+                    <a:solidFill>
+                      <a:srgbClr val="E7E6E6"/>
+                    </a:solidFill>
+                  </a:tcPr>
+                </a:tc>
+                <a:tc>
+                  <a:txBody>
+                    <a:bodyPr/>
+                    <a:lstStyle/>
+                    <a:p>
+                      <a:r>
+                        <a:rPr sz="1100"/>
+                        <a:t>[How resolved]</a:t>
+                      </a:r>
+                    </a:p>
+                  </a:txBody>
+                  <a:tcPr>
+                    <a:solidFill>
+                      <a:srgbClr val="E7E6E6"/>
+                    </a:solidFill>
+                  </a:tcPr>
+                </a:tc>
+                <a:tc>
+                  <a:txBody>
+                    <a:bodyPr/>
+                    <a:lstStyle/>
+                    <a:p>
+                      <a:r>
+                        <a:rPr sz="1100"/>
+                        <a:t>[Future prevention]</a:t>
+                      </a:r>
+                    </a:p>
+                  </a:txBody>
+                  <a:tcPr>
+                    <a:solidFill>
+                      <a:srgbClr val="E7E6E6"/>
+                    </a:solidFill>
+                  </a:tcPr>
+                </a:tc>
+              </a:tr>
+            </a:tbl>
+          </a:graphicData>
+        </a:graphic>
+      </p:graphicFrame>
     </p:spTree>
   </p:cSld>
   <p:clrMapOvr>
@@ -4423,7 +5353,9 @@
           <a:bodyPr/>
           <a:lstStyle/>
           <a:p>
-            <a:r>
+            <a:pPr algn="l"/>
+            <a:r>
+              <a:rPr b="1"/>
               <a:t>**Slide 21: Future Enhancement Opportunities**</a:t>
             </a:r>
           </a:p>
@@ -4441,112 +5373,405 @@
         </p:nvSpPr>
         <p:spPr/>
       </p:sp>
-      <p:sp>
-        <p:nvSpPr>
-          <p:cNvPr id="4" name="Text Placeholder 3"/>
-          <p:cNvSpPr>
-            <a:spLocks noGrp="1"/>
-          </p:cNvSpPr>
-          <p:nvPr>
-            <p:ph type="body" idx="14" sz="quarter"/>
-          </p:nvPr>
-        </p:nvSpPr>
-        <p:spPr/>
-        <p:txBody>
-          <a:bodyPr/>
-          <a:lstStyle/>
-          <a:p>
-            <a:pPr/>
-            <a:r>
-              <a:t>Enhancement: [Enhancement 1]</a:t>
-            </a:r>
-          </a:p>
-          <a:p>
-            <a:pPr lvl="1"/>
-            <a:r>
-              <a:t>Business Value: [Value proposition]</a:t>
-            </a:r>
-          </a:p>
-          <a:p>
-            <a:pPr lvl="1"/>
-            <a:r>
-              <a:t>Complexity: [Low/Med/High]</a:t>
-            </a:r>
-          </a:p>
-          <a:p>
-            <a:pPr lvl="1"/>
-            <a:r>
-              <a:t>Timeline: [Timeline]</a:t>
-            </a:r>
-          </a:p>
-          <a:p>
-            <a:pPr lvl="1"/>
-            <a:r>
-              <a:t>Priority: [High/Med/Low]</a:t>
-            </a:r>
-          </a:p>
-          <a:p>
-            <a:pPr/>
-            <a:r>
-              <a:t>Enhancement: [Enhancement 2]</a:t>
-            </a:r>
-          </a:p>
-          <a:p>
-            <a:pPr lvl="1"/>
-            <a:r>
-              <a:t>Business Value: [Value proposition]</a:t>
-            </a:r>
-          </a:p>
-          <a:p>
-            <a:pPr lvl="1"/>
-            <a:r>
-              <a:t>Complexity: [Low/Med/High]</a:t>
-            </a:r>
-          </a:p>
-          <a:p>
-            <a:pPr lvl="1"/>
-            <a:r>
-              <a:t>Timeline: [Timeline]</a:t>
-            </a:r>
-          </a:p>
-          <a:p>
-            <a:pPr lvl="1"/>
-            <a:r>
-              <a:t>Priority: [High/Med/Low]</a:t>
-            </a:r>
-          </a:p>
-          <a:p>
-            <a:pPr/>
-            <a:r>
-              <a:t>Enhancement: [Enhancement 3]</a:t>
-            </a:r>
-          </a:p>
-          <a:p>
-            <a:pPr lvl="1"/>
-            <a:r>
-              <a:t>Business Value: [Value proposition]</a:t>
-            </a:r>
-          </a:p>
-          <a:p>
-            <a:pPr lvl="1"/>
-            <a:r>
-              <a:t>Complexity: [Low/Med/High]</a:t>
-            </a:r>
-          </a:p>
-          <a:p>
-            <a:pPr lvl="1"/>
-            <a:r>
-              <a:t>Timeline: [Timeline]</a:t>
-            </a:r>
-          </a:p>
-          <a:p>
-            <a:pPr lvl="1"/>
-            <a:r>
-              <a:t>Priority: [High/Med/Low]</a:t>
-            </a:r>
-          </a:p>
-        </p:txBody>
-      </p:sp>
+      <p:graphicFrame>
+        <p:nvGraphicFramePr>
+          <p:cNvPr id="4" name="Table Placeholder 3"/>
+          <p:cNvGraphicFramePr>
+            <a:graphicFrameLocks noGrp="1"/>
+          </p:cNvGraphicFramePr>
+          <p:nvPr>
+            <p:ph type="tbl" idx="14" sz="quarter"/>
+          </p:nvPr>
+        </p:nvGraphicFramePr>
+        <p:xfrm>
+          <a:off x="256855" y="677011"/>
+          <a:ext cx="8710929" cy="1483360"/>
+        </p:xfrm>
+        <a:graphic>
+          <a:graphicData uri="http://schemas.openxmlformats.org/drawingml/2006/table">
+            <a:tbl>
+              <a:tblPr firstRow="1" bandRow="1">
+                <a:tableStyleId>{5C22544A-7EE6-4342-B048-85BDC9FD1C3A}</a:tableStyleId>
+              </a:tblPr>
+              <a:tblGrid>
+                <a:gridCol w="2177733"/>
+                <a:gridCol w="1306639"/>
+                <a:gridCol w="1045311"/>
+                <a:gridCol w="1567967"/>
+                <a:gridCol w="2613279"/>
+              </a:tblGrid>
+              <a:tr h="370840">
+                <a:tc>
+                  <a:txBody>
+                    <a:bodyPr/>
+                    <a:lstStyle/>
+                    <a:p>
+                      <a:r>
+                        <a:rPr b="1" sz="1400">
+                          <a:solidFill>
+                            <a:srgbClr val="FFFFFF"/>
+                          </a:solidFill>
+                        </a:rPr>
+                        <a:t>Enhancement</a:t>
+                      </a:r>
+                    </a:p>
+                  </a:txBody>
+                  <a:tcPr>
+                    <a:solidFill>
+                      <a:srgbClr val="A01C02"/>
+                    </a:solidFill>
+                  </a:tcPr>
+                </a:tc>
+                <a:tc>
+                  <a:txBody>
+                    <a:bodyPr/>
+                    <a:lstStyle/>
+                    <a:p>
+                      <a:r>
+                        <a:rPr b="1" sz="1400">
+                          <a:solidFill>
+                            <a:srgbClr val="FFFFFF"/>
+                          </a:solidFill>
+                        </a:rPr>
+                        <a:t>Business Value</a:t>
+                      </a:r>
+                    </a:p>
+                  </a:txBody>
+                  <a:tcPr>
+                    <a:solidFill>
+                      <a:srgbClr val="A01C02"/>
+                    </a:solidFill>
+                  </a:tcPr>
+                </a:tc>
+                <a:tc>
+                  <a:txBody>
+                    <a:bodyPr/>
+                    <a:lstStyle/>
+                    <a:p>
+                      <a:r>
+                        <a:rPr b="1" sz="1400">
+                          <a:solidFill>
+                            <a:srgbClr val="FFFFFF"/>
+                          </a:solidFill>
+                        </a:rPr>
+                        <a:t>Complexity</a:t>
+                      </a:r>
+                    </a:p>
+                  </a:txBody>
+                  <a:tcPr>
+                    <a:solidFill>
+                      <a:srgbClr val="A01C02"/>
+                    </a:solidFill>
+                  </a:tcPr>
+                </a:tc>
+                <a:tc>
+                  <a:txBody>
+                    <a:bodyPr/>
+                    <a:lstStyle/>
+                    <a:p>
+                      <a:r>
+                        <a:rPr b="1" sz="1400">
+                          <a:solidFill>
+                            <a:srgbClr val="FFFFFF"/>
+                          </a:solidFill>
+                        </a:rPr>
+                        <a:t>Timeline</a:t>
+                      </a:r>
+                    </a:p>
+                  </a:txBody>
+                  <a:tcPr>
+                    <a:solidFill>
+                      <a:srgbClr val="A01C02"/>
+                    </a:solidFill>
+                  </a:tcPr>
+                </a:tc>
+                <a:tc>
+                  <a:txBody>
+                    <a:bodyPr/>
+                    <a:lstStyle/>
+                    <a:p>
+                      <a:r>
+                        <a:rPr b="1" sz="1400">
+                          <a:solidFill>
+                            <a:srgbClr val="FFFFFF"/>
+                          </a:solidFill>
+                        </a:rPr>
+                        <a:t>Priority</a:t>
+                      </a:r>
+                    </a:p>
+                  </a:txBody>
+                  <a:tcPr>
+                    <a:solidFill>
+                      <a:srgbClr val="A01C02"/>
+                    </a:solidFill>
+                  </a:tcPr>
+                </a:tc>
+              </a:tr>
+              <a:tr h="370840">
+                <a:tc>
+                  <a:txBody>
+                    <a:bodyPr/>
+                    <a:lstStyle/>
+                    <a:p>
+                      <a:r>
+                        <a:rPr sz="1100"/>
+                        <a:t>[Enhancement 1]</a:t>
+                      </a:r>
+                    </a:p>
+                  </a:txBody>
+                  <a:tcPr>
+                    <a:solidFill>
+                      <a:srgbClr val="E7E6E6"/>
+                    </a:solidFill>
+                  </a:tcPr>
+                </a:tc>
+                <a:tc>
+                  <a:txBody>
+                    <a:bodyPr/>
+                    <a:lstStyle/>
+                    <a:p>
+                      <a:r>
+                        <a:rPr sz="1100"/>
+                        <a:t>[Value proposition]</a:t>
+                      </a:r>
+                    </a:p>
+                  </a:txBody>
+                  <a:tcPr>
+                    <a:solidFill>
+                      <a:srgbClr val="E7E6E6"/>
+                    </a:solidFill>
+                  </a:tcPr>
+                </a:tc>
+                <a:tc>
+                  <a:txBody>
+                    <a:bodyPr/>
+                    <a:lstStyle/>
+                    <a:p>
+                      <a:r>
+                        <a:rPr sz="1100"/>
+                        <a:t>[Low/Med/High]</a:t>
+                      </a:r>
+                    </a:p>
+                  </a:txBody>
+                  <a:tcPr>
+                    <a:solidFill>
+                      <a:srgbClr val="E7E6E6"/>
+                    </a:solidFill>
+                  </a:tcPr>
+                </a:tc>
+                <a:tc>
+                  <a:txBody>
+                    <a:bodyPr/>
+                    <a:lstStyle/>
+                    <a:p>
+                      <a:r>
+                        <a:rPr sz="1100"/>
+                        <a:t>[Timeline]</a:t>
+                      </a:r>
+                    </a:p>
+                  </a:txBody>
+                  <a:tcPr>
+                    <a:solidFill>
+                      <a:srgbClr val="E7E6E6"/>
+                    </a:solidFill>
+                  </a:tcPr>
+                </a:tc>
+                <a:tc>
+                  <a:txBody>
+                    <a:bodyPr/>
+                    <a:lstStyle/>
+                    <a:p>
+                      <a:r>
+                        <a:rPr sz="1100"/>
+                        <a:t>[High/Med/Low]</a:t>
+                      </a:r>
+                    </a:p>
+                  </a:txBody>
+                  <a:tcPr>
+                    <a:solidFill>
+                      <a:srgbClr val="E7E6E6"/>
+                    </a:solidFill>
+                  </a:tcPr>
+                </a:tc>
+              </a:tr>
+              <a:tr h="370840">
+                <a:tc>
+                  <a:txBody>
+                    <a:bodyPr/>
+                    <a:lstStyle/>
+                    <a:p>
+                      <a:r>
+                        <a:rPr sz="1100"/>
+                        <a:t>[Enhancement 2]</a:t>
+                      </a:r>
+                    </a:p>
+                  </a:txBody>
+                  <a:tcPr>
+                    <a:solidFill>
+                      <a:srgbClr val="E7E6E6"/>
+                    </a:solidFill>
+                  </a:tcPr>
+                </a:tc>
+                <a:tc>
+                  <a:txBody>
+                    <a:bodyPr/>
+                    <a:lstStyle/>
+                    <a:p>
+                      <a:r>
+                        <a:rPr sz="1100"/>
+                        <a:t>[Value proposition]</a:t>
+                      </a:r>
+                    </a:p>
+                  </a:txBody>
+                  <a:tcPr>
+                    <a:solidFill>
+                      <a:srgbClr val="E7E6E6"/>
+                    </a:solidFill>
+                  </a:tcPr>
+                </a:tc>
+                <a:tc>
+                  <a:txBody>
+                    <a:bodyPr/>
+                    <a:lstStyle/>
+                    <a:p>
+                      <a:r>
+                        <a:rPr sz="1100"/>
+                        <a:t>[Low/Med/High]</a:t>
+                      </a:r>
+                    </a:p>
+                  </a:txBody>
+                  <a:tcPr>
+                    <a:solidFill>
+                      <a:srgbClr val="E7E6E6"/>
+                    </a:solidFill>
+                  </a:tcPr>
+                </a:tc>
+                <a:tc>
+                  <a:txBody>
+                    <a:bodyPr/>
+                    <a:lstStyle/>
+                    <a:p>
+                      <a:r>
+                        <a:rPr sz="1100"/>
+                        <a:t>[Timeline]</a:t>
+                      </a:r>
+                    </a:p>
+                  </a:txBody>
+                  <a:tcPr>
+                    <a:solidFill>
+                      <a:srgbClr val="E7E6E6"/>
+                    </a:solidFill>
+                  </a:tcPr>
+                </a:tc>
+                <a:tc>
+                  <a:txBody>
+                    <a:bodyPr/>
+                    <a:lstStyle/>
+                    <a:p>
+                      <a:r>
+                        <a:rPr sz="1100"/>
+                        <a:t>[High/Med/Low]</a:t>
+                      </a:r>
+                    </a:p>
+                  </a:txBody>
+                  <a:tcPr>
+                    <a:solidFill>
+                      <a:srgbClr val="E7E6E6"/>
+                    </a:solidFill>
+                  </a:tcPr>
+                </a:tc>
+              </a:tr>
+              <a:tr h="370840">
+                <a:tc>
+                  <a:txBody>
+                    <a:bodyPr/>
+                    <a:lstStyle/>
+                    <a:p>
+                      <a:r>
+                        <a:rPr sz="1100"/>
+                        <a:t>[Enhancement 3]</a:t>
+                      </a:r>
+                    </a:p>
+                  </a:txBody>
+                  <a:tcPr>
+                    <a:solidFill>
+                      <a:srgbClr val="E7E6E6"/>
+                    </a:solidFill>
+                  </a:tcPr>
+                </a:tc>
+                <a:tc>
+                  <a:txBody>
+                    <a:bodyPr/>
+                    <a:lstStyle/>
+                    <a:p>
+                      <a:r>
+                        <a:rPr sz="1100"/>
+                        <a:t>[Value proposition]</a:t>
+                      </a:r>
+                    </a:p>
+                  </a:txBody>
+                  <a:tcPr>
+                    <a:solidFill>
+                      <a:srgbClr val="E7E6E6"/>
+                    </a:solidFill>
+                  </a:tcPr>
+                </a:tc>
+                <a:tc>
+                  <a:txBody>
+                    <a:bodyPr/>
+                    <a:lstStyle/>
+                    <a:p>
+                      <a:r>
+                        <a:rPr sz="1100"/>
+                        <a:t>[Low/Med/High]</a:t>
+                      </a:r>
+                    </a:p>
+                  </a:txBody>
+                  <a:tcPr>
+                    <a:solidFill>
+                      <a:srgbClr val="E7E6E6"/>
+                    </a:solidFill>
+                  </a:tcPr>
+                </a:tc>
+                <a:tc>
+                  <a:txBody>
+                    <a:bodyPr/>
+                    <a:lstStyle/>
+                    <a:p>
+                      <a:r>
+                        <a:rPr sz="1100"/>
+                        <a:t>[Timeline]</a:t>
+                      </a:r>
+                    </a:p>
+                  </a:txBody>
+                  <a:tcPr>
+                    <a:solidFill>
+                      <a:srgbClr val="E7E6E6"/>
+                    </a:solidFill>
+                  </a:tcPr>
+                </a:tc>
+                <a:tc>
+                  <a:txBody>
+                    <a:bodyPr/>
+                    <a:lstStyle/>
+                    <a:p>
+                      <a:r>
+                        <a:rPr sz="1100"/>
+                        <a:t>[High/Med/Low]</a:t>
+                      </a:r>
+                    </a:p>
+                  </a:txBody>
+                  <a:tcPr>
+                    <a:solidFill>
+                      <a:srgbClr val="E7E6E6"/>
+                    </a:solidFill>
+                  </a:tcPr>
+                </a:tc>
+              </a:tr>
+            </a:tbl>
+          </a:graphicData>
+        </a:graphic>
+      </p:graphicFrame>
     </p:spTree>
   </p:cSld>
   <p:clrMapOvr>
@@ -5336,6 +6561,23 @@
         <p:txBody>
           <a:bodyPr/>
           <a:lstStyle/>
+          <a:p/>
+        </p:txBody>
+      </p:sp>
+      <p:sp>
+        <p:nvSpPr>
+          <p:cNvPr id="6" name="Text Placeholder 5"/>
+          <p:cNvSpPr>
+            <a:spLocks noGrp="1"/>
+          </p:cNvSpPr>
+          <p:nvPr>
+            <p:ph type="body" idx="15" sz="quarter"/>
+          </p:nvPr>
+        </p:nvSpPr>
+        <p:spPr/>
+        <p:txBody>
+          <a:bodyPr/>
+          <a:lstStyle/>
           <a:p>
             <a:pPr/>
             <a:r>
@@ -6337,7 +7579,9 @@
           <a:bodyPr/>
           <a:lstStyle/>
           <a:p>
-            <a:r>
+            <a:pPr algn="l"/>
+            <a:r>
+              <a:rPr b="1"/>
               <a:t>**Slide 4: Project Scope Delivered**</a:t>
             </a:r>
           </a:p>
@@ -6355,112 +7599,405 @@
         </p:nvSpPr>
         <p:spPr/>
       </p:sp>
-      <p:sp>
-        <p:nvSpPr>
-          <p:cNvPr id="4" name="Text Placeholder 3"/>
-          <p:cNvSpPr>
-            <a:spLocks noGrp="1"/>
-          </p:cNvSpPr>
-          <p:nvPr>
-            <p:ph type="body" idx="14" sz="quarter"/>
-          </p:nvPr>
-        </p:nvSpPr>
-        <p:spPr/>
-        <p:txBody>
-          <a:bodyPr/>
-          <a:lstStyle/>
-          <a:p>
-            <a:pPr/>
-            <a:r>
-              <a:t>Scope Element: [Functional Area 1]</a:t>
-            </a:r>
-          </a:p>
-          <a:p>
-            <a:pPr lvl="1"/>
-            <a:r>
-              <a:t>Planned: [Original scope]</a:t>
-            </a:r>
-          </a:p>
-          <a:p>
-            <a:pPr lvl="1"/>
-            <a:r>
-              <a:t>Delivered: [What was delivered]</a:t>
-            </a:r>
-          </a:p>
-          <a:p>
-            <a:pPr lvl="1"/>
-            <a:r>
-              <a:t>Status: ✅ Complete</a:t>
-            </a:r>
-          </a:p>
-          <a:p>
-            <a:pPr lvl="1"/>
-            <a:r>
-              <a:t>Notes: [Any variances]</a:t>
-            </a:r>
-          </a:p>
-          <a:p>
-            <a:pPr/>
-            <a:r>
-              <a:t>Scope Element: [Functional Area 2]</a:t>
-            </a:r>
-          </a:p>
-          <a:p>
-            <a:pPr lvl="1"/>
-            <a:r>
-              <a:t>Planned: [Original scope]</a:t>
-            </a:r>
-          </a:p>
-          <a:p>
-            <a:pPr lvl="1"/>
-            <a:r>
-              <a:t>Delivered: [What was delivered]</a:t>
-            </a:r>
-          </a:p>
-          <a:p>
-            <a:pPr lvl="1"/>
-            <a:r>
-              <a:t>Status: ✅ Complete</a:t>
-            </a:r>
-          </a:p>
-          <a:p>
-            <a:pPr lvl="1"/>
-            <a:r>
-              <a:t>Notes: [Any variances]</a:t>
-            </a:r>
-          </a:p>
-          <a:p>
-            <a:pPr/>
-            <a:r>
-              <a:t>Scope Element: [Functional Area 3]</a:t>
-            </a:r>
-          </a:p>
-          <a:p>
-            <a:pPr lvl="1"/>
-            <a:r>
-              <a:t>Planned: [Original scope]</a:t>
-            </a:r>
-          </a:p>
-          <a:p>
-            <a:pPr lvl="1"/>
-            <a:r>
-              <a:t>Delivered: [What was delivered]</a:t>
-            </a:r>
-          </a:p>
-          <a:p>
-            <a:pPr lvl="1"/>
-            <a:r>
-              <a:t>Status: ⚠️ Modified</a:t>
-            </a:r>
-          </a:p>
-          <a:p>
-            <a:pPr lvl="1"/>
-            <a:r>
-              <a:t>Notes: [Scope changes]</a:t>
-            </a:r>
-          </a:p>
-        </p:txBody>
-      </p:sp>
+      <p:graphicFrame>
+        <p:nvGraphicFramePr>
+          <p:cNvPr id="4" name="Table Placeholder 3"/>
+          <p:cNvGraphicFramePr>
+            <a:graphicFrameLocks noGrp="1"/>
+          </p:cNvGraphicFramePr>
+          <p:nvPr>
+            <p:ph type="tbl" idx="14" sz="quarter"/>
+          </p:nvPr>
+        </p:nvGraphicFramePr>
+        <p:xfrm>
+          <a:off x="256855" y="677011"/>
+          <a:ext cx="8710929" cy="1483360"/>
+        </p:xfrm>
+        <a:graphic>
+          <a:graphicData uri="http://schemas.openxmlformats.org/drawingml/2006/table">
+            <a:tbl>
+              <a:tblPr firstRow="1" bandRow="1">
+                <a:tableStyleId>{5C22544A-7EE6-4342-B048-85BDC9FD1C3A}</a:tableStyleId>
+              </a:tblPr>
+              <a:tblGrid>
+                <a:gridCol w="2177733"/>
+                <a:gridCol w="1306639"/>
+                <a:gridCol w="1045311"/>
+                <a:gridCol w="1567967"/>
+                <a:gridCol w="2613279"/>
+              </a:tblGrid>
+              <a:tr h="370840">
+                <a:tc>
+                  <a:txBody>
+                    <a:bodyPr/>
+                    <a:lstStyle/>
+                    <a:p>
+                      <a:r>
+                        <a:rPr b="1" sz="1400">
+                          <a:solidFill>
+                            <a:srgbClr val="FFFFFF"/>
+                          </a:solidFill>
+                        </a:rPr>
+                        <a:t>Scope Element</a:t>
+                      </a:r>
+                    </a:p>
+                  </a:txBody>
+                  <a:tcPr>
+                    <a:solidFill>
+                      <a:srgbClr val="A01C02"/>
+                    </a:solidFill>
+                  </a:tcPr>
+                </a:tc>
+                <a:tc>
+                  <a:txBody>
+                    <a:bodyPr/>
+                    <a:lstStyle/>
+                    <a:p>
+                      <a:r>
+                        <a:rPr b="1" sz="1400">
+                          <a:solidFill>
+                            <a:srgbClr val="FFFFFF"/>
+                          </a:solidFill>
+                        </a:rPr>
+                        <a:t>Planned</a:t>
+                      </a:r>
+                    </a:p>
+                  </a:txBody>
+                  <a:tcPr>
+                    <a:solidFill>
+                      <a:srgbClr val="A01C02"/>
+                    </a:solidFill>
+                  </a:tcPr>
+                </a:tc>
+                <a:tc>
+                  <a:txBody>
+                    <a:bodyPr/>
+                    <a:lstStyle/>
+                    <a:p>
+                      <a:r>
+                        <a:rPr b="1" sz="1400">
+                          <a:solidFill>
+                            <a:srgbClr val="FFFFFF"/>
+                          </a:solidFill>
+                        </a:rPr>
+                        <a:t>Delivered</a:t>
+                      </a:r>
+                    </a:p>
+                  </a:txBody>
+                  <a:tcPr>
+                    <a:solidFill>
+                      <a:srgbClr val="A01C02"/>
+                    </a:solidFill>
+                  </a:tcPr>
+                </a:tc>
+                <a:tc>
+                  <a:txBody>
+                    <a:bodyPr/>
+                    <a:lstStyle/>
+                    <a:p>
+                      <a:r>
+                        <a:rPr b="1" sz="1400">
+                          <a:solidFill>
+                            <a:srgbClr val="FFFFFF"/>
+                          </a:solidFill>
+                        </a:rPr>
+                        <a:t>Status</a:t>
+                      </a:r>
+                    </a:p>
+                  </a:txBody>
+                  <a:tcPr>
+                    <a:solidFill>
+                      <a:srgbClr val="A01C02"/>
+                    </a:solidFill>
+                  </a:tcPr>
+                </a:tc>
+                <a:tc>
+                  <a:txBody>
+                    <a:bodyPr/>
+                    <a:lstStyle/>
+                    <a:p>
+                      <a:r>
+                        <a:rPr b="1" sz="1400">
+                          <a:solidFill>
+                            <a:srgbClr val="FFFFFF"/>
+                          </a:solidFill>
+                        </a:rPr>
+                        <a:t>Notes</a:t>
+                      </a:r>
+                    </a:p>
+                  </a:txBody>
+                  <a:tcPr>
+                    <a:solidFill>
+                      <a:srgbClr val="A01C02"/>
+                    </a:solidFill>
+                  </a:tcPr>
+                </a:tc>
+              </a:tr>
+              <a:tr h="370840">
+                <a:tc>
+                  <a:txBody>
+                    <a:bodyPr/>
+                    <a:lstStyle/>
+                    <a:p>
+                      <a:r>
+                        <a:rPr sz="1100"/>
+                        <a:t>[Functional Area 1]</a:t>
+                      </a:r>
+                    </a:p>
+                  </a:txBody>
+                  <a:tcPr>
+                    <a:solidFill>
+                      <a:srgbClr val="E7E6E6"/>
+                    </a:solidFill>
+                  </a:tcPr>
+                </a:tc>
+                <a:tc>
+                  <a:txBody>
+                    <a:bodyPr/>
+                    <a:lstStyle/>
+                    <a:p>
+                      <a:r>
+                        <a:rPr sz="1100"/>
+                        <a:t>[Original scope]</a:t>
+                      </a:r>
+                    </a:p>
+                  </a:txBody>
+                  <a:tcPr>
+                    <a:solidFill>
+                      <a:srgbClr val="E7E6E6"/>
+                    </a:solidFill>
+                  </a:tcPr>
+                </a:tc>
+                <a:tc>
+                  <a:txBody>
+                    <a:bodyPr/>
+                    <a:lstStyle/>
+                    <a:p>
+                      <a:r>
+                        <a:rPr sz="1100"/>
+                        <a:t>[What was delivered]</a:t>
+                      </a:r>
+                    </a:p>
+                  </a:txBody>
+                  <a:tcPr>
+                    <a:solidFill>
+                      <a:srgbClr val="E7E6E6"/>
+                    </a:solidFill>
+                  </a:tcPr>
+                </a:tc>
+                <a:tc>
+                  <a:txBody>
+                    <a:bodyPr/>
+                    <a:lstStyle/>
+                    <a:p>
+                      <a:r>
+                        <a:rPr sz="1100"/>
+                        <a:t>✅ Complete</a:t>
+                      </a:r>
+                    </a:p>
+                  </a:txBody>
+                  <a:tcPr>
+                    <a:solidFill>
+                      <a:srgbClr val="E7E6E6"/>
+                    </a:solidFill>
+                  </a:tcPr>
+                </a:tc>
+                <a:tc>
+                  <a:txBody>
+                    <a:bodyPr/>
+                    <a:lstStyle/>
+                    <a:p>
+                      <a:r>
+                        <a:rPr sz="1100"/>
+                        <a:t>[Any variances]</a:t>
+                      </a:r>
+                    </a:p>
+                  </a:txBody>
+                  <a:tcPr>
+                    <a:solidFill>
+                      <a:srgbClr val="E7E6E6"/>
+                    </a:solidFill>
+                  </a:tcPr>
+                </a:tc>
+              </a:tr>
+              <a:tr h="370840">
+                <a:tc>
+                  <a:txBody>
+                    <a:bodyPr/>
+                    <a:lstStyle/>
+                    <a:p>
+                      <a:r>
+                        <a:rPr sz="1100"/>
+                        <a:t>[Functional Area 2]</a:t>
+                      </a:r>
+                    </a:p>
+                  </a:txBody>
+                  <a:tcPr>
+                    <a:solidFill>
+                      <a:srgbClr val="E7E6E6"/>
+                    </a:solidFill>
+                  </a:tcPr>
+                </a:tc>
+                <a:tc>
+                  <a:txBody>
+                    <a:bodyPr/>
+                    <a:lstStyle/>
+                    <a:p>
+                      <a:r>
+                        <a:rPr sz="1100"/>
+                        <a:t>[Original scope]</a:t>
+                      </a:r>
+                    </a:p>
+                  </a:txBody>
+                  <a:tcPr>
+                    <a:solidFill>
+                      <a:srgbClr val="E7E6E6"/>
+                    </a:solidFill>
+                  </a:tcPr>
+                </a:tc>
+                <a:tc>
+                  <a:txBody>
+                    <a:bodyPr/>
+                    <a:lstStyle/>
+                    <a:p>
+                      <a:r>
+                        <a:rPr sz="1100"/>
+                        <a:t>[What was delivered]</a:t>
+                      </a:r>
+                    </a:p>
+                  </a:txBody>
+                  <a:tcPr>
+                    <a:solidFill>
+                      <a:srgbClr val="E7E6E6"/>
+                    </a:solidFill>
+                  </a:tcPr>
+                </a:tc>
+                <a:tc>
+                  <a:txBody>
+                    <a:bodyPr/>
+                    <a:lstStyle/>
+                    <a:p>
+                      <a:r>
+                        <a:rPr sz="1100"/>
+                        <a:t>✅ Complete</a:t>
+                      </a:r>
+                    </a:p>
+                  </a:txBody>
+                  <a:tcPr>
+                    <a:solidFill>
+                      <a:srgbClr val="E7E6E6"/>
+                    </a:solidFill>
+                  </a:tcPr>
+                </a:tc>
+                <a:tc>
+                  <a:txBody>
+                    <a:bodyPr/>
+                    <a:lstStyle/>
+                    <a:p>
+                      <a:r>
+                        <a:rPr sz="1100"/>
+                        <a:t>[Any variances]</a:t>
+                      </a:r>
+                    </a:p>
+                  </a:txBody>
+                  <a:tcPr>
+                    <a:solidFill>
+                      <a:srgbClr val="E7E6E6"/>
+                    </a:solidFill>
+                  </a:tcPr>
+                </a:tc>
+              </a:tr>
+              <a:tr h="370840">
+                <a:tc>
+                  <a:txBody>
+                    <a:bodyPr/>
+                    <a:lstStyle/>
+                    <a:p>
+                      <a:r>
+                        <a:rPr sz="1100"/>
+                        <a:t>[Functional Area 3]</a:t>
+                      </a:r>
+                    </a:p>
+                  </a:txBody>
+                  <a:tcPr>
+                    <a:solidFill>
+                      <a:srgbClr val="E7E6E6"/>
+                    </a:solidFill>
+                  </a:tcPr>
+                </a:tc>
+                <a:tc>
+                  <a:txBody>
+                    <a:bodyPr/>
+                    <a:lstStyle/>
+                    <a:p>
+                      <a:r>
+                        <a:rPr sz="1100"/>
+                        <a:t>[Original scope]</a:t>
+                      </a:r>
+                    </a:p>
+                  </a:txBody>
+                  <a:tcPr>
+                    <a:solidFill>
+                      <a:srgbClr val="E7E6E6"/>
+                    </a:solidFill>
+                  </a:tcPr>
+                </a:tc>
+                <a:tc>
+                  <a:txBody>
+                    <a:bodyPr/>
+                    <a:lstStyle/>
+                    <a:p>
+                      <a:r>
+                        <a:rPr sz="1100"/>
+                        <a:t>[What was delivered]</a:t>
+                      </a:r>
+                    </a:p>
+                  </a:txBody>
+                  <a:tcPr>
+                    <a:solidFill>
+                      <a:srgbClr val="E7E6E6"/>
+                    </a:solidFill>
+                  </a:tcPr>
+                </a:tc>
+                <a:tc>
+                  <a:txBody>
+                    <a:bodyPr/>
+                    <a:lstStyle/>
+                    <a:p>
+                      <a:r>
+                        <a:rPr sz="1100"/>
+                        <a:t>⚠️ Modified</a:t>
+                      </a:r>
+                    </a:p>
+                  </a:txBody>
+                  <a:tcPr>
+                    <a:solidFill>
+                      <a:srgbClr val="E7E6E6"/>
+                    </a:solidFill>
+                  </a:tcPr>
+                </a:tc>
+                <a:tc>
+                  <a:txBody>
+                    <a:bodyPr/>
+                    <a:lstStyle/>
+                    <a:p>
+                      <a:r>
+                        <a:rPr sz="1100"/>
+                        <a:t>[Scope changes]</a:t>
+                      </a:r>
+                    </a:p>
+                  </a:txBody>
+                  <a:tcPr>
+                    <a:solidFill>
+                      <a:srgbClr val="E7E6E6"/>
+                    </a:solidFill>
+                  </a:tcPr>
+                </a:tc>
+              </a:tr>
+            </a:tbl>
+          </a:graphicData>
+        </a:graphic>
+      </p:graphicFrame>
     </p:spTree>
   </p:cSld>
   <p:clrMapOvr>
@@ -6785,7 +8322,9 @@
           <a:bodyPr/>
           <a:lstStyle/>
           <a:p>
-            <a:r>
+            <a:pPr algn="l"/>
+            <a:r>
+              <a:rPr b="1"/>
               <a:t>**Slide 8: Key Features Delivered**</a:t>
             </a:r>
           </a:p>
@@ -6803,112 +8342,405 @@
         </p:nvSpPr>
         <p:spPr/>
       </p:sp>
-      <p:sp>
-        <p:nvSpPr>
-          <p:cNvPr id="4" name="Text Placeholder 3"/>
-          <p:cNvSpPr>
-            <a:spLocks noGrp="1"/>
-          </p:cNvSpPr>
-          <p:nvPr>
-            <p:ph type="body" idx="14" sz="quarter"/>
-          </p:nvPr>
-        </p:nvSpPr>
-        <p:spPr/>
-        <p:txBody>
-          <a:bodyPr/>
-          <a:lstStyle/>
-          <a:p>
-            <a:pPr/>
-            <a:r>
-              <a:t>Feature: [Feature 1]</a:t>
-            </a:r>
-          </a:p>
-          <a:p>
-            <a:pPr lvl="1"/>
-            <a:r>
-              <a:t>Business Value: [Value proposition]</a:t>
-            </a:r>
-          </a:p>
-          <a:p>
-            <a:pPr lvl="1"/>
-            <a:r>
-              <a:t>User Impact: [User benefit]</a:t>
-            </a:r>
-          </a:p>
-          <a:p>
-            <a:pPr lvl="1"/>
-            <a:r>
-              <a:t>Technical Complexity: [Complexity level]</a:t>
-            </a:r>
-          </a:p>
-          <a:p>
-            <a:pPr lvl="1"/>
-            <a:r>
-              <a:t>Status: ✅ Delivered</a:t>
-            </a:r>
-          </a:p>
-          <a:p>
-            <a:pPr/>
-            <a:r>
-              <a:t>Feature: [Feature 2]</a:t>
-            </a:r>
-          </a:p>
-          <a:p>
-            <a:pPr lvl="1"/>
-            <a:r>
-              <a:t>Business Value: [Value proposition]</a:t>
-            </a:r>
-          </a:p>
-          <a:p>
-            <a:pPr lvl="1"/>
-            <a:r>
-              <a:t>User Impact: [User benefit]</a:t>
-            </a:r>
-          </a:p>
-          <a:p>
-            <a:pPr lvl="1"/>
-            <a:r>
-              <a:t>Technical Complexity: [Complexity level]</a:t>
-            </a:r>
-          </a:p>
-          <a:p>
-            <a:pPr lvl="1"/>
-            <a:r>
-              <a:t>Status: ✅ Delivered</a:t>
-            </a:r>
-          </a:p>
-          <a:p>
-            <a:pPr/>
-            <a:r>
-              <a:t>Feature: [Feature 3]</a:t>
-            </a:r>
-          </a:p>
-          <a:p>
-            <a:pPr lvl="1"/>
-            <a:r>
-              <a:t>Business Value: [Value proposition]</a:t>
-            </a:r>
-          </a:p>
-          <a:p>
-            <a:pPr lvl="1"/>
-            <a:r>
-              <a:t>User Impact: [User benefit]</a:t>
-            </a:r>
-          </a:p>
-          <a:p>
-            <a:pPr lvl="1"/>
-            <a:r>
-              <a:t>Technical Complexity: [Complexity level]</a:t>
-            </a:r>
-          </a:p>
-          <a:p>
-            <a:pPr lvl="1"/>
-            <a:r>
-              <a:t>Status: ✅ Delivered</a:t>
-            </a:r>
-          </a:p>
-        </p:txBody>
-      </p:sp>
+      <p:graphicFrame>
+        <p:nvGraphicFramePr>
+          <p:cNvPr id="4" name="Table Placeholder 3"/>
+          <p:cNvGraphicFramePr>
+            <a:graphicFrameLocks noGrp="1"/>
+          </p:cNvGraphicFramePr>
+          <p:nvPr>
+            <p:ph type="tbl" idx="14" sz="quarter"/>
+          </p:nvPr>
+        </p:nvGraphicFramePr>
+        <p:xfrm>
+          <a:off x="256855" y="677011"/>
+          <a:ext cx="8710929" cy="1483360"/>
+        </p:xfrm>
+        <a:graphic>
+          <a:graphicData uri="http://schemas.openxmlformats.org/drawingml/2006/table">
+            <a:tbl>
+              <a:tblPr firstRow="1" bandRow="1">
+                <a:tableStyleId>{5C22544A-7EE6-4342-B048-85BDC9FD1C3A}</a:tableStyleId>
+              </a:tblPr>
+              <a:tblGrid>
+                <a:gridCol w="2177733"/>
+                <a:gridCol w="1306639"/>
+                <a:gridCol w="1045311"/>
+                <a:gridCol w="1567967"/>
+                <a:gridCol w="2613279"/>
+              </a:tblGrid>
+              <a:tr h="370840">
+                <a:tc>
+                  <a:txBody>
+                    <a:bodyPr/>
+                    <a:lstStyle/>
+                    <a:p>
+                      <a:r>
+                        <a:rPr b="1" sz="1400">
+                          <a:solidFill>
+                            <a:srgbClr val="FFFFFF"/>
+                          </a:solidFill>
+                        </a:rPr>
+                        <a:t>Feature</a:t>
+                      </a:r>
+                    </a:p>
+                  </a:txBody>
+                  <a:tcPr>
+                    <a:solidFill>
+                      <a:srgbClr val="A01C02"/>
+                    </a:solidFill>
+                  </a:tcPr>
+                </a:tc>
+                <a:tc>
+                  <a:txBody>
+                    <a:bodyPr/>
+                    <a:lstStyle/>
+                    <a:p>
+                      <a:r>
+                        <a:rPr b="1" sz="1400">
+                          <a:solidFill>
+                            <a:srgbClr val="FFFFFF"/>
+                          </a:solidFill>
+                        </a:rPr>
+                        <a:t>Business Value</a:t>
+                      </a:r>
+                    </a:p>
+                  </a:txBody>
+                  <a:tcPr>
+                    <a:solidFill>
+                      <a:srgbClr val="A01C02"/>
+                    </a:solidFill>
+                  </a:tcPr>
+                </a:tc>
+                <a:tc>
+                  <a:txBody>
+                    <a:bodyPr/>
+                    <a:lstStyle/>
+                    <a:p>
+                      <a:r>
+                        <a:rPr b="1" sz="1400">
+                          <a:solidFill>
+                            <a:srgbClr val="FFFFFF"/>
+                          </a:solidFill>
+                        </a:rPr>
+                        <a:t>User Impact</a:t>
+                      </a:r>
+                    </a:p>
+                  </a:txBody>
+                  <a:tcPr>
+                    <a:solidFill>
+                      <a:srgbClr val="A01C02"/>
+                    </a:solidFill>
+                  </a:tcPr>
+                </a:tc>
+                <a:tc>
+                  <a:txBody>
+                    <a:bodyPr/>
+                    <a:lstStyle/>
+                    <a:p>
+                      <a:r>
+                        <a:rPr b="1" sz="1400">
+                          <a:solidFill>
+                            <a:srgbClr val="FFFFFF"/>
+                          </a:solidFill>
+                        </a:rPr>
+                        <a:t>Technical Complexity</a:t>
+                      </a:r>
+                    </a:p>
+                  </a:txBody>
+                  <a:tcPr>
+                    <a:solidFill>
+                      <a:srgbClr val="A01C02"/>
+                    </a:solidFill>
+                  </a:tcPr>
+                </a:tc>
+                <a:tc>
+                  <a:txBody>
+                    <a:bodyPr/>
+                    <a:lstStyle/>
+                    <a:p>
+                      <a:r>
+                        <a:rPr b="1" sz="1400">
+                          <a:solidFill>
+                            <a:srgbClr val="FFFFFF"/>
+                          </a:solidFill>
+                        </a:rPr>
+                        <a:t>Status</a:t>
+                      </a:r>
+                    </a:p>
+                  </a:txBody>
+                  <a:tcPr>
+                    <a:solidFill>
+                      <a:srgbClr val="A01C02"/>
+                    </a:solidFill>
+                  </a:tcPr>
+                </a:tc>
+              </a:tr>
+              <a:tr h="370840">
+                <a:tc>
+                  <a:txBody>
+                    <a:bodyPr/>
+                    <a:lstStyle/>
+                    <a:p>
+                      <a:r>
+                        <a:rPr sz="1100"/>
+                        <a:t>[Feature 1]</a:t>
+                      </a:r>
+                    </a:p>
+                  </a:txBody>
+                  <a:tcPr>
+                    <a:solidFill>
+                      <a:srgbClr val="E7E6E6"/>
+                    </a:solidFill>
+                  </a:tcPr>
+                </a:tc>
+                <a:tc>
+                  <a:txBody>
+                    <a:bodyPr/>
+                    <a:lstStyle/>
+                    <a:p>
+                      <a:r>
+                        <a:rPr sz="1100"/>
+                        <a:t>[Value proposition]</a:t>
+                      </a:r>
+                    </a:p>
+                  </a:txBody>
+                  <a:tcPr>
+                    <a:solidFill>
+                      <a:srgbClr val="E7E6E6"/>
+                    </a:solidFill>
+                  </a:tcPr>
+                </a:tc>
+                <a:tc>
+                  <a:txBody>
+                    <a:bodyPr/>
+                    <a:lstStyle/>
+                    <a:p>
+                      <a:r>
+                        <a:rPr sz="1100"/>
+                        <a:t>[User benefit]</a:t>
+                      </a:r>
+                    </a:p>
+                  </a:txBody>
+                  <a:tcPr>
+                    <a:solidFill>
+                      <a:srgbClr val="E7E6E6"/>
+                    </a:solidFill>
+                  </a:tcPr>
+                </a:tc>
+                <a:tc>
+                  <a:txBody>
+                    <a:bodyPr/>
+                    <a:lstStyle/>
+                    <a:p>
+                      <a:r>
+                        <a:rPr sz="1100"/>
+                        <a:t>[Complexity level]</a:t>
+                      </a:r>
+                    </a:p>
+                  </a:txBody>
+                  <a:tcPr>
+                    <a:solidFill>
+                      <a:srgbClr val="E7E6E6"/>
+                    </a:solidFill>
+                  </a:tcPr>
+                </a:tc>
+                <a:tc>
+                  <a:txBody>
+                    <a:bodyPr/>
+                    <a:lstStyle/>
+                    <a:p>
+                      <a:r>
+                        <a:rPr sz="1100"/>
+                        <a:t>✅ Delivered</a:t>
+                      </a:r>
+                    </a:p>
+                  </a:txBody>
+                  <a:tcPr>
+                    <a:solidFill>
+                      <a:srgbClr val="E7E6E6"/>
+                    </a:solidFill>
+                  </a:tcPr>
+                </a:tc>
+              </a:tr>
+              <a:tr h="370840">
+                <a:tc>
+                  <a:txBody>
+                    <a:bodyPr/>
+                    <a:lstStyle/>
+                    <a:p>
+                      <a:r>
+                        <a:rPr sz="1100"/>
+                        <a:t>[Feature 2]</a:t>
+                      </a:r>
+                    </a:p>
+                  </a:txBody>
+                  <a:tcPr>
+                    <a:solidFill>
+                      <a:srgbClr val="E7E6E6"/>
+                    </a:solidFill>
+                  </a:tcPr>
+                </a:tc>
+                <a:tc>
+                  <a:txBody>
+                    <a:bodyPr/>
+                    <a:lstStyle/>
+                    <a:p>
+                      <a:r>
+                        <a:rPr sz="1100"/>
+                        <a:t>[Value proposition]</a:t>
+                      </a:r>
+                    </a:p>
+                  </a:txBody>
+                  <a:tcPr>
+                    <a:solidFill>
+                      <a:srgbClr val="E7E6E6"/>
+                    </a:solidFill>
+                  </a:tcPr>
+                </a:tc>
+                <a:tc>
+                  <a:txBody>
+                    <a:bodyPr/>
+                    <a:lstStyle/>
+                    <a:p>
+                      <a:r>
+                        <a:rPr sz="1100"/>
+                        <a:t>[User benefit]</a:t>
+                      </a:r>
+                    </a:p>
+                  </a:txBody>
+                  <a:tcPr>
+                    <a:solidFill>
+                      <a:srgbClr val="E7E6E6"/>
+                    </a:solidFill>
+                  </a:tcPr>
+                </a:tc>
+                <a:tc>
+                  <a:txBody>
+                    <a:bodyPr/>
+                    <a:lstStyle/>
+                    <a:p>
+                      <a:r>
+                        <a:rPr sz="1100"/>
+                        <a:t>[Complexity level]</a:t>
+                      </a:r>
+                    </a:p>
+                  </a:txBody>
+                  <a:tcPr>
+                    <a:solidFill>
+                      <a:srgbClr val="E7E6E6"/>
+                    </a:solidFill>
+                  </a:tcPr>
+                </a:tc>
+                <a:tc>
+                  <a:txBody>
+                    <a:bodyPr/>
+                    <a:lstStyle/>
+                    <a:p>
+                      <a:r>
+                        <a:rPr sz="1100"/>
+                        <a:t>✅ Delivered</a:t>
+                      </a:r>
+                    </a:p>
+                  </a:txBody>
+                  <a:tcPr>
+                    <a:solidFill>
+                      <a:srgbClr val="E7E6E6"/>
+                    </a:solidFill>
+                  </a:tcPr>
+                </a:tc>
+              </a:tr>
+              <a:tr h="370840">
+                <a:tc>
+                  <a:txBody>
+                    <a:bodyPr/>
+                    <a:lstStyle/>
+                    <a:p>
+                      <a:r>
+                        <a:rPr sz="1100"/>
+                        <a:t>[Feature 3]</a:t>
+                      </a:r>
+                    </a:p>
+                  </a:txBody>
+                  <a:tcPr>
+                    <a:solidFill>
+                      <a:srgbClr val="E7E6E6"/>
+                    </a:solidFill>
+                  </a:tcPr>
+                </a:tc>
+                <a:tc>
+                  <a:txBody>
+                    <a:bodyPr/>
+                    <a:lstStyle/>
+                    <a:p>
+                      <a:r>
+                        <a:rPr sz="1100"/>
+                        <a:t>[Value proposition]</a:t>
+                      </a:r>
+                    </a:p>
+                  </a:txBody>
+                  <a:tcPr>
+                    <a:solidFill>
+                      <a:srgbClr val="E7E6E6"/>
+                    </a:solidFill>
+                  </a:tcPr>
+                </a:tc>
+                <a:tc>
+                  <a:txBody>
+                    <a:bodyPr/>
+                    <a:lstStyle/>
+                    <a:p>
+                      <a:r>
+                        <a:rPr sz="1100"/>
+                        <a:t>[User benefit]</a:t>
+                      </a:r>
+                    </a:p>
+                  </a:txBody>
+                  <a:tcPr>
+                    <a:solidFill>
+                      <a:srgbClr val="E7E6E6"/>
+                    </a:solidFill>
+                  </a:tcPr>
+                </a:tc>
+                <a:tc>
+                  <a:txBody>
+                    <a:bodyPr/>
+                    <a:lstStyle/>
+                    <a:p>
+                      <a:r>
+                        <a:rPr sz="1100"/>
+                        <a:t>[Complexity level]</a:t>
+                      </a:r>
+                    </a:p>
+                  </a:txBody>
+                  <a:tcPr>
+                    <a:solidFill>
+                      <a:srgbClr val="E7E6E6"/>
+                    </a:solidFill>
+                  </a:tcPr>
+                </a:tc>
+                <a:tc>
+                  <a:txBody>
+                    <a:bodyPr/>
+                    <a:lstStyle/>
+                    <a:p>
+                      <a:r>
+                        <a:rPr sz="1100"/>
+                        <a:t>✅ Delivered</a:t>
+                      </a:r>
+                    </a:p>
+                  </a:txBody>
+                  <a:tcPr>
+                    <a:solidFill>
+                      <a:srgbClr val="E7E6E6"/>
+                    </a:solidFill>
+                  </a:tcPr>
+                </a:tc>
+              </a:tr>
+            </a:tbl>
+          </a:graphicData>
+        </a:graphic>
+      </p:graphicFrame>
     </p:spTree>
   </p:cSld>
   <p:clrMapOvr>

</xml_diff>

<commit_message>
Update solution template - consolidate Investment Summary structure and optimize table formatting
</commit_message>
<xml_diff>
--- a/solution-template/sample-provider/sample-category/sample-solution/delivery/closeout-presentation.pptx
+++ b/solution-template/sample-provider/sample-category/sample-solution/delivery/closeout-presentation.pptx
@@ -3247,7 +3247,7 @@
           <a:lstStyle/>
           <a:p>
             <a:r>
-              <a:t>Presenter Name | November 11, 2025</a:t>
+              <a:t>Presenter Name | November 15, 2025</a:t>
             </a:r>
           </a:p>
         </p:txBody>
@@ -3941,7 +3941,7 @@
                     <a:lstStyle/>
                     <a:p>
                       <a:r>
-                        <a:rPr sz="1100"/>
+                        <a:rPr b="1" sz="1100"/>
                         <a:t>Risk Reduction</a:t>
                       </a:r>
                     </a:p>
@@ -3958,7 +3958,7 @@
                     <a:lstStyle/>
                     <a:p>
                       <a:r>
-                        <a:rPr sz="1100"/>
+                        <a:rPr b="1" sz="1100"/>
                         <a:t>[Risk level]</a:t>
                       </a:r>
                     </a:p>
@@ -3975,7 +3975,7 @@
                     <a:lstStyle/>
                     <a:p>
                       <a:r>
-                        <a:rPr sz="1100"/>
+                        <a:rPr b="1" sz="1100"/>
                         <a:t>[Achieved level]</a:t>
                       </a:r>
                     </a:p>
@@ -3992,7 +3992,7 @@
                     <a:lstStyle/>
                     <a:p>
                       <a:r>
-                        <a:rPr sz="1100"/>
+                        <a:rPr b="1" sz="1100"/>
                         <a:t>[How measured]</a:t>
                       </a:r>
                     </a:p>
@@ -4009,7 +4009,7 @@
                     <a:lstStyle/>
                     <a:p>
                       <a:r>
-                        <a:rPr sz="1100"/>
+                        <a:rPr b="1" sz="1100"/>
                         <a:t>[Timeline]</a:t>
                       </a:r>
                     </a:p>
@@ -4768,7 +4768,7 @@
                     <a:lstStyle/>
                     <a:p>
                       <a:r>
-                        <a:rPr sz="1100"/>
+                        <a:rPr b="1" sz="1100"/>
                         <a:t>[Challenge 3]</a:t>
                       </a:r>
                     </a:p>
@@ -4785,7 +4785,7 @@
                     <a:lstStyle/>
                     <a:p>
                       <a:r>
-                        <a:rPr sz="1100"/>
+                        <a:rPr b="1" sz="1100"/>
                         <a:t>[Business/technical impact]</a:t>
                       </a:r>
                     </a:p>
@@ -4802,7 +4802,7 @@
                     <a:lstStyle/>
                     <a:p>
                       <a:r>
-                        <a:rPr sz="1100"/>
+                        <a:rPr b="1" sz="1100"/>
                         <a:t>[How resolved]</a:t>
                       </a:r>
                     </a:p>
@@ -4819,7 +4819,7 @@
                     <a:lstStyle/>
                     <a:p>
                       <a:r>
-                        <a:rPr sz="1100"/>
+                        <a:rPr b="1" sz="1100"/>
                         <a:t>[Future prevention]</a:t>
                       </a:r>
                     </a:p>
@@ -5688,7 +5688,7 @@
                     <a:lstStyle/>
                     <a:p>
                       <a:r>
-                        <a:rPr sz="1100"/>
+                        <a:rPr b="1" sz="1100"/>
                         <a:t>[Enhancement 3]</a:t>
                       </a:r>
                     </a:p>
@@ -5705,7 +5705,7 @@
                     <a:lstStyle/>
                     <a:p>
                       <a:r>
-                        <a:rPr sz="1100"/>
+                        <a:rPr b="1" sz="1100"/>
                         <a:t>[Value proposition]</a:t>
                       </a:r>
                     </a:p>
@@ -5722,7 +5722,7 @@
                     <a:lstStyle/>
                     <a:p>
                       <a:r>
-                        <a:rPr sz="1100"/>
+                        <a:rPr b="1" sz="1100"/>
                         <a:t>[Low/Med/High]</a:t>
                       </a:r>
                     </a:p>
@@ -5739,7 +5739,7 @@
                     <a:lstStyle/>
                     <a:p>
                       <a:r>
-                        <a:rPr sz="1100"/>
+                        <a:rPr b="1" sz="1100"/>
                         <a:t>[Timeline]</a:t>
                       </a:r>
                     </a:p>
@@ -5756,7 +5756,7 @@
                     <a:lstStyle/>
                     <a:p>
                       <a:r>
-                        <a:rPr sz="1100"/>
+                        <a:rPr b="1" sz="1100"/>
                         <a:t>[High/Med/Low]</a:t>
                       </a:r>
                     </a:p>
@@ -7914,7 +7914,7 @@
                     <a:lstStyle/>
                     <a:p>
                       <a:r>
-                        <a:rPr sz="1100"/>
+                        <a:rPr b="1" sz="1100"/>
                         <a:t>[Functional Area 3]</a:t>
                       </a:r>
                     </a:p>
@@ -7931,7 +7931,7 @@
                     <a:lstStyle/>
                     <a:p>
                       <a:r>
-                        <a:rPr sz="1100"/>
+                        <a:rPr b="1" sz="1100"/>
                         <a:t>[Original scope]</a:t>
                       </a:r>
                     </a:p>
@@ -7948,7 +7948,7 @@
                     <a:lstStyle/>
                     <a:p>
                       <a:r>
-                        <a:rPr sz="1100"/>
+                        <a:rPr b="1" sz="1100"/>
                         <a:t>[What was delivered]</a:t>
                       </a:r>
                     </a:p>
@@ -7965,7 +7965,7 @@
                     <a:lstStyle/>
                     <a:p>
                       <a:r>
-                        <a:rPr sz="1100"/>
+                        <a:rPr b="1" sz="1100"/>
                         <a:t>⚠️ Modified</a:t>
                       </a:r>
                     </a:p>
@@ -7982,7 +7982,7 @@
                     <a:lstStyle/>
                     <a:p>
                       <a:r>
-                        <a:rPr sz="1100"/>
+                        <a:rPr b="1" sz="1100"/>
                         <a:t>[Scope changes]</a:t>
                       </a:r>
                     </a:p>
@@ -8657,7 +8657,7 @@
                     <a:lstStyle/>
                     <a:p>
                       <a:r>
-                        <a:rPr sz="1100"/>
+                        <a:rPr b="1" sz="1100"/>
                         <a:t>[Feature 3]</a:t>
                       </a:r>
                     </a:p>
@@ -8674,7 +8674,7 @@
                     <a:lstStyle/>
                     <a:p>
                       <a:r>
-                        <a:rPr sz="1100"/>
+                        <a:rPr b="1" sz="1100"/>
                         <a:t>[Value proposition]</a:t>
                       </a:r>
                     </a:p>
@@ -8691,7 +8691,7 @@
                     <a:lstStyle/>
                     <a:p>
                       <a:r>
-                        <a:rPr sz="1100"/>
+                        <a:rPr b="1" sz="1100"/>
                         <a:t>[User benefit]</a:t>
                       </a:r>
                     </a:p>
@@ -8708,7 +8708,7 @@
                     <a:lstStyle/>
                     <a:p>
                       <a:r>
-                        <a:rPr sz="1100"/>
+                        <a:rPr b="1" sz="1100"/>
                         <a:t>[Complexity level]</a:t>
                       </a:r>
                     </a:p>
@@ -8725,7 +8725,7 @@
                     <a:lstStyle/>
                     <a:p>
                       <a:r>
-                        <a:rPr sz="1100"/>
+                        <a:rPr b="1" sz="1100"/>
                         <a:t>✅ Delivered</a:t>
                       </a:r>
                     </a:p>

</xml_diff>

<commit_message>
Refactor closeout presentation for executive impact
New structure (10 slides):
1. Title Slide
2. Executive Summary - key achievements at a glance
3. Solution Architecture - high-level diagram of what was built
4. Deliverables Inventory - artifacts with purpose and location
5. Quality & Performance - metrics achieved vs targets
6. Benefits Realized - ROI and business value
7. Lessons & Recommendations - combined two-column layout
8. Support Transition - hypercare and escalation plan
9. Acknowledgments & Next Steps - brief team recognition + actions
10. Thank You

Key improvements:
- Added architecture diagram slide
- Added deliverables inventory with artifact purposes
- Combined Lessons Learned + Recommendations
- Reduced Team Recognition to brief acknowledgment
- Removed unnecessary Agenda slide
- Fixed logo paths to use solution assets folder
</commit_message>
<xml_diff>
--- a/solution-template/sample-provider/sample-category/sample-solution/delivery/closeout-presentation.pptx
+++ b/solution-template/sample-provider/sample-category/sample-solution/delivery/closeout-presentation.pptx
@@ -18,7 +18,6 @@
     <p:sldId id="263" r:id="rId14"/>
     <p:sldId id="264" r:id="rId15"/>
     <p:sldId id="265" r:id="rId16"/>
-    <p:sldId id="266" r:id="rId17"/>
   </p:sldIdLst>
   <p:sldSz cx="9144000" cy="5143500" type="screen16x9"/>
   <p:notesSz cx="5143500" cy="9144000"/>
@@ -353,90 +352,22 @@
           </a:p>
           <a:p>
             <a:r>
-              <a:t>- Presentation will take approximately 45 minutes</a:t>
-            </a:r>
-          </a:p>
-          <a:p>
-            <a:r>
-              <a:t>- Time for Q&amp;A at the end</a:t>
-            </a:r>
-          </a:p>
-          <a:p>
-            <a:r>
-              <a:t>- Detailed documentation available for reference</a:t>
-            </a:r>
-          </a:p>
-        </p:txBody>
-      </p:sp>
-    </p:spTree>
-  </p:cSld>
-  <p:clrMapOvr>
-    <a:masterClrMapping/>
-  </p:clrMapOvr>
-</p:notes>
-</file>
-
-<file path=ppt/notesSlides/notesSlide10.xml><?xml version="1.0" encoding="utf-8"?>
-<p:notes xmlns:a="http://schemas.openxmlformats.org/drawingml/2006/main" xmlns:p="http://schemas.openxmlformats.org/presentationml/2006/main" xmlns:r="http://schemas.openxmlformats.org/officeDocument/2006/relationships">
-  <p:cSld>
-    <p:spTree>
-      <p:nvGrpSpPr>
-        <p:cNvPr id="1" name=""/>
-        <p:cNvGrpSpPr/>
-        <p:nvPr/>
-      </p:nvGrpSpPr>
-      <p:grpSpPr>
-        <a:xfrm>
-          <a:off x="0" y="0"/>
-          <a:ext cx="0" cy="0"/>
-          <a:chOff x="0" y="0"/>
-          <a:chExt cx="0" cy="0"/>
-        </a:xfrm>
-      </p:grpSpPr>
-      <p:sp>
-        <p:nvSpPr>
-          <p:cNvPr id="2" name="Slide Image Placeholder 1"/>
-          <p:cNvSpPr>
-            <a:spLocks noGrp="1"/>
-          </p:cNvSpPr>
-          <p:nvPr>
-            <p:ph type="sldImg"/>
-          </p:nvPr>
-        </p:nvSpPr>
-        <p:spPr/>
-      </p:sp>
-      <p:sp>
-        <p:nvSpPr>
-          <p:cNvPr id="3" name="Notes Placeholder 2"/>
-          <p:cNvSpPr>
-            <a:spLocks noGrp="1"/>
-          </p:cNvSpPr>
-          <p:nvPr>
-            <p:ph type="body" idx="1"/>
-          </p:nvPr>
-        </p:nvSpPr>
-        <p:spPr/>
-        <p:txBody>
-          <a:bodyPr/>
-          <a:lstStyle/>
-          <a:p>
-            <a:r>
-              <a:t>*Talking Points:*</a:t>
-            </a:r>
-          </a:p>
-          <a:p>
-            <a:r>
-              <a:t>- Open the floor for questions</a:t>
-            </a:r>
-          </a:p>
-          <a:p>
-            <a:r>
-              <a:t>- Have backup slides ready for detailed technical questions</a:t>
-            </a:r>
-          </a:p>
-          <a:p>
-            <a:r>
-              <a:t>- Offer to schedule follow-up sessions for deep dives</a:t>
+              <a:t>- Open with confidence - project delivered on time, on budget</a:t>
+            </a:r>
+          </a:p>
+          <a:p>
+            <a:r>
+              <a:t>- Highlight zero critical defects as quality achievement</a:t>
+            </a:r>
+          </a:p>
+          <a:p>
+            <a:r>
+              <a:t>- Business impact already exceeding projections</a:t>
+            </a:r>
+          </a:p>
+          <a:p>
+            <a:r>
+              <a:t>- Set positive tone for remainder of presentation</a:t>
             </a:r>
           </a:p>
         </p:txBody>
@@ -499,17 +430,22 @@
           </a:p>
           <a:p>
             <a:r>
-              <a:t>- Remind stakeholders of the original business case</a:t>
-            </a:r>
-          </a:p>
-          <a:p>
-            <a:r>
-              <a:t>- Project duration: 18 weeks (on schedule)</a:t>
-            </a:r>
-          </a:p>
-          <a:p>
-            <a:r>
-              <a:t>- Total investment: $850,000</a:t>
+              <a:t>- Walk through the architecture from bottom to top</a:t>
+            </a:r>
+          </a:p>
+          <a:p>
+            <a:r>
+              <a:t>- Highlight key design decisions and why they matter</a:t>
+            </a:r>
+          </a:p>
+          <a:p>
+            <a:r>
+              <a:t>- Emphasize scalability and reliability built into the foundation</a:t>
+            </a:r>
+          </a:p>
+          <a:p>
+            <a:r>
+              <a:t>- This architecture supports future growth and enhancements</a:t>
             </a:r>
           </a:p>
         </p:txBody>
@@ -567,27 +503,27 @@
           <a:lstStyle/>
           <a:p>
             <a:r>
-              <a:t>*Key Highlights:*</a:t>
-            </a:r>
-          </a:p>
-          <a:p>
-            <a:r>
-              <a:t>- All deliverables completed on time or early</a:t>
-            </a:r>
-          </a:p>
-          <a:p>
-            <a:r>
-              <a:t>- Integration work completed a week ahead of schedule</a:t>
-            </a:r>
-          </a:p>
-          <a:p>
-            <a:r>
-              <a:t>- No scope changes required during implementation</a:t>
-            </a:r>
-          </a:p>
-          <a:p>
-            <a:r>
-              <a:t>- Smooth go-live with zero production incidents</a:t>
+              <a:t>*Talking Points:*</a:t>
+            </a:r>
+          </a:p>
+          <a:p>
+            <a:r>
+              <a:t>- All deliverables have been reviewed and accepted</a:t>
+            </a:r>
+          </a:p>
+          <a:p>
+            <a:r>
+              <a:t>- Infrastructure as Code enables repeatable deployments</a:t>
+            </a:r>
+          </a:p>
+          <a:p>
+            <a:r>
+              <a:t>- Documentation supports knowledge transfer and ongoing operations</a:t>
+            </a:r>
+          </a:p>
+          <a:p>
+            <a:r>
+              <a:t>- Training materials ensure team self-sufficiency</a:t>
             </a:r>
           </a:p>
         </p:txBody>
@@ -650,17 +586,22 @@
           </a:p>
           <a:p>
             <a:r>
-              <a:t>- Quality was a key focus throughout the project</a:t>
-            </a:r>
-          </a:p>
-          <a:p>
-            <a:r>
-              <a:t>- Zero critical defects is testament to rigorous testing</a:t>
-            </a:r>
-          </a:p>
-          <a:p>
-            <a:r>
-              <a:t>- Performance metrics exceed all SLA requirements</a:t>
+              <a:t>- Quality was embedded throughout the delivery process</a:t>
+            </a:r>
+          </a:p>
+          <a:p>
+            <a:r>
+              <a:t>- Zero critical defects demonstrates rigorous testing approach</a:t>
+            </a:r>
+          </a:p>
+          <a:p>
+            <a:r>
+              <a:t>- Performance exceeds SLA requirements with headroom for growth</a:t>
+            </a:r>
+          </a:p>
+          <a:p>
+            <a:r>
+              <a:t>- These metrics establish baseline for ongoing monitoring</a:t>
             </a:r>
           </a:p>
         </p:txBody>
@@ -718,27 +659,27 @@
           <a:lstStyle/>
           <a:p>
             <a:r>
-              <a:t>*Key Metrics:*</a:t>
-            </a:r>
-          </a:p>
-          <a:p>
-            <a:r>
-              <a:t>- Benefits already exceeding projections</a:t>
-            </a:r>
-          </a:p>
-          <a:p>
-            <a:r>
-              <a:t>- Full ROI expected within 10 months vs. 12-month target</a:t>
-            </a:r>
-          </a:p>
-          <a:p>
-            <a:r>
-              <a:t>- User satisfaction scores averaging 4.6/5.0</a:t>
-            </a:r>
-          </a:p>
-          <a:p>
-            <a:r>
-              <a:t>- 95% user adoption rate achieved</a:t>
+              <a:t>*Talking Points:*</a:t>
+            </a:r>
+          </a:p>
+          <a:p>
+            <a:r>
+              <a:t>- Benefits are already being realized post go-live</a:t>
+            </a:r>
+          </a:p>
+          <a:p>
+            <a:r>
+              <a:t>- Time savings translate directly to cost reduction</a:t>
+            </a:r>
+          </a:p>
+          <a:p>
+            <a:r>
+              <a:t>- Customer satisfaction improvement validates business case</a:t>
+            </a:r>
+          </a:p>
+          <a:p>
+            <a:r>
+              <a:t>- Full ROI expected 2 months ahead of schedule</a:t>
             </a:r>
           </a:p>
         </p:txBody>
@@ -801,17 +742,22 @@
           </a:p>
           <a:p>
             <a:r>
-              <a:t>- Key learning: invest more in change management upfront</a:t>
-            </a:r>
-          </a:p>
-          <a:p>
-            <a:r>
-              <a:t>- User training was expanded based on early feedback</a:t>
-            </a:r>
-          </a:p>
-          <a:p>
-            <a:r>
-              <a:t>- These insights captured in lessons learned document</a:t>
+              <a:t>- Lessons learned documented for future projects</a:t>
+            </a:r>
+          </a:p>
+          <a:p>
+            <a:r>
+              <a:t>- Challenges were addressed proactively without impacting timeline</a:t>
+            </a:r>
+          </a:p>
+          <a:p>
+            <a:r>
+              <a:t>- Recommendations provide roadmap for continued value realization</a:t>
+            </a:r>
+          </a:p>
+          <a:p>
+            <a:r>
+              <a:t>- Phase 2 planning can begin immediately if desired</a:t>
             </a:r>
           </a:p>
         </p:txBody>
@@ -874,17 +820,22 @@
           </a:p>
           <a:p>
             <a:r>
-              <a:t>- Support team prepared to handle ongoing needs</a:t>
-            </a:r>
-          </a:p>
-          <a:p>
-            <a:r>
-              <a:t>- Phase 2 planning can begin in 30 days</a:t>
-            </a:r>
-          </a:p>
-          <a:p>
-            <a:r>
-              <a:t>- Enhancement backlog available for roadmap discussions</a:t>
+              <a:t>- Support structure ensures no disruption to operations</a:t>
+            </a:r>
+          </a:p>
+          <a:p>
+            <a:r>
+              <a:t>- Hypercare provides safety net during initial production period</a:t>
+            </a:r>
+          </a:p>
+          <a:p>
+            <a:r>
+              <a:t>- Clear escalation path for any issues that arise</a:t>
+            </a:r>
+          </a:p>
+          <a:p>
+            <a:r>
+              <a:t>- Enhancement backlog ready for prioritization discussions</a:t>
             </a:r>
           </a:p>
         </p:txBody>
@@ -947,17 +898,22 @@
           </a:p>
           <a:p>
             <a:r>
-              <a:t>- Take time to recognize each team member's contribution</a:t>
-            </a:r>
-          </a:p>
-          <a:p>
-            <a:r>
-              <a:t>- This project succeeded because of exceptional teamwork</a:t>
-            </a:r>
-          </a:p>
-          <a:p>
-            <a:r>
-              <a:t>- Client team members were instrumental to success</a:t>
+              <a:t>- Acknowledge the partnership - success was a team effort</a:t>
+            </a:r>
+          </a:p>
+          <a:p>
+            <a:r>
+              <a:t>- Keep next steps concrete and actionable</a:t>
+            </a:r>
+          </a:p>
+          <a:p>
+            <a:r>
+              <a:t>- Emphasize continued engagement and support</a:t>
+            </a:r>
+          </a:p>
+          <a:p>
+            <a:r>
+              <a:t>- Offer to schedule Phase 2 planning session</a:t>
             </a:r>
           </a:p>
         </p:txBody>
@@ -1020,17 +976,22 @@
           </a:p>
           <a:p>
             <a:r>
-              <a:t>- The transition plan ensures continuity of support</a:t>
-            </a:r>
-          </a:p>
-          <a:p>
-            <a:r>
-              <a:t>- First quarterly review will measure sustained benefits</a:t>
-            </a:r>
-          </a:p>
-          <a:p>
-            <a:r>
-              <a:t>- Enhancement backlog ready for prioritization discussions</a:t>
+              <a:t>- Open the floor for questions and discussion</a:t>
+            </a:r>
+          </a:p>
+          <a:p>
+            <a:r>
+              <a:t>- Have backup detail slides ready for deep-dive questions</a:t>
+            </a:r>
+          </a:p>
+          <a:p>
+            <a:r>
+              <a:t>- Offer to schedule follow-up sessions for specific topics</a:t>
+            </a:r>
+          </a:p>
+          <a:p>
+            <a:r>
+              <a:t>- End on positive note - celebrate the successful delivery together</a:t>
             </a:r>
           </a:p>
         </p:txBody>
@@ -4095,6 +4056,30 @@
           </a:p>
         </p:txBody>
       </p:sp>
+      <p:pic>
+        <p:nvPicPr>
+          <p:cNvPr id="7" name="Picture 6" descr="eo-framework-logo-real.png"/>
+          <p:cNvPicPr>
+            <a:picLocks noChangeAspect="1"/>
+          </p:cNvPicPr>
+          <p:nvPr/>
+        </p:nvPicPr>
+        <p:blipFill>
+          <a:blip r:embed="rId2"/>
+          <a:stretch>
+            <a:fillRect/>
+          </a:stretch>
+        </p:blipFill>
+        <p:spPr>
+          <a:xfrm>
+            <a:off x="6684264" y="4535424"/>
+            <a:ext cx="2139696" cy="530352"/>
+          </a:xfrm>
+          <a:prstGeom prst="rect">
+            <a:avLst/>
+          </a:prstGeom>
+        </p:spPr>
+      </p:pic>
     </p:spTree>
   </p:cSld>
   <p:clrMapOvr>
@@ -4120,196 +4105,6 @@
             <a:spLocks noGrp="1"/>
           </p:cNvSpPr>
           <p:nvPr>
-            <p:ph type="pic" idx="13" sz="quarter"/>
-          </p:nvPr>
-        </p:nvSpPr>
-        <p:spPr/>
-      </p:sp>
-      <p:sp>
-        <p:nvSpPr>
-          <p:cNvPr id="3" name="Text Placeholder 2"/>
-          <p:cNvSpPr>
-            <a:spLocks noGrp="1"/>
-          </p:cNvSpPr>
-          <p:nvPr>
-            <p:ph type="body" idx="10" sz="quarter"/>
-          </p:nvPr>
-        </p:nvSpPr>
-        <p:spPr/>
-        <p:txBody>
-          <a:bodyPr/>
-          <a:lstStyle/>
-          <a:p>
-            <a:pPr algn="l"/>
-            <a:r>
-              <a:t>Next Steps</a:t>
-            </a:r>
-          </a:p>
-        </p:txBody>
-      </p:sp>
-      <p:sp>
-        <p:nvSpPr>
-          <p:cNvPr id="4" name="Text Placeholder 3"/>
-          <p:cNvSpPr>
-            <a:spLocks noGrp="1"/>
-          </p:cNvSpPr>
-          <p:nvPr>
-            <p:ph type="body" idx="14" sz="quarter"/>
-          </p:nvPr>
-        </p:nvSpPr>
-        <p:spPr/>
-        <p:txBody>
-          <a:bodyPr/>
-          <a:lstStyle/>
-          <a:p>
-            <a:pPr/>
-            <a:r>
-              <a:rPr b="1"/>
-              <a:t>This Week</a:t>
-            </a:r>
-          </a:p>
-          <a:p>
-            <a:pPr lvl="1"/>
-            <a:r>
-              <a:t>Complete operational handover documentation</a:t>
-            </a:r>
-          </a:p>
-          <a:p>
-            <a:pPr lvl="1"/>
-            <a:r>
-              <a:t>Final knowledge transfer sessions</a:t>
-            </a:r>
-          </a:p>
-          <a:p>
-            <a:pPr/>
-            <a:r>
-              <a:rPr b="1"/>
-              <a:t>Next 30 Days</a:t>
-            </a:r>
-          </a:p>
-          <a:p>
-            <a:pPr lvl="1"/>
-            <a:r>
-              <a:t>Hypercare support period with dedicated team</a:t>
-            </a:r>
-          </a:p>
-          <a:p>
-            <a:pPr lvl="1"/>
-            <a:r>
-              <a:t>Daily standup calls for issue resolution</a:t>
-            </a:r>
-          </a:p>
-          <a:p>
-            <a:pPr/>
-            <a:r>
-              <a:rPr b="1"/>
-              <a:t>Next 60 Days</a:t>
-            </a:r>
-          </a:p>
-          <a:p>
-            <a:pPr lvl="1"/>
-            <a:r>
-              <a:t>Transition to standard support model</a:t>
-            </a:r>
-          </a:p>
-          <a:p>
-            <a:pPr lvl="1"/>
-            <a:r>
-              <a:t>Monthly performance review meetings</a:t>
-            </a:r>
-          </a:p>
-          <a:p>
-            <a:pPr/>
-            <a:r>
-              <a:rPr b="1"/>
-              <a:t>Next 90 Days</a:t>
-            </a:r>
-          </a:p>
-          <a:p>
-            <a:pPr lvl="1"/>
-            <a:r>
-              <a:t>First quarterly business review</a:t>
-            </a:r>
-          </a:p>
-          <a:p>
-            <a:pPr lvl="1"/>
-            <a:r>
-              <a:t>Benefits realization assessment</a:t>
-            </a:r>
-          </a:p>
-          <a:p>
-            <a:pPr/>
-            <a:r>
-              <a:rPr b="1"/>
-              <a:t>Ongoing</a:t>
-            </a:r>
-          </a:p>
-          <a:p>
-            <a:pPr lvl="1"/>
-            <a:r>
-              <a:t>Continuous improvement program</a:t>
-            </a:r>
-          </a:p>
-          <a:p>
-            <a:pPr lvl="1"/>
-            <a:r>
-              <a:t>Enhancement roadmap execution</a:t>
-            </a:r>
-          </a:p>
-        </p:txBody>
-      </p:sp>
-      <p:sp>
-        <p:nvSpPr>
-          <p:cNvPr id="5" name="Text Placeholder 4"/>
-          <p:cNvSpPr>
-            <a:spLocks noGrp="1"/>
-          </p:cNvSpPr>
-          <p:nvPr>
-            <p:ph type="body" idx="15" sz="quarter"/>
-          </p:nvPr>
-        </p:nvSpPr>
-        <p:spPr/>
-        <p:txBody>
-          <a:bodyPr/>
-          <a:lstStyle/>
-          <a:p>
-            <a:pPr algn="r"/>
-            <a:r>
-              <a:rPr sz="1100">
-                <a:solidFill>
-                  <a:srgbClr val="CC0000"/>
-                </a:solidFill>
-              </a:rPr>
-              <a:t>Sample Solution</a:t>
-            </a:r>
-          </a:p>
-        </p:txBody>
-      </p:sp>
-    </p:spTree>
-  </p:cSld>
-  <p:clrMapOvr>
-    <a:masterClrMapping/>
-  </p:clrMapOvr>
-</p:sld>
-</file>
-
-<file path=ppt/slides/slide11.xml><?xml version="1.0" encoding="utf-8"?>
-<p:sld xmlns:a="http://schemas.openxmlformats.org/drawingml/2006/main" xmlns:p="http://schemas.openxmlformats.org/presentationml/2006/main" xmlns:r="http://schemas.openxmlformats.org/officeDocument/2006/relationships">
-  <p:cSld>
-    <p:spTree>
-      <p:nvGrpSpPr>
-        <p:cNvPr id="1" name=""/>
-        <p:cNvGrpSpPr/>
-        <p:nvPr/>
-      </p:nvGrpSpPr>
-      <p:grpSpPr/>
-      <p:sp>
-        <p:nvSpPr>
-          <p:cNvPr id="2" name="Picture Placeholder 1"/>
-          <p:cNvSpPr>
-            <a:spLocks noGrp="1"/>
-          </p:cNvSpPr>
-          <p:nvPr>
             <p:ph type="pic" idx="10" sz="quarter"/>
           </p:nvPr>
         </p:nvSpPr>
@@ -4382,6 +4177,30 @@
           <a:p/>
         </p:txBody>
       </p:sp>
+      <p:pic>
+        <p:nvPicPr>
+          <p:cNvPr id="7" name="Picture 6" descr="eo-framework-logo-real.png"/>
+          <p:cNvPicPr>
+            <a:picLocks noChangeAspect="1"/>
+          </p:cNvPicPr>
+          <p:nvPr/>
+        </p:nvPicPr>
+        <p:blipFill>
+          <a:blip r:embed="rId3"/>
+          <a:stretch>
+            <a:fillRect/>
+          </a:stretch>
+        </p:blipFill>
+        <p:spPr>
+          <a:xfrm>
+            <a:off x="6684264" y="4535424"/>
+            <a:ext cx="2139696" cy="530352"/>
+          </a:xfrm>
+          <a:prstGeom prst="rect">
+            <a:avLst/>
+          </a:prstGeom>
+        </p:spPr>
+      </p:pic>
     </p:spTree>
   </p:cSld>
   <p:clrMapOvr>
@@ -4429,7 +4248,7 @@
           <a:p>
             <a:pPr algn="l"/>
             <a:r>
-              <a:t>Agenda</a:t>
+              <a:t>Executive Summary</a:t>
             </a:r>
           </a:p>
         </p:txBody>
@@ -4452,78 +4271,60 @@
             <a:pPr/>
             <a:r>
               <a:rPr b="1"/>
-              <a:t>Project Summary</a:t>
-            </a:r>
-          </a:p>
-          <a:p>
-            <a:pPr lvl="1"/>
-            <a:r>
-              <a:t>Overview of original objectives and success criteria</a:t>
+              <a:t>Project Duration:</a:t>
+            </a:r>
+            <a:r>
+              <a:t> 18 weeks (on schedule)</a:t>
             </a:r>
           </a:p>
           <a:p>
             <a:pPr/>
             <a:r>
               <a:rPr b="1"/>
-              <a:t>Delivery Achievements</a:t>
-            </a:r>
-          </a:p>
-          <a:p>
-            <a:pPr lvl="1"/>
-            <a:r>
-              <a:t>What was delivered and key milestones reached</a:t>
+              <a:t>Budget:</a:t>
+            </a:r>
+            <a:r>
+              <a:t> $850,000 (on budget, no overruns)</a:t>
             </a:r>
           </a:p>
           <a:p>
             <a:pPr/>
             <a:r>
               <a:rPr b="1"/>
-              <a:t>Benefits Realized</a:t>
-            </a:r>
-          </a:p>
-          <a:p>
-            <a:pPr lvl="1"/>
-            <a:r>
-              <a:t>Quantified business value and ROI metrics</a:t>
+              <a:t>Go-Live Date:</a:t>
+            </a:r>
+            <a:r>
+              <a:t> [DATE] (as planned)</a:t>
             </a:r>
           </a:p>
           <a:p>
             <a:pPr/>
             <a:r>
               <a:rPr b="1"/>
-              <a:t>Lessons Learned</a:t>
-            </a:r>
-          </a:p>
-          <a:p>
-            <a:pPr lvl="1"/>
-            <a:r>
-              <a:t>What went well and challenges overcome</a:t>
+              <a:t>Key Achievement:</a:t>
+            </a:r>
+            <a:r>
+              <a:t> Zero critical defects at production launch</a:t>
             </a:r>
           </a:p>
           <a:p>
             <a:pPr/>
             <a:r>
               <a:rPr b="1"/>
-              <a:t>Recommendations</a:t>
-            </a:r>
-          </a:p>
-          <a:p>
-            <a:pPr lvl="1"/>
-            <a:r>
-              <a:t>Next steps and ongoing support plan</a:t>
+              <a:t>Business Impact:</a:t>
+            </a:r>
+            <a:r>
+              <a:t> 45 hours/week time savings, 92% error reduction</a:t>
             </a:r>
           </a:p>
           <a:p>
             <a:pPr/>
             <a:r>
               <a:rPr b="1"/>
-              <a:t>Team Recognition</a:t>
-            </a:r>
-          </a:p>
-          <a:p>
-            <a:pPr lvl="1"/>
-            <a:r>
-              <a:t>Acknowledgment of key contributors</a:t>
+              <a:t>ROI Status:</a:t>
+            </a:r>
+            <a:r>
+              <a:t> On track for 10-month payback (vs. 12-month target)</a:t>
             </a:r>
           </a:p>
         </p:txBody>
@@ -4602,132 +4403,24 @@
           <a:p>
             <a:pPr algn="l"/>
             <a:r>
-              <a:t>Project Overview</a:t>
-            </a:r>
-          </a:p>
-        </p:txBody>
-      </p:sp>
-      <p:sp>
-        <p:nvSpPr>
-          <p:cNvPr id="4" name="Text Placeholder 3"/>
-          <p:cNvSpPr>
-            <a:spLocks noGrp="1"/>
-          </p:cNvSpPr>
-          <p:nvPr>
-            <p:ph type="body" idx="16" sz="quarter"/>
+              <a:t>Solution Architecture</a:t>
+            </a:r>
+          </a:p>
+        </p:txBody>
+      </p:sp>
+      <p:sp>
+        <p:nvSpPr>
+          <p:cNvPr id="4" name="Picture Placeholder 3"/>
+          <p:cNvSpPr>
+            <a:spLocks noGrp="1"/>
+          </p:cNvSpPr>
+          <p:nvPr>
+            <p:ph type="pic" idx="15" sz="quarter"/>
           </p:nvPr>
         </p:nvSpPr>
         <p:spPr/>
         <p:txBody>
           <a:bodyPr/>
-          <a:lstStyle/>
-          <a:p>
-            <a:pPr/>
-            <a:r>
-              <a:rPr b="1"/>
-              <a:t>Business Problem</a:t>
-            </a:r>
-          </a:p>
-          <a:p>
-            <a:pPr lvl="1"/>
-            <a:r>
-              <a:t>Manual processes causing 40+ hours/week overhead</a:t>
-            </a:r>
-          </a:p>
-          <a:p>
-            <a:pPr lvl="1"/>
-            <a:r>
-              <a:t>Error rates impacting customer satisfaction</a:t>
-            </a:r>
-          </a:p>
-          <a:p>
-            <a:pPr lvl="1"/>
-            <a:r>
-              <a:t>Inability to scale with business growth</a:t>
-            </a:r>
-          </a:p>
-          <a:p>
-            <a:pPr/>
-            <a:r>
-              <a:rPr b="1"/>
-              <a:t>Objectives</a:t>
-            </a:r>
-          </a:p>
-          <a:p>
-            <a:pPr lvl="1"/>
-            <a:r>
-              <a:t>Automate workflows, reduce processing time by 75%</a:t>
-            </a:r>
-          </a:p>
-          <a:p>
-            <a:pPr lvl="1"/>
-            <a:r>
-              <a:t>Achieve 95%+ accuracy in automated processes</a:t>
-            </a:r>
-          </a:p>
-          <a:p>
-            <a:pPr lvl="1"/>
-            <a:r>
-              <a:t>Enable scalability without adding headcount</a:t>
-            </a:r>
-          </a:p>
-        </p:txBody>
-      </p:sp>
-      <p:sp>
-        <p:nvSpPr>
-          <p:cNvPr id="5" name="Text Placeholder 4"/>
-          <p:cNvSpPr>
-            <a:spLocks noGrp="1"/>
-          </p:cNvSpPr>
-          <p:nvPr>
-            <p:ph type="body" idx="17" sz="quarter"/>
-          </p:nvPr>
-        </p:nvSpPr>
-        <p:spPr/>
-        <p:txBody>
-          <a:bodyPr/>
-          <a:lstStyle/>
-          <a:p>
-            <a:pPr/>
-            <a:r>
-              <a:rPr b="1"/>
-              <a:t>Success Criteria</a:t>
-            </a:r>
-          </a:p>
-          <a:p>
-            <a:pPr lvl="1"/>
-            <a:r>
-              <a:t>ROI achieved within 12 months</a:t>
-            </a:r>
-          </a:p>
-          <a:p>
-            <a:pPr lvl="1"/>
-            <a:r>
-              <a:t>User adoption rate of 90%+</a:t>
-            </a:r>
-          </a:p>
-          <a:p>
-            <a:pPr lvl="1"/>
-            <a:r>
-              <a:t>Zero critical defects at go-live</a:t>
-            </a:r>
-          </a:p>
-        </p:txBody>
-      </p:sp>
-      <p:sp>
-        <p:nvSpPr>
-          <p:cNvPr id="6" name="Text Placeholder 5"/>
-          <p:cNvSpPr>
-            <a:spLocks noGrp="1"/>
-          </p:cNvSpPr>
-          <p:nvPr>
-            <p:ph type="body" idx="15" sz="quarter"/>
-          </p:nvPr>
-        </p:nvSpPr>
-        <p:spPr/>
-        <p:txBody>
-          <a:bodyPr/>
-          <a:lstStyle/>
           <a:p>
             <a:pPr algn="r"/>
             <a:r>
@@ -4739,6 +4432,40 @@
               <a:t>Sample Solution</a:t>
             </a:r>
           </a:p>
+        </p:txBody>
+      </p:sp>
+      <p:sp>
+        <p:nvSpPr>
+          <p:cNvPr id="5" name="Text Placeholder 4"/>
+          <p:cNvSpPr>
+            <a:spLocks noGrp="1"/>
+          </p:cNvSpPr>
+          <p:nvPr>
+            <p:ph type="body" idx="16" sz="quarter"/>
+          </p:nvPr>
+        </p:nvSpPr>
+        <p:spPr/>
+        <p:txBody>
+          <a:bodyPr/>
+          <a:lstStyle/>
+          <a:p/>
+        </p:txBody>
+      </p:sp>
+      <p:sp>
+        <p:nvSpPr>
+          <p:cNvPr id="6" name="Text Placeholder 5"/>
+          <p:cNvSpPr>
+            <a:spLocks noGrp="1"/>
+          </p:cNvSpPr>
+          <p:nvPr>
+            <p:ph type="body" idx="17" sz="quarter"/>
+          </p:nvPr>
+        </p:nvSpPr>
+        <p:spPr/>
+        <p:txBody>
+          <a:bodyPr/>
+          <a:lstStyle/>
+          <a:p/>
         </p:txBody>
       </p:sp>
     </p:spTree>
@@ -4788,7 +4515,7 @@
           <a:p>
             <a:pPr algn="l"/>
             <a:r>
-              <a:t>Delivery Summary</a:t>
+              <a:t>Deliverables Inventory</a:t>
             </a:r>
           </a:p>
         </p:txBody>
@@ -4805,7 +4532,7 @@
         </p:nvGraphicFramePr>
         <p:xfrm>
           <a:off x="256855" y="677011"/>
-          <a:ext cx="8710930" cy="1854200"/>
+          <a:ext cx="8710931" cy="3337560"/>
         </p:xfrm>
         <a:graphic>
           <a:graphicData uri="http://schemas.openxmlformats.org/drawingml/2006/table">
@@ -4815,9 +4542,8 @@
               </a:tblPr>
               <a:tblGrid>
                 <a:gridCol w="2613279"/>
-                <a:gridCol w="1742186"/>
-                <a:gridCol w="1742186"/>
-                <a:gridCol w="2613279"/>
+                <a:gridCol w="3919919"/>
+                <a:gridCol w="2177733"/>
               </a:tblGrid>
               <a:tr h="370840">
                 <a:tc>
@@ -4852,7 +4578,7 @@
                             <a:srgbClr val="FFFFFF"/>
                           </a:solidFill>
                         </a:rPr>
-                        <a:t>Planned</a:t>
+                        <a:t>Purpose</a:t>
                       </a:r>
                     </a:p>
                   </a:txBody>
@@ -4873,28 +4599,7 @@
                             <a:srgbClr val="FFFFFF"/>
                           </a:solidFill>
                         </a:rPr>
-                        <a:t>Delivered</a:t>
-                      </a:r>
-                    </a:p>
-                  </a:txBody>
-                  <a:tcPr>
-                    <a:solidFill>
-                      <a:srgbClr val="A01C02"/>
-                    </a:solidFill>
-                  </a:tcPr>
-                </a:tc>
-                <a:tc>
-                  <a:txBody>
-                    <a:bodyPr/>
-                    <a:lstStyle/>
-                    <a:p>
-                      <a:r>
-                        <a:rPr sz="1400">
-                          <a:solidFill>
-                            <a:srgbClr val="FFFFFF"/>
-                          </a:solidFill>
-                        </a:rPr>
-                        <a:t>Status</a:t>
+                        <a:t>Location</a:t>
                       </a:r>
                     </a:p>
                   </a:txBody>
@@ -4913,7 +4618,7 @@
                     <a:p>
                       <a:r>
                         <a:rPr b="1" sz="1100"/>
-                        <a:t>Core Platform</a:t>
+                        <a:t>Detailed Design Document</a:t>
                       </a:r>
                     </a:p>
                   </a:txBody>
@@ -4930,7 +4635,7 @@
                     <a:p>
                       <a:r>
                         <a:rPr sz="1100"/>
-                        <a:t>Week 10</a:t>
+                        <a:t>Architecture decisions, data models, integration specifications</a:t>
                       </a:r>
                     </a:p>
                   </a:txBody>
@@ -4947,24 +4652,7 @@
                     <a:p>
                       <a:r>
                         <a:rPr sz="1100"/>
-                        <a:t>Week 10</a:t>
-                      </a:r>
-                    </a:p>
-                  </a:txBody>
-                  <a:tcPr>
-                    <a:solidFill>
-                      <a:srgbClr val="E7E6E6"/>
-                    </a:solidFill>
-                  </a:tcPr>
-                </a:tc>
-                <a:tc>
-                  <a:txBody>
-                    <a:bodyPr/>
-                    <a:lstStyle/>
-                    <a:p>
-                      <a:r>
-                        <a:rPr sz="1100"/>
-                        <a:t>Complete</a:t>
+                        <a:t>`/delivery/detailed-design.docx`</a:t>
                       </a:r>
                     </a:p>
                   </a:txBody>
@@ -4983,7 +4671,7 @@
                     <a:p>
                       <a:r>
                         <a:rPr b="1" sz="1100"/>
-                        <a:t>Integrations</a:t>
+                        <a:t>Implementation Guide</a:t>
                       </a:r>
                     </a:p>
                   </a:txBody>
@@ -5000,7 +4688,7 @@
                     <a:p>
                       <a:r>
                         <a:rPr sz="1100"/>
-                        <a:t>Week 14</a:t>
+                        <a:t>Step-by-step deployment procedures with validation</a:t>
                       </a:r>
                     </a:p>
                   </a:txBody>
@@ -5017,24 +4705,7 @@
                     <a:p>
                       <a:r>
                         <a:rPr sz="1100"/>
-                        <a:t>Week 13</a:t>
-                      </a:r>
-                    </a:p>
-                  </a:txBody>
-                  <a:tcPr>
-                    <a:solidFill>
-                      <a:srgbClr val="E7E6E6"/>
-                    </a:solidFill>
-                  </a:tcPr>
-                </a:tc>
-                <a:tc>
-                  <a:txBody>
-                    <a:bodyPr/>
-                    <a:lstStyle/>
-                    <a:p>
-                      <a:r>
-                        <a:rPr sz="1100"/>
-                        <a:t>Complete (early)</a:t>
+                        <a:t>`/delivery/implementation-guide.docx`</a:t>
                       </a:r>
                     </a:p>
                   </a:txBody>
@@ -5053,7 +4724,7 @@
                     <a:p>
                       <a:r>
                         <a:rPr b="1" sz="1100"/>
-                        <a:t>Training</a:t>
+                        <a:t>Project Plan</a:t>
                       </a:r>
                     </a:p>
                   </a:txBody>
@@ -5070,7 +4741,7 @@
                     <a:p>
                       <a:r>
                         <a:rPr sz="1100"/>
-                        <a:t>Week 16</a:t>
+                        <a:t>Timeline, milestones, resource allocation</a:t>
                       </a:r>
                     </a:p>
                   </a:txBody>
@@ -5087,24 +4758,7 @@
                     <a:p>
                       <a:r>
                         <a:rPr sz="1100"/>
-                        <a:t>Week 16</a:t>
-                      </a:r>
-                    </a:p>
-                  </a:txBody>
-                  <a:tcPr>
-                    <a:solidFill>
-                      <a:srgbClr val="E7E6E6"/>
-                    </a:solidFill>
-                  </a:tcPr>
-                </a:tc>
-                <a:tc>
-                  <a:txBody>
-                    <a:bodyPr/>
-                    <a:lstStyle/>
-                    <a:p>
-                      <a:r>
-                        <a:rPr sz="1100"/>
-                        <a:t>Complete</a:t>
+                        <a:t>`/delivery/project-plan.xlsx`</a:t>
                       </a:r>
                     </a:p>
                   </a:txBody>
@@ -5123,7 +4777,7 @@
                     <a:p>
                       <a:r>
                         <a:rPr b="1" sz="1100"/>
-                        <a:t>Go-Live</a:t>
+                        <a:t>Test Plan &amp; Results</a:t>
                       </a:r>
                     </a:p>
                   </a:txBody>
@@ -5140,7 +4794,7 @@
                     <a:p>
                       <a:r>
                         <a:rPr sz="1100"/>
-                        <a:t>Week 18</a:t>
+                        <a:t>Test cases, execution results, quality metrics</a:t>
                       </a:r>
                     </a:p>
                   </a:txBody>
@@ -5157,7 +4811,26 @@
                     <a:p>
                       <a:r>
                         <a:rPr sz="1100"/>
-                        <a:t>Week 18</a:t>
+                        <a:t>`/delivery/test-plan.xlsx`</a:t>
+                      </a:r>
+                    </a:p>
+                  </a:txBody>
+                  <a:tcPr>
+                    <a:solidFill>
+                      <a:srgbClr val="E7E6E6"/>
+                    </a:solidFill>
+                  </a:tcPr>
+                </a:tc>
+              </a:tr>
+              <a:tr h="370840">
+                <a:tc>
+                  <a:txBody>
+                    <a:bodyPr/>
+                    <a:lstStyle/>
+                    <a:p>
+                      <a:r>
+                        <a:rPr b="1" sz="1100"/>
+                        <a:t>Terraform Modules</a:t>
                       </a:r>
                     </a:p>
                   </a:txBody>
@@ -5174,7 +4847,183 @@
                     <a:p>
                       <a:r>
                         <a:rPr sz="1100"/>
-                        <a:t>Complete</a:t>
+                        <a:t>Infrastructure as Code for all cloud resources</a:t>
+                      </a:r>
+                    </a:p>
+                  </a:txBody>
+                  <a:tcPr>
+                    <a:solidFill>
+                      <a:srgbClr val="E7E6E6"/>
+                    </a:solidFill>
+                  </a:tcPr>
+                </a:tc>
+                <a:tc>
+                  <a:txBody>
+                    <a:bodyPr/>
+                    <a:lstStyle/>
+                    <a:p>
+                      <a:r>
+                        <a:rPr sz="1100"/>
+                        <a:t>`/delivery/scripts/terraform/`</a:t>
+                      </a:r>
+                    </a:p>
+                  </a:txBody>
+                  <a:tcPr>
+                    <a:solidFill>
+                      <a:srgbClr val="E7E6E6"/>
+                    </a:solidFill>
+                  </a:tcPr>
+                </a:tc>
+              </a:tr>
+              <a:tr h="370840">
+                <a:tc>
+                  <a:txBody>
+                    <a:bodyPr/>
+                    <a:lstStyle/>
+                    <a:p>
+                      <a:r>
+                        <a:rPr b="1" sz="1100"/>
+                        <a:t>Ansible Playbooks</a:t>
+                      </a:r>
+                    </a:p>
+                  </a:txBody>
+                  <a:tcPr>
+                    <a:solidFill>
+                      <a:srgbClr val="E7E6E6"/>
+                    </a:solidFill>
+                  </a:tcPr>
+                </a:tc>
+                <a:tc>
+                  <a:txBody>
+                    <a:bodyPr/>
+                    <a:lstStyle/>
+                    <a:p>
+                      <a:r>
+                        <a:rPr sz="1100"/>
+                        <a:t>Configuration management and application deployment</a:t>
+                      </a:r>
+                    </a:p>
+                  </a:txBody>
+                  <a:tcPr>
+                    <a:solidFill>
+                      <a:srgbClr val="E7E6E6"/>
+                    </a:solidFill>
+                  </a:tcPr>
+                </a:tc>
+                <a:tc>
+                  <a:txBody>
+                    <a:bodyPr/>
+                    <a:lstStyle/>
+                    <a:p>
+                      <a:r>
+                        <a:rPr sz="1100"/>
+                        <a:t>`/delivery/scripts/ansible/`</a:t>
+                      </a:r>
+                    </a:p>
+                  </a:txBody>
+                  <a:tcPr>
+                    <a:solidFill>
+                      <a:srgbClr val="E7E6E6"/>
+                    </a:solidFill>
+                  </a:tcPr>
+                </a:tc>
+              </a:tr>
+              <a:tr h="370840">
+                <a:tc>
+                  <a:txBody>
+                    <a:bodyPr/>
+                    <a:lstStyle/>
+                    <a:p>
+                      <a:r>
+                        <a:rPr b="1" sz="1100"/>
+                        <a:t>Runbook &amp; SOPs</a:t>
+                      </a:r>
+                    </a:p>
+                  </a:txBody>
+                  <a:tcPr>
+                    <a:solidFill>
+                      <a:srgbClr val="E7E6E6"/>
+                    </a:solidFill>
+                  </a:tcPr>
+                </a:tc>
+                <a:tc>
+                  <a:txBody>
+                    <a:bodyPr/>
+                    <a:lstStyle/>
+                    <a:p>
+                      <a:r>
+                        <a:rPr sz="1100"/>
+                        <a:t>Operational procedures for day-2 operations</a:t>
+                      </a:r>
+                    </a:p>
+                  </a:txBody>
+                  <a:tcPr>
+                    <a:solidFill>
+                      <a:srgbClr val="E7E6E6"/>
+                    </a:solidFill>
+                  </a:tcPr>
+                </a:tc>
+                <a:tc>
+                  <a:txBody>
+                    <a:bodyPr/>
+                    <a:lstStyle/>
+                    <a:p>
+                      <a:r>
+                        <a:rPr sz="1100"/>
+                        <a:t>`/delivery/runbook.docx`</a:t>
+                      </a:r>
+                    </a:p>
+                  </a:txBody>
+                  <a:tcPr>
+                    <a:solidFill>
+                      <a:srgbClr val="E7E6E6"/>
+                    </a:solidFill>
+                  </a:tcPr>
+                </a:tc>
+              </a:tr>
+              <a:tr h="370840">
+                <a:tc>
+                  <a:txBody>
+                    <a:bodyPr/>
+                    <a:lstStyle/>
+                    <a:p>
+                      <a:r>
+                        <a:rPr b="1" sz="1100"/>
+                        <a:t>Training Materials</a:t>
+                      </a:r>
+                    </a:p>
+                  </a:txBody>
+                  <a:tcPr>
+                    <a:solidFill>
+                      <a:srgbClr val="E7E6E6"/>
+                    </a:solidFill>
+                  </a:tcPr>
+                </a:tc>
+                <a:tc>
+                  <a:txBody>
+                    <a:bodyPr/>
+                    <a:lstStyle/>
+                    <a:p>
+                      <a:r>
+                        <a:rPr sz="1100"/>
+                        <a:t>User guides, admin guides, video tutorials</a:t>
+                      </a:r>
+                    </a:p>
+                  </a:txBody>
+                  <a:tcPr>
+                    <a:solidFill>
+                      <a:srgbClr val="E7E6E6"/>
+                    </a:solidFill>
+                  </a:tcPr>
+                </a:tc>
+                <a:tc>
+                  <a:txBody>
+                    <a:bodyPr/>
+                    <a:lstStyle/>
+                    <a:p>
+                      <a:r>
+                        <a:rPr sz="1100"/>
+                        <a:t>`/delivery/training/`</a:t>
                       </a:r>
                     </a:p>
                   </a:txBody>
@@ -5241,7 +5090,7 @@
             <a:spLocks noGrp="1"/>
           </p:cNvSpPr>
           <p:nvPr>
-            <p:ph type="pic" idx="13" sz="quarter"/>
+            <p:ph type="pic" idx="14" sz="quarter"/>
           </p:nvPr>
         </p:nvSpPr>
         <p:spPr/>
@@ -5263,7 +5112,7 @@
           <a:p>
             <a:pPr algn="l"/>
             <a:r>
-              <a:t>Quality Metrics</a:t>
+              <a:t>Quality &amp; Performance</a:t>
             </a:r>
           </a:p>
         </p:txBody>
@@ -5275,7 +5124,7 @@
             <a:spLocks noGrp="1"/>
           </p:cNvSpPr>
           <p:nvPr>
-            <p:ph type="body" idx="14" sz="quarter"/>
+            <p:ph type="body" idx="16" sz="quarter"/>
           </p:nvPr>
         </p:nvSpPr>
         <p:spPr/>
@@ -5286,72 +5135,85 @@
             <a:pPr/>
             <a:r>
               <a:rPr b="1"/>
-              <a:t>Test Coverage</a:t>
+              <a:t>Testing Metrics</a:t>
             </a:r>
           </a:p>
           <a:p>
             <a:pPr lvl="1"/>
             <a:r>
-              <a:t>94% code coverage achieved (target: 80%)</a:t>
-            </a:r>
-          </a:p>
+              <a:t>Test Coverage: 94% (target: 80%)</a:t>
+            </a:r>
+          </a:p>
+          <a:p>
+            <a:pPr lvl="1"/>
+            <a:r>
+              <a:t>Test Cases Executed: 847/847 (100%)</a:t>
+            </a:r>
+          </a:p>
+          <a:p>
+            <a:pPr lvl="1"/>
+            <a:r>
+              <a:t>Critical Defects at Go-Live: 0</a:t>
+            </a:r>
+          </a:p>
+          <a:p>
+            <a:pPr lvl="1"/>
+            <a:r>
+              <a:t>Defect Escape Rate: 0.2% (target: &lt;2%)</a:t>
+            </a:r>
+          </a:p>
+        </p:txBody>
+      </p:sp>
+      <p:sp>
+        <p:nvSpPr>
+          <p:cNvPr id="5" name="Text Placeholder 4"/>
+          <p:cNvSpPr>
+            <a:spLocks noGrp="1"/>
+          </p:cNvSpPr>
+          <p:nvPr>
+            <p:ph type="body" idx="17" sz="quarter"/>
+          </p:nvPr>
+        </p:nvSpPr>
+        <p:spPr/>
+        <p:txBody>
+          <a:bodyPr/>
+          <a:lstStyle/>
           <a:p>
             <a:pPr/>
             <a:r>
               <a:rPr b="1"/>
-              <a:t>Test Execution</a:t>
+              <a:t>Performance Metrics</a:t>
             </a:r>
           </a:p>
           <a:p>
             <a:pPr lvl="1"/>
             <a:r>
-              <a:t>847 of 847 test cases executed (100%)</a:t>
-            </a:r>
-          </a:p>
-          <a:p>
-            <a:pPr/>
-            <a:r>
-              <a:rPr b="1"/>
-              <a:t>Defect Performance</a:t>
+              <a:t>System Uptime: 99.97% (target: 99.9%)</a:t>
             </a:r>
           </a:p>
           <a:p>
             <a:pPr lvl="1"/>
             <a:r>
-              <a:t>Zero critical defects at go-live</a:t>
-            </a:r>
-          </a:p>
-          <a:p>
-            <a:pPr/>
-            <a:r>
-              <a:rPr b="1"/>
-              <a:t>System Uptime</a:t>
+              <a:t>Average Response Time: 1.2s (target: &lt;2s)</a:t>
             </a:r>
           </a:p>
           <a:p>
             <a:pPr lvl="1"/>
             <a:r>
-              <a:t>99.97% availability (target: 99.9%)</a:t>
-            </a:r>
-          </a:p>
-          <a:p>
-            <a:pPr/>
-            <a:r>
-              <a:rPr b="1"/>
-              <a:t>Response Time</a:t>
+              <a:t>Peak Load Handling: 12,000 users (target: 10,000)</a:t>
             </a:r>
           </a:p>
           <a:p>
             <a:pPr lvl="1"/>
             <a:r>
-              <a:t>1.2 seconds average (target: 2 seconds)</a:t>
-            </a:r>
-          </a:p>
-        </p:txBody>
-      </p:sp>
-      <p:sp>
-        <p:nvSpPr>
-          <p:cNvPr id="5" name="Text Placeholder 4"/>
+              <a:t>Database Query Performance: 45ms avg (target: &lt;100ms)</a:t>
+            </a:r>
+          </a:p>
+        </p:txBody>
+      </p:sp>
+      <p:sp>
+        <p:nvSpPr>
+          <p:cNvPr id="6" name="Text Placeholder 5"/>
           <p:cNvSpPr>
             <a:spLocks noGrp="1"/>
           </p:cNvSpPr>
@@ -5440,7 +5302,7 @@
         </p:nvGraphicFramePr>
         <p:xfrm>
           <a:off x="256855" y="677011"/>
-          <a:ext cx="8710931" cy="1854200"/>
+          <a:ext cx="8710930" cy="2595880"/>
         </p:xfrm>
         <a:graphic>
           <a:graphicData uri="http://schemas.openxmlformats.org/drawingml/2006/table">
@@ -5451,8 +5313,8 @@
               <a:tblGrid>
                 <a:gridCol w="2613279"/>
                 <a:gridCol w="1742186"/>
-                <a:gridCol w="2177733"/>
-                <a:gridCol w="2177733"/>
+                <a:gridCol w="1742186"/>
+                <a:gridCol w="2613279"/>
               </a:tblGrid>
               <a:tr h="370840">
                 <a:tc>
@@ -5529,7 +5391,7 @@
                             <a:srgbClr val="FFFFFF"/>
                           </a:solidFill>
                         </a:rPr>
-                        <a:t>Status</a:t>
+                        <a:t>Impact</a:t>
                       </a:r>
                     </a:p>
                   </a:txBody>
@@ -5548,7 +5410,7 @@
                     <a:p>
                       <a:r>
                         <a:rPr b="1" sz="1100"/>
-                        <a:t>Time Savings</a:t>
+                        <a:t>Weekly Time Savings</a:t>
                       </a:r>
                     </a:p>
                   </a:txBody>
@@ -5565,7 +5427,7 @@
                     <a:p>
                       <a:r>
                         <a:rPr sz="1100"/>
-                        <a:t>40 hrs/week</a:t>
+                        <a:t>40 hours</a:t>
                       </a:r>
                     </a:p>
                   </a:txBody>
@@ -5582,7 +5444,7 @@
                     <a:p>
                       <a:r>
                         <a:rPr sz="1100"/>
-                        <a:t>45 hrs/week</a:t>
+                        <a:t>45 hours</a:t>
                       </a:r>
                     </a:p>
                   </a:txBody>
@@ -5599,7 +5461,7 @@
                     <a:p>
                       <a:r>
                         <a:rPr sz="1100"/>
-                        <a:t>Exceeded</a:t>
+                        <a:t>5 FTEs reallocated to strategic work</a:t>
                       </a:r>
                     </a:p>
                   </a:txBody>
@@ -5669,7 +5531,7 @@
                     <a:p>
                       <a:r>
                         <a:rPr sz="1100"/>
-                        <a:t>Exceeded</a:t>
+                        <a:t>Customer complaints down 85%</a:t>
                       </a:r>
                     </a:p>
                   </a:txBody>
@@ -5739,7 +5601,7 @@
                     <a:p>
                       <a:r>
                         <a:rPr sz="1100"/>
-                        <a:t>Exceeded</a:t>
+                        <a:t>Same-day resolution now standard</a:t>
                       </a:r>
                     </a:p>
                   </a:txBody>
@@ -5758,7 +5620,7 @@
                     <a:p>
                       <a:r>
                         <a:rPr b="1" sz="1100"/>
-                        <a:t>Annual Savings</a:t>
+                        <a:t>Annual Cost Savings</a:t>
                       </a:r>
                     </a:p>
                   </a:txBody>
@@ -5809,7 +5671,147 @@
                     <a:p>
                       <a:r>
                         <a:rPr sz="1100"/>
-                        <a:t>On Track</a:t>
+                        <a:t>ROI in 10 months vs 12-month target</a:t>
+                      </a:r>
+                    </a:p>
+                  </a:txBody>
+                  <a:tcPr>
+                    <a:solidFill>
+                      <a:srgbClr val="E7E6E6"/>
+                    </a:solidFill>
+                  </a:tcPr>
+                </a:tc>
+              </a:tr>
+              <a:tr h="370840">
+                <a:tc>
+                  <a:txBody>
+                    <a:bodyPr/>
+                    <a:lstStyle/>
+                    <a:p>
+                      <a:r>
+                        <a:rPr b="1" sz="1100"/>
+                        <a:t>User Adoption</a:t>
+                      </a:r>
+                    </a:p>
+                  </a:txBody>
+                  <a:tcPr>
+                    <a:solidFill>
+                      <a:srgbClr val="E7E6E6"/>
+                    </a:solidFill>
+                  </a:tcPr>
+                </a:tc>
+                <a:tc>
+                  <a:txBody>
+                    <a:bodyPr/>
+                    <a:lstStyle/>
+                    <a:p>
+                      <a:r>
+                        <a:rPr sz="1100"/>
+                        <a:t>90%</a:t>
+                      </a:r>
+                    </a:p>
+                  </a:txBody>
+                  <a:tcPr>
+                    <a:solidFill>
+                      <a:srgbClr val="E7E6E6"/>
+                    </a:solidFill>
+                  </a:tcPr>
+                </a:tc>
+                <a:tc>
+                  <a:txBody>
+                    <a:bodyPr/>
+                    <a:lstStyle/>
+                    <a:p>
+                      <a:r>
+                        <a:rPr sz="1100"/>
+                        <a:t>95%</a:t>
+                      </a:r>
+                    </a:p>
+                  </a:txBody>
+                  <a:tcPr>
+                    <a:solidFill>
+                      <a:srgbClr val="E7E6E6"/>
+                    </a:solidFill>
+                  </a:tcPr>
+                </a:tc>
+                <a:tc>
+                  <a:txBody>
+                    <a:bodyPr/>
+                    <a:lstStyle/>
+                    <a:p>
+                      <a:r>
+                        <a:rPr sz="1100"/>
+                        <a:t>Exceeded adoption targets</a:t>
+                      </a:r>
+                    </a:p>
+                  </a:txBody>
+                  <a:tcPr>
+                    <a:solidFill>
+                      <a:srgbClr val="E7E6E6"/>
+                    </a:solidFill>
+                  </a:tcPr>
+                </a:tc>
+              </a:tr>
+              <a:tr h="370840">
+                <a:tc>
+                  <a:txBody>
+                    <a:bodyPr/>
+                    <a:lstStyle/>
+                    <a:p>
+                      <a:r>
+                        <a:rPr b="1" sz="1100"/>
+                        <a:t>Customer Satisfaction</a:t>
+                      </a:r>
+                    </a:p>
+                  </a:txBody>
+                  <a:tcPr>
+                    <a:solidFill>
+                      <a:srgbClr val="E7E6E6"/>
+                    </a:solidFill>
+                  </a:tcPr>
+                </a:tc>
+                <a:tc>
+                  <a:txBody>
+                    <a:bodyPr/>
+                    <a:lstStyle/>
+                    <a:p>
+                      <a:r>
+                        <a:rPr sz="1100"/>
+                        <a:t>4.0/5.0</a:t>
+                      </a:r>
+                    </a:p>
+                  </a:txBody>
+                  <a:tcPr>
+                    <a:solidFill>
+                      <a:srgbClr val="E7E6E6"/>
+                    </a:solidFill>
+                  </a:tcPr>
+                </a:tc>
+                <a:tc>
+                  <a:txBody>
+                    <a:bodyPr/>
+                    <a:lstStyle/>
+                    <a:p>
+                      <a:r>
+                        <a:rPr sz="1100"/>
+                        <a:t>4.6/5.0</a:t>
+                      </a:r>
+                    </a:p>
+                  </a:txBody>
+                  <a:tcPr>
+                    <a:solidFill>
+                      <a:srgbClr val="E7E6E6"/>
+                    </a:solidFill>
+                  </a:tcPr>
+                </a:tc>
+                <a:tc>
+                  <a:txBody>
+                    <a:bodyPr/>
+                    <a:lstStyle/>
+                    <a:p>
+                      <a:r>
+                        <a:rPr sz="1100"/>
+                        <a:t>NPS increased by 25 points</a:t>
                       </a:r>
                     </a:p>
                   </a:txBody>
@@ -5898,7 +5900,7 @@
           <a:p>
             <a:pPr algn="l"/>
             <a:r>
-              <a:t>Lessons Learned</a:t>
+              <a:t>Lessons Learned &amp; Recommendations</a:t>
             </a:r>
           </a:p>
         </p:txBody>
@@ -5921,31 +5923,37 @@
             <a:pPr/>
             <a:r>
               <a:rPr b="1"/>
-              <a:t>What Went Well</a:t>
+              <a:t>What Worked Well</a:t>
             </a:r>
           </a:p>
           <a:p>
             <a:pPr lvl="1"/>
             <a:r>
-              <a:t>Early stakeholder engagement drove alignment</a:t>
+              <a:t>Early stakeholder engagement ensured alignment throughout</a:t>
             </a:r>
           </a:p>
           <a:p>
             <a:pPr lvl="1"/>
             <a:r>
-              <a:t>Agile methodology enabled rapid iteration</a:t>
+              <a:t>Agile methodology enabled rapid iteration and feedback</a:t>
             </a:r>
           </a:p>
           <a:p>
             <a:pPr lvl="1"/>
             <a:r>
-              <a:t>Strong vendor partnership accelerated delivery</a:t>
+              <a:t>Infrastructure as Code reduced deployment errors to zero</a:t>
             </a:r>
           </a:p>
           <a:p>
             <a:pPr lvl="1"/>
             <a:r>
-              <a:t>Comprehensive testing prevented production issues</a:t>
+              <a:t>Comprehensive testing prevented production incidents</a:t>
+            </a:r>
+          </a:p>
+          <a:p>
+            <a:pPr lvl="1"/>
+            <a:r>
+              <a:t>Weekly demos kept business engaged and informed</a:t>
             </a:r>
           </a:p>
           <a:p>
@@ -5958,19 +5966,19 @@
           <a:p>
             <a:pPr lvl="1"/>
             <a:r>
-              <a:t>Legacy data migration resolved with phased approach</a:t>
+              <a:t>Legacy data migration: Resolved with phased approach</a:t>
             </a:r>
           </a:p>
           <a:p>
             <a:pPr lvl="1"/>
             <a:r>
-              <a:t>User adoption concerns addressed with enhanced training</a:t>
+              <a:t>User adoption concerns: Enhanced training program</a:t>
             </a:r>
           </a:p>
           <a:p>
             <a:pPr lvl="1"/>
             <a:r>
-              <a:t>Integration complexity solved with middleware solution</a:t>
+              <a:t>Integration complexity: Middleware abstraction layer</a:t>
             </a:r>
           </a:p>
         </p:txBody>
@@ -5993,25 +6001,37 @@
             <a:pPr/>
             <a:r>
               <a:rPr b="1"/>
-              <a:t>Recommendations for Future</a:t>
+              <a:t>Recommendations</a:t>
             </a:r>
           </a:p>
           <a:p>
             <a:pPr lvl="1"/>
             <a:r>
-              <a:t>Invest more in change management upfront</a:t>
+              <a:t>Invest in Phase 2 enhancements based on user feedback</a:t>
             </a:r>
           </a:p>
           <a:p>
             <a:pPr lvl="1"/>
             <a:r>
-              <a:t>Allocate additional time for data migration</a:t>
+              <a:t>Implement AI/ML features for predictive analytics</a:t>
             </a:r>
           </a:p>
           <a:p>
             <a:pPr lvl="1"/>
             <a:r>
-              <a:t>Include super-users in testing earlier</a:t>
+              <a:t>Expand mobile capabilities for field workforce</a:t>
+            </a:r>
+          </a:p>
+          <a:p>
+            <a:pPr lvl="1"/>
+            <a:r>
+              <a:t>Establish quarterly business reviews to track ROI</a:t>
+            </a:r>
+          </a:p>
+          <a:p>
+            <a:pPr lvl="1"/>
+            <a:r>
+              <a:t>Consider disaster recovery site in secondary region</a:t>
             </a:r>
           </a:p>
         </p:txBody>
@@ -6090,7 +6110,7 @@
           <a:p>
             <a:pPr algn="l"/>
             <a:r>
-              <a:t>Recommendations</a:t>
+              <a:t>Support Transition</a:t>
             </a:r>
           </a:p>
         </p:txBody>
@@ -6113,76 +6133,106 @@
             <a:pPr/>
             <a:r>
               <a:rPr b="1"/>
-              <a:t>Immediate (This Month)</a:t>
+              <a:t>Hypercare Period (Days 1-30)</a:t>
             </a:r>
           </a:p>
           <a:p>
             <a:pPr lvl="1"/>
             <a:r>
-              <a:t>Establish monthly performance review cadence</a:t>
+              <a:t>Dedicated support team available 24/7</a:t>
             </a:r>
           </a:p>
           <a:p>
             <a:pPr lvl="1"/>
             <a:r>
-              <a:t>Complete operational handover documentation</a:t>
+              <a:t>Daily standup calls at 9:00 AM for issue triage</a:t>
+            </a:r>
+          </a:p>
+          <a:p>
+            <a:pPr lvl="1"/>
+            <a:r>
+              <a:t>4-hour response SLA for critical issues</a:t>
+            </a:r>
+          </a:p>
+          <a:p>
+            <a:pPr lvl="1"/>
+            <a:r>
+              <a:t>Direct escalation path to implementation team</a:t>
             </a:r>
           </a:p>
           <a:p>
             <a:pPr/>
             <a:r>
               <a:rPr b="1"/>
-              <a:t>Short-term (Next Quarter)</a:t>
+              <a:t>Transition Period (Days 31-60)</a:t>
             </a:r>
           </a:p>
           <a:p>
             <a:pPr lvl="1"/>
             <a:r>
-              <a:t>Plan Phase 2 enhancements based on user feedback</a:t>
+              <a:t>Shift to standard support model with 8-hour response SLA</a:t>
             </a:r>
           </a:p>
           <a:p>
             <a:pPr lvl="1"/>
             <a:r>
-              <a:t>Implement quick-win features from backlog</a:t>
+              <a:t>Weekly check-in calls transitioning to bi-weekly</a:t>
+            </a:r>
+          </a:p>
+          <a:p>
+            <a:pPr lvl="1"/>
+            <a:r>
+              <a:t>Knowledge transfer sessions for operations team</a:t>
             </a:r>
           </a:p>
           <a:p>
             <a:pPr/>
             <a:r>
               <a:rPr b="1"/>
-              <a:t>Long-term (Next Year)</a:t>
+              <a:t>Steady State (Day 61+)</a:t>
             </a:r>
           </a:p>
           <a:p>
             <a:pPr lvl="1"/>
             <a:r>
-              <a:t>Evaluate mobile app extension opportunity</a:t>
+              <a:t>Monthly performance review meetings</a:t>
             </a:r>
           </a:p>
           <a:p>
             <a:pPr lvl="1"/>
             <a:r>
-              <a:t>Consider AI/ML enhancements for automation</a:t>
+              <a:t>Quarterly business reviews for benefits tracking</a:t>
+            </a:r>
+          </a:p>
+          <a:p>
+            <a:pPr lvl="1"/>
+            <a:r>
+              <a:t>Enhancement backlog with 15 prioritized features</a:t>
             </a:r>
           </a:p>
           <a:p>
             <a:pPr/>
             <a:r>
               <a:rPr b="1"/>
-              <a:t>Operational</a:t>
+              <a:t>Escalation Contacts</a:t>
             </a:r>
           </a:p>
           <a:p>
             <a:pPr lvl="1"/>
             <a:r>
-              <a:t>Maintain dedicated support for 90 days (hypercare)</a:t>
+              <a:t>L1 Support: support@company.com | 555-HELP</a:t>
             </a:r>
           </a:p>
           <a:p>
             <a:pPr lvl="1"/>
             <a:r>
-              <a:t>15 enhancement features prioritized in backlog</a:t>
+              <a:t>L2 Technical: techsupport@company.com</a:t>
+            </a:r>
+          </a:p>
+          <a:p>
+            <a:pPr lvl="1"/>
+            <a:r>
+              <a:t>Account Manager: am@company.com | 555-123-4567</a:t>
             </a:r>
           </a:p>
         </p:txBody>
@@ -6261,7 +6311,7 @@
           <a:p>
             <a:pPr algn="l"/>
             <a:r>
-              <a:t>Team Recognition</a:t>
+              <a:t>Acknowledgments &amp; Next Steps</a:t>
             </a:r>
           </a:p>
         </p:txBody>
@@ -6283,81 +6333,65 @@
           <a:p>
             <a:pPr/>
             <a:r>
+              <a:t>Executive sponsors for unwavering support and decisive leadership</a:t>
+            </a:r>
+          </a:p>
+          <a:p>
+            <a:pPr/>
+            <a:r>
+              <a:t>Business stakeholders for clear requirements and timely feedback</a:t>
+            </a:r>
+          </a:p>
+          <a:p>
+            <a:pPr/>
+            <a:r>
+              <a:t>Technical teams for exceptional delivery quality and problem-solving</a:t>
+            </a:r>
+          </a:p>
+          <a:p>
+            <a:pPr/>
+            <a:r>
+              <a:t>Change management team for driving 95% user adoption</a:t>
+            </a:r>
+          </a:p>
+          <a:p>
+            <a:pPr/>
+            <a:r>
               <a:rPr b="1"/>
-              <a:t>Solution Architect:</a:t>
-            </a:r>
-            <a:r>
-              <a:t> Jane Smith</a:t>
-            </a:r>
-          </a:p>
-          <a:p>
-            <a:pPr lvl="1"/>
-            <a:r>
-              <a:t>Outstanding technical leadership and architecture decisions</a:t>
+              <a:t>This Week:</a:t>
+            </a:r>
+            <a:r>
+              <a:t> Final documentation handover and knowledge transfer completion</a:t>
             </a:r>
           </a:p>
           <a:p>
             <a:pPr/>
             <a:r>
               <a:rPr b="1"/>
-              <a:t>Technical Lead:</a:t>
-            </a:r>
-            <a:r>
-              <a:t> John Doe</a:t>
-            </a:r>
-          </a:p>
-          <a:p>
-            <a:pPr lvl="1"/>
-            <a:r>
-              <a:t>Exceptional delivery quality and team mentorship</a:t>
+              <a:t>Next 30 Days:</a:t>
+            </a:r>
+            <a:r>
+              <a:t> Hypercare support with daily standups</a:t>
             </a:r>
           </a:p>
           <a:p>
             <a:pPr/>
             <a:r>
               <a:rPr b="1"/>
-              <a:t>Business Analyst:</a:t>
-            </a:r>
-            <a:r>
-              <a:t> Sarah Johnson</a:t>
-            </a:r>
-          </a:p>
-          <a:p>
-            <a:pPr lvl="1"/>
-            <a:r>
-              <a:t>Stakeholder alignment and requirements excellence</a:t>
+              <a:t>Next Quarter:</a:t>
+            </a:r>
+            <a:r>
+              <a:t> Phase 2 planning workshop and enhancement prioritization</a:t>
             </a:r>
           </a:p>
           <a:p>
             <a:pPr/>
             <a:r>
               <a:rPr b="1"/>
-              <a:t>QA Lead:</a:t>
-            </a:r>
-            <a:r>
-              <a:t> Mike Wilson</a:t>
-            </a:r>
-          </a:p>
-          <a:p>
-            <a:pPr lvl="1"/>
-            <a:r>
-              <a:t>Zero defects achievement through rigorous testing</a:t>
-            </a:r>
-          </a:p>
-          <a:p>
-            <a:pPr/>
-            <a:r>
-              <a:rPr b="1"/>
-              <a:t>DevOps Engineer:</a:t>
-            </a:r>
-            <a:r>
-              <a:t> Lisa Chen</a:t>
-            </a:r>
-          </a:p>
-          <a:p>
-            <a:pPr lvl="1"/>
-            <a:r>
-              <a:t>Flawless deployments and infrastructure automation</a:t>
+              <a:t>Ongoing:</a:t>
+            </a:r>
+            <a:r>
+              <a:t> Monthly performance reviews and quarterly business reviews</a:t>
             </a:r>
           </a:p>
         </p:txBody>

</xml_diff>

<commit_message>
Fix closeout presentation slide formatting issues
- Executive Summary: Changed to eo_bullet_points, max 7 items
- Solution Architecture: Fixed image path to assets/diagrams/
- Lessons & Recommendations: Reduced to 3 bullets per column,
  max 4 sub-items each, all under 46 characters
- Footer: Removed bullet point from solution name
</commit_message>
<xml_diff>
--- a/solution-template/sample-provider/sample-category/sample-solution/delivery/closeout-presentation.pptx
+++ b/solution-template/sample-provider/sample-category/sample-solution/delivery/closeout-presentation.pptx
@@ -4274,7 +4274,7 @@
               <a:t>Project Duration:</a:t>
             </a:r>
             <a:r>
-              <a:t> 18 weeks (on schedule)</a:t>
+              <a:t> 18 weeks, on schedule</a:t>
             </a:r>
           </a:p>
           <a:p>
@@ -4284,7 +4284,7 @@
               <a:t>Budget:</a:t>
             </a:r>
             <a:r>
-              <a:t> $850,000 (on budget, no overruns)</a:t>
+              <a:t> $850K delivered on budget</a:t>
             </a:r>
           </a:p>
           <a:p>
@@ -4294,27 +4294,37 @@
               <a:t>Go-Live Date:</a:t>
             </a:r>
             <a:r>
-              <a:t> [DATE] (as planned)</a:t>
+              <a:t> [DATE] as planned</a:t>
             </a:r>
           </a:p>
           <a:p>
             <a:pPr/>
             <a:r>
               <a:rPr b="1"/>
-              <a:t>Key Achievement:</a:t>
-            </a:r>
-            <a:r>
-              <a:t> Zero critical defects at production launch</a:t>
+              <a:t>Quality:</a:t>
+            </a:r>
+            <a:r>
+              <a:t> Zero critical defects at launch</a:t>
             </a:r>
           </a:p>
           <a:p>
             <a:pPr/>
             <a:r>
               <a:rPr b="1"/>
-              <a:t>Business Impact:</a:t>
-            </a:r>
-            <a:r>
-              <a:t> 45 hours/week time savings, 92% error reduction</a:t>
+              <a:t>Time Savings:</a:t>
+            </a:r>
+            <a:r>
+              <a:t> 45 hours/week automated</a:t>
+            </a:r>
+          </a:p>
+          <a:p>
+            <a:pPr/>
+            <a:r>
+              <a:rPr b="1"/>
+              <a:t>Error Reduction:</a:t>
+            </a:r>
+            <a:r>
+              <a:t> 92% fewer manual errors</a:t>
             </a:r>
           </a:p>
           <a:p>
@@ -4324,7 +4334,7 @@
               <a:t>ROI Status:</a:t>
             </a:r>
             <a:r>
-              <a:t> On track for 10-month payback (vs. 12-month target)</a:t>
+              <a:t> 10-month payback on track</a:t>
             </a:r>
           </a:p>
         </p:txBody>
@@ -4344,7 +4354,9 @@
           <a:bodyPr/>
           <a:lstStyle/>
           <a:p>
-            <a:pPr algn="r"/>
+            <a:pPr algn="r">
+              <a:buNone/>
+            </a:pPr>
             <a:r>
               <a:rPr sz="1100">
                 <a:solidFill>
@@ -4422,7 +4434,9 @@
         <p:txBody>
           <a:bodyPr/>
           <a:p>
-            <a:pPr algn="r"/>
+            <a:pPr algn="r">
+              <a:buNone/>
+            </a:pPr>
             <a:r>
               <a:rPr sz="1100">
                 <a:solidFill>
@@ -5053,7 +5067,9 @@
           <a:bodyPr/>
           <a:lstStyle/>
           <a:p>
-            <a:pPr algn="r"/>
+            <a:pPr algn="r">
+              <a:buNone/>
+            </a:pPr>
             <a:r>
               <a:rPr sz="1100">
                 <a:solidFill>
@@ -5226,7 +5242,9 @@
           <a:bodyPr/>
           <a:lstStyle/>
           <a:p>
-            <a:pPr algn="r"/>
+            <a:pPr algn="r">
+              <a:buNone/>
+            </a:pPr>
             <a:r>
               <a:rPr sz="1100">
                 <a:solidFill>
@@ -5841,7 +5859,9 @@
           <a:bodyPr/>
           <a:lstStyle/>
           <a:p>
-            <a:pPr algn="r"/>
+            <a:pPr algn="r">
+              <a:buNone/>
+            </a:pPr>
             <a:r>
               <a:rPr sz="1100">
                 <a:solidFill>
@@ -5929,31 +5949,25 @@
           <a:p>
             <a:pPr lvl="1"/>
             <a:r>
-              <a:t>Early stakeholder engagement ensured alignment throughout</a:t>
+              <a:t>Early stakeholder engagement</a:t>
             </a:r>
           </a:p>
           <a:p>
             <a:pPr lvl="1"/>
             <a:r>
-              <a:t>Agile methodology enabled rapid iteration and feedback</a:t>
+              <a:t>Agile methodology with rapid iteration</a:t>
             </a:r>
           </a:p>
           <a:p>
             <a:pPr lvl="1"/>
             <a:r>
-              <a:t>Infrastructure as Code reduced deployment errors to zero</a:t>
+              <a:t>Infrastructure as Code deployment</a:t>
             </a:r>
           </a:p>
           <a:p>
             <a:pPr lvl="1"/>
             <a:r>
-              <a:t>Comprehensive testing prevented production incidents</a:t>
-            </a:r>
-          </a:p>
-          <a:p>
-            <a:pPr lvl="1"/>
-            <a:r>
-              <a:t>Weekly demos kept business engaged and informed</a:t>
+              <a:t>Comprehensive testing approach</a:t>
             </a:r>
           </a:p>
           <a:p>
@@ -5966,19 +5980,19 @@
           <a:p>
             <a:pPr lvl="1"/>
             <a:r>
-              <a:t>Legacy data migration: Resolved with phased approach</a:t>
+              <a:t>Legacy data: phased migration</a:t>
             </a:r>
           </a:p>
           <a:p>
             <a:pPr lvl="1"/>
             <a:r>
-              <a:t>User adoption concerns: Enhanced training program</a:t>
+              <a:t>Adoption: enhanced training program</a:t>
             </a:r>
           </a:p>
           <a:p>
             <a:pPr lvl="1"/>
             <a:r>
-              <a:t>Integration complexity: Middleware abstraction layer</a:t>
+              <a:t>Integration: middleware abstraction</a:t>
             </a:r>
           </a:p>
         </p:txBody>
@@ -6007,31 +6021,25 @@
           <a:p>
             <a:pPr lvl="1"/>
             <a:r>
-              <a:t>Invest in Phase 2 enhancements based on user feedback</a:t>
+              <a:t>Invest in Phase 2 enhancements</a:t>
             </a:r>
           </a:p>
           <a:p>
             <a:pPr lvl="1"/>
             <a:r>
-              <a:t>Implement AI/ML features for predictive analytics</a:t>
+              <a:t>Implement AI/ML analytics</a:t>
             </a:r>
           </a:p>
           <a:p>
             <a:pPr lvl="1"/>
             <a:r>
-              <a:t>Expand mobile capabilities for field workforce</a:t>
+              <a:t>Expand mobile capabilities</a:t>
             </a:r>
           </a:p>
           <a:p>
             <a:pPr lvl="1"/>
             <a:r>
-              <a:t>Establish quarterly business reviews to track ROI</a:t>
-            </a:r>
-          </a:p>
-          <a:p>
-            <a:pPr lvl="1"/>
-            <a:r>
-              <a:t>Consider disaster recovery site in secondary region</a:t>
+              <a:t>Establish quarterly reviews</a:t>
             </a:r>
           </a:p>
         </p:txBody>
@@ -6051,7 +6059,9 @@
           <a:bodyPr/>
           <a:lstStyle/>
           <a:p>
-            <a:pPr algn="r"/>
+            <a:pPr algn="r">
+              <a:buNone/>
+            </a:pPr>
             <a:r>
               <a:rPr sz="1100">
                 <a:solidFill>
@@ -6252,7 +6262,9 @@
           <a:bodyPr/>
           <a:lstStyle/>
           <a:p>
-            <a:pPr algn="r"/>
+            <a:pPr algn="r">
+              <a:buNone/>
+            </a:pPr>
             <a:r>
               <a:rPr sz="1100">
                 <a:solidFill>
@@ -6411,7 +6423,9 @@
           <a:bodyPr/>
           <a:lstStyle/>
           <a:p>
-            <a:pPr algn="r"/>
+            <a:pPr algn="r">
+              <a:buNone/>
+            </a:pPr>
             <a:r>
               <a:rPr sz="1100">
                 <a:solidFill>

</xml_diff>

<commit_message>
Regenerate closeout presentation with fixed logos and footer
</commit_message>
<xml_diff>
--- a/solution-template/sample-provider/sample-category/sample-solution/delivery/closeout-presentation.pptx
+++ b/solution-template/sample-provider/sample-category/sample-solution/delivery/closeout-presentation.pptx
@@ -3971,27 +3971,15 @@
       <p:grpSpPr/>
       <p:sp>
         <p:nvSpPr>
-          <p:cNvPr id="2" name="Picture Placeholder 1"/>
-          <p:cNvSpPr>
-            <a:spLocks noGrp="1"/>
-          </p:cNvSpPr>
-          <p:nvPr>
-            <p:ph type="pic" idx="10" sz="quarter"/>
+          <p:cNvPr id="3" name="Text Placeholder 2"/>
+          <p:cNvSpPr>
+            <a:spLocks noGrp="1"/>
+          </p:cNvSpPr>
+          <p:nvPr>
+            <p:ph type="body" idx="12" sz="quarter"/>
           </p:nvPr>
         </p:nvSpPr>
         <p:spPr/>
-      </p:sp>
-      <p:sp>
-        <p:nvSpPr>
-          <p:cNvPr id="3" name="Text Placeholder 2"/>
-          <p:cNvSpPr>
-            <a:spLocks noGrp="1"/>
-          </p:cNvSpPr>
-          <p:nvPr>
-            <p:ph type="body" idx="12" sz="quarter"/>
-          </p:nvPr>
-        </p:nvSpPr>
-        <p:spPr/>
         <p:txBody>
           <a:bodyPr/>
           <a:lstStyle/>
@@ -4001,18 +3989,6 @@
             </a:r>
           </a:p>
         </p:txBody>
-      </p:sp>
-      <p:sp>
-        <p:nvSpPr>
-          <p:cNvPr id="4" name="Picture Placeholder 3"/>
-          <p:cNvSpPr>
-            <a:spLocks noGrp="1"/>
-          </p:cNvSpPr>
-          <p:nvPr>
-            <p:ph type="pic" idx="13" sz="quarter"/>
-          </p:nvPr>
-        </p:nvSpPr>
-        <p:spPr/>
       </p:sp>
       <p:sp>
         <p:nvSpPr>
@@ -4058,7 +4034,7 @@
       </p:sp>
       <p:pic>
         <p:nvPicPr>
-          <p:cNvPr id="7" name="Picture 6" descr="eo-framework-logo-real.png"/>
+          <p:cNvPr id="7" name="Picture 6" descr="client_logo.png"/>
           <p:cNvPicPr>
             <a:picLocks noChangeAspect="1"/>
           </p:cNvPicPr>
@@ -4066,6 +4042,54 @@
         </p:nvPicPr>
         <p:blipFill>
           <a:blip r:embed="rId2"/>
+          <a:stretch>
+            <a:fillRect/>
+          </a:stretch>
+        </p:blipFill>
+        <p:spPr>
+          <a:xfrm>
+            <a:off x="2180492" y="171206"/>
+            <a:ext cx="3978520" cy="1314694"/>
+          </a:xfrm>
+          <a:prstGeom prst="rect">
+            <a:avLst/>
+          </a:prstGeom>
+        </p:spPr>
+      </p:pic>
+      <p:pic>
+        <p:nvPicPr>
+          <p:cNvPr id="8" name="Picture 7" descr="consulting_company_logo.png"/>
+          <p:cNvPicPr>
+            <a:picLocks noChangeAspect="1"/>
+          </p:cNvPicPr>
+          <p:nvPr/>
+        </p:nvPicPr>
+        <p:blipFill>
+          <a:blip r:embed="rId3"/>
+          <a:stretch>
+            <a:fillRect/>
+          </a:stretch>
+        </p:blipFill>
+        <p:spPr>
+          <a:xfrm>
+            <a:off x="313591" y="4536078"/>
+            <a:ext cx="2099897" cy="529698"/>
+          </a:xfrm>
+          <a:prstGeom prst="rect">
+            <a:avLst/>
+          </a:prstGeom>
+        </p:spPr>
+      </p:pic>
+      <p:pic>
+        <p:nvPicPr>
+          <p:cNvPr id="9" name="Picture 8" descr="eo-framework-logo-real.png"/>
+          <p:cNvPicPr>
+            <a:picLocks noChangeAspect="1"/>
+          </p:cNvPicPr>
+          <p:nvPr/>
+        </p:nvPicPr>
+        <p:blipFill>
+          <a:blip r:embed="rId4"/>
           <a:stretch>
             <a:fillRect/>
           </a:stretch>
@@ -4100,27 +4124,15 @@
       <p:grpSpPr/>
       <p:sp>
         <p:nvSpPr>
-          <p:cNvPr id="2" name="Picture Placeholder 1"/>
-          <p:cNvSpPr>
-            <a:spLocks noGrp="1"/>
-          </p:cNvSpPr>
-          <p:nvPr>
-            <p:ph type="pic" idx="10" sz="quarter"/>
+          <p:cNvPr id="3" name="Text Placeholder 2"/>
+          <p:cNvSpPr>
+            <a:spLocks noGrp="1"/>
+          </p:cNvSpPr>
+          <p:nvPr>
+            <p:ph type="body" idx="12" sz="quarter"/>
           </p:nvPr>
         </p:nvSpPr>
         <p:spPr/>
-      </p:sp>
-      <p:sp>
-        <p:nvSpPr>
-          <p:cNvPr id="3" name="Text Placeholder 2"/>
-          <p:cNvSpPr>
-            <a:spLocks noGrp="1"/>
-          </p:cNvSpPr>
-          <p:nvPr>
-            <p:ph type="body" idx="12" sz="quarter"/>
-          </p:nvPr>
-        </p:nvSpPr>
-        <p:spPr/>
         <p:txBody>
           <a:bodyPr/>
           <a:lstStyle/>
@@ -4130,18 +4142,6 @@
             </a:r>
           </a:p>
         </p:txBody>
-      </p:sp>
-      <p:sp>
-        <p:nvSpPr>
-          <p:cNvPr id="4" name="Picture Placeholder 3"/>
-          <p:cNvSpPr>
-            <a:spLocks noGrp="1"/>
-          </p:cNvSpPr>
-          <p:nvPr>
-            <p:ph type="pic" idx="13" sz="quarter"/>
-          </p:nvPr>
-        </p:nvSpPr>
-        <p:spPr/>
       </p:sp>
       <p:sp>
         <p:nvSpPr>
@@ -4179,7 +4179,7 @@
       </p:sp>
       <p:pic>
         <p:nvPicPr>
-          <p:cNvPr id="7" name="Picture 6" descr="eo-framework-logo-real.png"/>
+          <p:cNvPr id="7" name="Picture 6" descr="client_logo.png"/>
           <p:cNvPicPr>
             <a:picLocks noChangeAspect="1"/>
           </p:cNvPicPr>
@@ -4187,6 +4187,54 @@
         </p:nvPicPr>
         <p:blipFill>
           <a:blip r:embed="rId3"/>
+          <a:stretch>
+            <a:fillRect/>
+          </a:stretch>
+        </p:blipFill>
+        <p:spPr>
+          <a:xfrm>
+            <a:off x="2180492" y="171206"/>
+            <a:ext cx="3978520" cy="1314694"/>
+          </a:xfrm>
+          <a:prstGeom prst="rect">
+            <a:avLst/>
+          </a:prstGeom>
+        </p:spPr>
+      </p:pic>
+      <p:pic>
+        <p:nvPicPr>
+          <p:cNvPr id="8" name="Picture 7" descr="consulting_company_logo.png"/>
+          <p:cNvPicPr>
+            <a:picLocks noChangeAspect="1"/>
+          </p:cNvPicPr>
+          <p:nvPr/>
+        </p:nvPicPr>
+        <p:blipFill>
+          <a:blip r:embed="rId4"/>
+          <a:stretch>
+            <a:fillRect/>
+          </a:stretch>
+        </p:blipFill>
+        <p:spPr>
+          <a:xfrm>
+            <a:off x="313592" y="4536078"/>
+            <a:ext cx="2164114" cy="529698"/>
+          </a:xfrm>
+          <a:prstGeom prst="rect">
+            <a:avLst/>
+          </a:prstGeom>
+        </p:spPr>
+      </p:pic>
+      <p:pic>
+        <p:nvPicPr>
+          <p:cNvPr id="9" name="Picture 8" descr="eo-framework-logo-real.png"/>
+          <p:cNvPicPr>
+            <a:picLocks noChangeAspect="1"/>
+          </p:cNvPicPr>
+          <p:nvPr/>
+        </p:nvPicPr>
+        <p:blipFill>
+          <a:blip r:embed="rId5"/>
           <a:stretch>
             <a:fillRect/>
           </a:stretch>
@@ -4221,18 +4269,6 @@
       <p:grpSpPr/>
       <p:sp>
         <p:nvSpPr>
-          <p:cNvPr id="2" name="Picture Placeholder 1"/>
-          <p:cNvSpPr>
-            <a:spLocks noGrp="1"/>
-          </p:cNvSpPr>
-          <p:nvPr>
-            <p:ph type="pic" idx="13" sz="quarter"/>
-          </p:nvPr>
-        </p:nvSpPr>
-        <p:spPr/>
-      </p:sp>
-      <p:sp>
-        <p:nvSpPr>
           <p:cNvPr id="3" name="Text Placeholder 2"/>
           <p:cNvSpPr>
             <a:spLocks noGrp="1"/>
@@ -4368,6 +4404,30 @@
           </a:p>
         </p:txBody>
       </p:sp>
+      <p:pic>
+        <p:nvPicPr>
+          <p:cNvPr id="6" name="Picture 5" descr="consulting_company_logo.png"/>
+          <p:cNvPicPr>
+            <a:picLocks noChangeAspect="1"/>
+          </p:cNvPicPr>
+          <p:nvPr/>
+        </p:nvPicPr>
+        <p:blipFill>
+          <a:blip r:embed="rId3"/>
+          <a:stretch>
+            <a:fillRect/>
+          </a:stretch>
+        </p:blipFill>
+        <p:spPr>
+          <a:xfrm>
+            <a:off x="313593" y="4536078"/>
+            <a:ext cx="2143858" cy="529698"/>
+          </a:xfrm>
+          <a:prstGeom prst="rect">
+            <a:avLst/>
+          </a:prstGeom>
+        </p:spPr>
+      </p:pic>
     </p:spTree>
   </p:cSld>
   <p:clrMapOvr>
@@ -4388,18 +4448,6 @@
       <p:grpSpPr/>
       <p:sp>
         <p:nvSpPr>
-          <p:cNvPr id="2" name="Picture Placeholder 1"/>
-          <p:cNvSpPr>
-            <a:spLocks noGrp="1"/>
-          </p:cNvSpPr>
-          <p:nvPr>
-            <p:ph type="pic" idx="14" sz="quarter"/>
-          </p:nvPr>
-        </p:nvSpPr>
-        <p:spPr/>
-      </p:sp>
-      <p:sp>
-        <p:nvSpPr>
           <p:cNvPr id="3" name="Text Placeholder 2"/>
           <p:cNvSpPr>
             <a:spLocks noGrp="1"/>
@@ -4482,6 +4530,30 @@
           <a:p/>
         </p:txBody>
       </p:sp>
+      <p:pic>
+        <p:nvPicPr>
+          <p:cNvPr id="7" name="Picture 6" descr="consulting_company_logo.png"/>
+          <p:cNvPicPr>
+            <a:picLocks noChangeAspect="1"/>
+          </p:cNvPicPr>
+          <p:nvPr/>
+        </p:nvPicPr>
+        <p:blipFill>
+          <a:blip r:embed="rId3"/>
+          <a:stretch>
+            <a:fillRect/>
+          </a:stretch>
+        </p:blipFill>
+        <p:spPr>
+          <a:xfrm>
+            <a:off x="313592" y="4536078"/>
+            <a:ext cx="2130670" cy="529698"/>
+          </a:xfrm>
+          <a:prstGeom prst="rect">
+            <a:avLst/>
+          </a:prstGeom>
+        </p:spPr>
+      </p:pic>
     </p:spTree>
   </p:cSld>
   <p:clrMapOvr>
@@ -4500,18 +4572,6 @@
         <p:nvPr/>
       </p:nvGrpSpPr>
       <p:grpSpPr/>
-      <p:sp>
-        <p:nvSpPr>
-          <p:cNvPr id="2" name="Picture Placeholder 1"/>
-          <p:cNvSpPr>
-            <a:spLocks noGrp="1"/>
-          </p:cNvSpPr>
-          <p:nvPr>
-            <p:ph type="pic" idx="13" sz="quarter"/>
-          </p:nvPr>
-        </p:nvSpPr>
-        <p:spPr/>
-      </p:sp>
       <p:sp>
         <p:nvSpPr>
           <p:cNvPr id="3" name="Text Placeholder 2"/>
@@ -5081,6 +5141,30 @@
           </a:p>
         </p:txBody>
       </p:sp>
+      <p:pic>
+        <p:nvPicPr>
+          <p:cNvPr id="6" name="Picture 5" descr="consulting_company_logo.png"/>
+          <p:cNvPicPr>
+            <a:picLocks noChangeAspect="1"/>
+          </p:cNvPicPr>
+          <p:nvPr/>
+        </p:nvPicPr>
+        <p:blipFill>
+          <a:blip r:embed="rId3"/>
+          <a:stretch>
+            <a:fillRect/>
+          </a:stretch>
+        </p:blipFill>
+        <p:spPr>
+          <a:xfrm>
+            <a:off x="313592" y="4536078"/>
+            <a:ext cx="2126273" cy="529698"/>
+          </a:xfrm>
+          <a:prstGeom prst="rect">
+            <a:avLst/>
+          </a:prstGeom>
+        </p:spPr>
+      </p:pic>
     </p:spTree>
   </p:cSld>
   <p:clrMapOvr>
@@ -5101,18 +5185,6 @@
       <p:grpSpPr/>
       <p:sp>
         <p:nvSpPr>
-          <p:cNvPr id="2" name="Picture Placeholder 1"/>
-          <p:cNvSpPr>
-            <a:spLocks noGrp="1"/>
-          </p:cNvSpPr>
-          <p:nvPr>
-            <p:ph type="pic" idx="14" sz="quarter"/>
-          </p:nvPr>
-        </p:nvSpPr>
-        <p:spPr/>
-      </p:sp>
-      <p:sp>
-        <p:nvSpPr>
           <p:cNvPr id="3" name="Text Placeholder 2"/>
           <p:cNvSpPr>
             <a:spLocks noGrp="1"/>
@@ -5256,6 +5328,30 @@
           </a:p>
         </p:txBody>
       </p:sp>
+      <p:pic>
+        <p:nvPicPr>
+          <p:cNvPr id="7" name="Picture 6" descr="consulting_company_logo.png"/>
+          <p:cNvPicPr>
+            <a:picLocks noChangeAspect="1"/>
+          </p:cNvPicPr>
+          <p:nvPr/>
+        </p:nvPicPr>
+        <p:blipFill>
+          <a:blip r:embed="rId3"/>
+          <a:stretch>
+            <a:fillRect/>
+          </a:stretch>
+        </p:blipFill>
+        <p:spPr>
+          <a:xfrm>
+            <a:off x="313592" y="4536078"/>
+            <a:ext cx="2121877" cy="529698"/>
+          </a:xfrm>
+          <a:prstGeom prst="rect">
+            <a:avLst/>
+          </a:prstGeom>
+        </p:spPr>
+      </p:pic>
     </p:spTree>
   </p:cSld>
   <p:clrMapOvr>
@@ -5274,18 +5370,6 @@
         <p:nvPr/>
       </p:nvGrpSpPr>
       <p:grpSpPr/>
-      <p:sp>
-        <p:nvSpPr>
-          <p:cNvPr id="2" name="Picture Placeholder 1"/>
-          <p:cNvSpPr>
-            <a:spLocks noGrp="1"/>
-          </p:cNvSpPr>
-          <p:nvPr>
-            <p:ph type="pic" idx="13" sz="quarter"/>
-          </p:nvPr>
-        </p:nvSpPr>
-        <p:spPr/>
-      </p:sp>
       <p:sp>
         <p:nvSpPr>
           <p:cNvPr id="3" name="Text Placeholder 2"/>
@@ -5873,6 +5957,30 @@
           </a:p>
         </p:txBody>
       </p:sp>
+      <p:pic>
+        <p:nvPicPr>
+          <p:cNvPr id="6" name="Picture 5" descr="consulting_company_logo.png"/>
+          <p:cNvPicPr>
+            <a:picLocks noChangeAspect="1"/>
+          </p:cNvPicPr>
+          <p:nvPr/>
+        </p:nvPicPr>
+        <p:blipFill>
+          <a:blip r:embed="rId3"/>
+          <a:stretch>
+            <a:fillRect/>
+          </a:stretch>
+        </p:blipFill>
+        <p:spPr>
+          <a:xfrm>
+            <a:off x="313592" y="4536078"/>
+            <a:ext cx="2126273" cy="529698"/>
+          </a:xfrm>
+          <a:prstGeom prst="rect">
+            <a:avLst/>
+          </a:prstGeom>
+        </p:spPr>
+      </p:pic>
     </p:spTree>
   </p:cSld>
   <p:clrMapOvr>
@@ -5893,18 +6001,6 @@
       <p:grpSpPr/>
       <p:sp>
         <p:nvSpPr>
-          <p:cNvPr id="2" name="Picture Placeholder 1"/>
-          <p:cNvSpPr>
-            <a:spLocks noGrp="1"/>
-          </p:cNvSpPr>
-          <p:nvPr>
-            <p:ph type="pic" idx="14" sz="quarter"/>
-          </p:nvPr>
-        </p:nvSpPr>
-        <p:spPr/>
-      </p:sp>
-      <p:sp>
-        <p:nvSpPr>
           <p:cNvPr id="3" name="Text Placeholder 2"/>
           <p:cNvSpPr>
             <a:spLocks noGrp="1"/>
@@ -6073,6 +6169,30 @@
           </a:p>
         </p:txBody>
       </p:sp>
+      <p:pic>
+        <p:nvPicPr>
+          <p:cNvPr id="7" name="Picture 6" descr="consulting_company_logo.png"/>
+          <p:cNvPicPr>
+            <a:picLocks noChangeAspect="1"/>
+          </p:cNvPicPr>
+          <p:nvPr/>
+        </p:nvPicPr>
+        <p:blipFill>
+          <a:blip r:embed="rId3"/>
+          <a:stretch>
+            <a:fillRect/>
+          </a:stretch>
+        </p:blipFill>
+        <p:spPr>
+          <a:xfrm>
+            <a:off x="313592" y="4536078"/>
+            <a:ext cx="2121877" cy="529698"/>
+          </a:xfrm>
+          <a:prstGeom prst="rect">
+            <a:avLst/>
+          </a:prstGeom>
+        </p:spPr>
+      </p:pic>
     </p:spTree>
   </p:cSld>
   <p:clrMapOvr>
@@ -6093,18 +6213,6 @@
       <p:grpSpPr/>
       <p:sp>
         <p:nvSpPr>
-          <p:cNvPr id="2" name="Picture Placeholder 1"/>
-          <p:cNvSpPr>
-            <a:spLocks noGrp="1"/>
-          </p:cNvSpPr>
-          <p:nvPr>
-            <p:ph type="pic" idx="13" sz="quarter"/>
-          </p:nvPr>
-        </p:nvSpPr>
-        <p:spPr/>
-      </p:sp>
-      <p:sp>
-        <p:nvSpPr>
           <p:cNvPr id="3" name="Text Placeholder 2"/>
           <p:cNvSpPr>
             <a:spLocks noGrp="1"/>
@@ -6276,6 +6384,30 @@
           </a:p>
         </p:txBody>
       </p:sp>
+      <p:pic>
+        <p:nvPicPr>
+          <p:cNvPr id="6" name="Picture 5" descr="consulting_company_logo.png"/>
+          <p:cNvPicPr>
+            <a:picLocks noChangeAspect="1"/>
+          </p:cNvPicPr>
+          <p:nvPr/>
+        </p:nvPicPr>
+        <p:blipFill>
+          <a:blip r:embed="rId3"/>
+          <a:stretch>
+            <a:fillRect/>
+          </a:stretch>
+        </p:blipFill>
+        <p:spPr>
+          <a:xfrm>
+            <a:off x="313593" y="4536078"/>
+            <a:ext cx="2143858" cy="529698"/>
+          </a:xfrm>
+          <a:prstGeom prst="rect">
+            <a:avLst/>
+          </a:prstGeom>
+        </p:spPr>
+      </p:pic>
     </p:spTree>
   </p:cSld>
   <p:clrMapOvr>
@@ -6296,18 +6428,6 @@
       <p:grpSpPr/>
       <p:sp>
         <p:nvSpPr>
-          <p:cNvPr id="2" name="Picture Placeholder 1"/>
-          <p:cNvSpPr>
-            <a:spLocks noGrp="1"/>
-          </p:cNvSpPr>
-          <p:nvPr>
-            <p:ph type="pic" idx="13" sz="quarter"/>
-          </p:nvPr>
-        </p:nvSpPr>
-        <p:spPr/>
-      </p:sp>
-      <p:sp>
-        <p:nvSpPr>
           <p:cNvPr id="3" name="Text Placeholder 2"/>
           <p:cNvSpPr>
             <a:spLocks noGrp="1"/>
@@ -6437,6 +6557,30 @@
           </a:p>
         </p:txBody>
       </p:sp>
+      <p:pic>
+        <p:nvPicPr>
+          <p:cNvPr id="6" name="Picture 5" descr="consulting_company_logo.png"/>
+          <p:cNvPicPr>
+            <a:picLocks noChangeAspect="1"/>
+          </p:cNvPicPr>
+          <p:nvPr/>
+        </p:nvPicPr>
+        <p:blipFill>
+          <a:blip r:embed="rId3"/>
+          <a:stretch>
+            <a:fillRect/>
+          </a:stretch>
+        </p:blipFill>
+        <p:spPr>
+          <a:xfrm>
+            <a:off x="313593" y="4536078"/>
+            <a:ext cx="2143858" cy="529698"/>
+          </a:xfrm>
+          <a:prstGeom prst="rect">
+            <a:avLst/>
+          </a:prstGeom>
+        </p:spPr>
+      </p:pic>
     </p:spTree>
   </p:cSld>
   <p:clrMapOvr>

</xml_diff>

<commit_message>
Regenerate closeout with visual content support
</commit_message>
<xml_diff>
--- a/solution-template/sample-provider/sample-category/sample-solution/delivery/closeout-presentation.pptx
+++ b/solution-template/sample-provider/sample-category/sample-solution/delivery/closeout-presentation.pptx
@@ -4510,7 +4510,36 @@
         <p:txBody>
           <a:bodyPr/>
           <a:lstStyle/>
-          <a:p/>
+          <a:p>
+            <a:pPr/>
+            <a:r>
+              <a:rPr b="1"/>
+              <a:t>Infrastructure:</a:t>
+            </a:r>
+            <a:r>
+              <a:t> Multi-AZ cloud, auto-scaling, managed DB</a:t>
+            </a:r>
+          </a:p>
+          <a:p>
+            <a:pPr/>
+            <a:r>
+              <a:rPr b="1"/>
+              <a:t>Application:</a:t>
+            </a:r>
+            <a:r>
+              <a:t> Kubernetes, REST APIs, OAuth 2.0</a:t>
+            </a:r>
+          </a:p>
+          <a:p>
+            <a:pPr/>
+            <a:r>
+              <a:rPr b="1"/>
+              <a:t>Integration:</a:t>
+            </a:r>
+            <a:r>
+              <a:t> 5 enterprise systems connected</a:t>
+            </a:r>
+          </a:p>
         </p:txBody>
       </p:sp>
       <p:sp>

</xml_diff>

<commit_message>
Refine closeout presentation layouts and content
- Solution Architecture: two-level bullet hierarchy
- Support Transition: eo_two_column layout, max 3 sub-bullets
- Acknowledgments & Next Steps: eo_bullet_points layout
- Add image extraction to closeout converter
</commit_message>
<xml_diff>
--- a/solution-template/sample-provider/sample-category/sample-solution/delivery/closeout-presentation.pptx
+++ b/solution-template/sample-provider/sample-category/sample-solution/delivery/closeout-presentation.pptx
@@ -4470,17 +4470,97 @@
       </p:sp>
       <p:sp>
         <p:nvSpPr>
-          <p:cNvPr id="4" name="Picture Placeholder 3"/>
-          <p:cNvSpPr>
-            <a:spLocks noGrp="1"/>
-          </p:cNvSpPr>
-          <p:nvPr>
-            <p:ph type="pic" idx="15" sz="quarter"/>
+          <p:cNvPr id="5" name="Text Placeholder 4"/>
+          <p:cNvSpPr>
+            <a:spLocks noGrp="1"/>
+          </p:cNvSpPr>
+          <p:nvPr>
+            <p:ph type="body" idx="16" sz="quarter"/>
           </p:nvPr>
         </p:nvSpPr>
         <p:spPr/>
         <p:txBody>
           <a:bodyPr/>
+          <a:lstStyle/>
+          <a:p>
+            <a:pPr/>
+            <a:r>
+              <a:rPr b="1"/>
+              <a:t>Infrastructure</a:t>
+            </a:r>
+          </a:p>
+          <a:p>
+            <a:pPr lvl="1"/>
+            <a:r>
+              <a:t>Multi-AZ cloud deployment</a:t>
+            </a:r>
+          </a:p>
+          <a:p>
+            <a:pPr lvl="1"/>
+            <a:r>
+              <a:t>Auto-scaling enabled</a:t>
+            </a:r>
+          </a:p>
+          <a:p>
+            <a:pPr lvl="1"/>
+            <a:r>
+              <a:t>Managed database services</a:t>
+            </a:r>
+          </a:p>
+          <a:p>
+            <a:pPr/>
+            <a:r>
+              <a:rPr b="1"/>
+              <a:t>Application</a:t>
+            </a:r>
+          </a:p>
+          <a:p>
+            <a:pPr lvl="1"/>
+            <a:r>
+              <a:t>Kubernetes orchestration</a:t>
+            </a:r>
+          </a:p>
+          <a:p>
+            <a:pPr lvl="1"/>
+            <a:r>
+              <a:t>REST API architecture</a:t>
+            </a:r>
+          </a:p>
+          <a:p>
+            <a:pPr lvl="1"/>
+            <a:r>
+              <a:t>OAuth 2.0 security</a:t>
+            </a:r>
+          </a:p>
+          <a:p>
+            <a:pPr/>
+            <a:r>
+              <a:rPr b="1"/>
+              <a:t>Integration</a:t>
+            </a:r>
+          </a:p>
+          <a:p>
+            <a:pPr lvl="1"/>
+            <a:r>
+              <a:t>5 enterprise systems connected</a:t>
+            </a:r>
+          </a:p>
+        </p:txBody>
+      </p:sp>
+      <p:sp>
+        <p:nvSpPr>
+          <p:cNvPr id="6" name="Text Placeholder 5"/>
+          <p:cNvSpPr>
+            <a:spLocks noGrp="1"/>
+          </p:cNvSpPr>
+          <p:nvPr>
+            <p:ph type="body" idx="17" sz="quarter"/>
+          </p:nvPr>
+        </p:nvSpPr>
+        <p:spPr/>
+        <p:txBody>
+          <a:bodyPr/>
+          <a:lstStyle/>
           <a:p>
             <a:pPr algn="r">
               <a:buNone/>
@@ -4496,79 +4576,46 @@
           </a:p>
         </p:txBody>
       </p:sp>
-      <p:sp>
-        <p:nvSpPr>
-          <p:cNvPr id="5" name="Text Placeholder 4"/>
-          <p:cNvSpPr>
-            <a:spLocks noGrp="1"/>
-          </p:cNvSpPr>
-          <p:nvPr>
-            <p:ph type="body" idx="16" sz="quarter"/>
-          </p:nvPr>
-        </p:nvSpPr>
-        <p:spPr/>
-        <p:txBody>
-          <a:bodyPr/>
-          <a:lstStyle/>
-          <a:p>
-            <a:pPr/>
-            <a:r>
-              <a:rPr b="1"/>
-              <a:t>Infrastructure:</a:t>
-            </a:r>
-            <a:r>
-              <a:t> Multi-AZ cloud, auto-scaling, managed DB</a:t>
-            </a:r>
-          </a:p>
-          <a:p>
-            <a:pPr/>
-            <a:r>
-              <a:rPr b="1"/>
-              <a:t>Application:</a:t>
-            </a:r>
-            <a:r>
-              <a:t> Kubernetes, REST APIs, OAuth 2.0</a:t>
-            </a:r>
-          </a:p>
-          <a:p>
-            <a:pPr/>
-            <a:r>
-              <a:rPr b="1"/>
-              <a:t>Integration:</a:t>
-            </a:r>
-            <a:r>
-              <a:t> 5 enterprise systems connected</a:t>
-            </a:r>
-          </a:p>
-        </p:txBody>
-      </p:sp>
-      <p:sp>
-        <p:nvSpPr>
-          <p:cNvPr id="6" name="Text Placeholder 5"/>
-          <p:cNvSpPr>
-            <a:spLocks noGrp="1"/>
-          </p:cNvSpPr>
-          <p:nvPr>
-            <p:ph type="body" idx="17" sz="quarter"/>
-          </p:nvPr>
-        </p:nvSpPr>
-        <p:spPr/>
-        <p:txBody>
-          <a:bodyPr/>
-          <a:lstStyle/>
-          <a:p/>
-        </p:txBody>
-      </p:sp>
       <p:pic>
         <p:nvPicPr>
-          <p:cNvPr id="7" name="Picture 6" descr="consulting_company_logo.png"/>
+          <p:cNvPr id="7" name="Picture 6" descr="architecture-diagram.png"/>
           <p:cNvPicPr>
             <a:picLocks noChangeAspect="1"/>
           </p:cNvPicPr>
           <p:nvPr/>
         </p:nvPicPr>
         <p:blipFill>
-          <a:blip r:embed="rId3"/>
+          <a:blip r:embed="rId2"/>
+          <a:stretch>
+            <a:fillRect/>
+          </a:stretch>
+        </p:blipFill>
+        <p:spPr>
+          <a:xfrm>
+            <a:off x="4662488" y="685799"/>
+            <a:ext cx="4337050" cy="3815859"/>
+          </a:xfrm>
+          <a:prstGeom prst="rect">
+            <a:avLst/>
+          </a:prstGeom>
+          <a:ln w="12700">
+            <a:solidFill>
+              <a:srgbClr val="C0C0C0"/>
+            </a:solidFill>
+            <a:prstDash val="solid"/>
+          </a:ln>
+        </p:spPr>
+      </p:pic>
+      <p:pic>
+        <p:nvPicPr>
+          <p:cNvPr id="8" name="Picture 7" descr="consulting_company_logo.png"/>
+          <p:cNvPicPr>
+            <a:picLocks noChangeAspect="1"/>
+          </p:cNvPicPr>
+          <p:nvPr/>
+        </p:nvPicPr>
+        <p:blipFill>
+          <a:blip r:embed="rId4"/>
           <a:stretch>
             <a:fillRect/>
           </a:stretch>
@@ -6269,7 +6316,7 @@
             <a:spLocks noGrp="1"/>
           </p:cNvSpPr>
           <p:nvPr>
-            <p:ph type="body" idx="14" sz="quarter"/>
+            <p:ph type="body" idx="16" sz="quarter"/>
           </p:nvPr>
         </p:nvSpPr>
         <p:spPr/>
@@ -6280,58 +6327,68 @@
             <a:pPr/>
             <a:r>
               <a:rPr b="1"/>
-              <a:t>Hypercare Period (Days 1-30)</a:t>
+              <a:t>Hypercare (Days 1-30)</a:t>
             </a:r>
           </a:p>
           <a:p>
             <a:pPr lvl="1"/>
             <a:r>
-              <a:t>Dedicated support team available 24/7</a:t>
+              <a:t>Dedicated 24/7 support team</a:t>
             </a:r>
           </a:p>
           <a:p>
             <a:pPr lvl="1"/>
             <a:r>
-              <a:t>Daily standup calls at 9:00 AM for issue triage</a:t>
+              <a:t>Daily standup calls</a:t>
             </a:r>
           </a:p>
           <a:p>
             <a:pPr lvl="1"/>
             <a:r>
-              <a:t>4-hour response SLA for critical issues</a:t>
+              <a:t>4-hour critical response SLA</a:t>
+            </a:r>
+          </a:p>
+          <a:p>
+            <a:pPr/>
+            <a:r>
+              <a:rPr b="1"/>
+              <a:t>Transition (Days 31-60)</a:t>
             </a:r>
           </a:p>
           <a:p>
             <a:pPr lvl="1"/>
             <a:r>
-              <a:t>Direct escalation path to implementation team</a:t>
-            </a:r>
-          </a:p>
-          <a:p>
-            <a:pPr/>
-            <a:r>
-              <a:rPr b="1"/>
-              <a:t>Transition Period (Days 31-60)</a:t>
+              <a:t>Standard 8-hour response SLA</a:t>
             </a:r>
           </a:p>
           <a:p>
             <a:pPr lvl="1"/>
             <a:r>
-              <a:t>Shift to standard support model with 8-hour response SLA</a:t>
+              <a:t>Weekly to bi-weekly calls</a:t>
             </a:r>
           </a:p>
           <a:p>
             <a:pPr lvl="1"/>
             <a:r>
-              <a:t>Weekly check-in calls transitioning to bi-weekly</a:t>
-            </a:r>
-          </a:p>
-          <a:p>
-            <a:pPr lvl="1"/>
-            <a:r>
-              <a:t>Knowledge transfer sessions for operations team</a:t>
-            </a:r>
-          </a:p>
+              <a:t>Knowledge transfer sessions</a:t>
+            </a:r>
+          </a:p>
+        </p:txBody>
+      </p:sp>
+      <p:sp>
+        <p:nvSpPr>
+          <p:cNvPr id="5" name="Text Placeholder 4"/>
+          <p:cNvSpPr>
+            <a:spLocks noGrp="1"/>
+          </p:cNvSpPr>
+          <p:nvPr>
+            <p:ph type="body" idx="17" sz="quarter"/>
+          </p:nvPr>
+        </p:nvSpPr>
+        <p:spPr/>
+        <p:txBody>
+          <a:bodyPr/>
+          <a:lstStyle/>
           <a:p>
             <a:pPr/>
             <a:r>
@@ -6342,19 +6399,19 @@
           <a:p>
             <a:pPr lvl="1"/>
             <a:r>
-              <a:t>Monthly performance review meetings</a:t>
+              <a:t>Monthly performance reviews</a:t>
             </a:r>
           </a:p>
           <a:p>
             <a:pPr lvl="1"/>
             <a:r>
-              <a:t>Quarterly business reviews for benefits tracking</a:t>
+              <a:t>Quarterly business reviews</a:t>
             </a:r>
           </a:p>
           <a:p>
             <a:pPr lvl="1"/>
             <a:r>
-              <a:t>Enhancement backlog with 15 prioritized features</a:t>
+              <a:t>Enhancement prioritization</a:t>
             </a:r>
           </a:p>
           <a:p>
@@ -6367,26 +6424,26 @@
           <a:p>
             <a:pPr lvl="1"/>
             <a:r>
-              <a:t>L1 Support: support@company.com | 555-HELP</a:t>
+              <a:t>L1: support@company.com</a:t>
             </a:r>
           </a:p>
           <a:p>
             <a:pPr lvl="1"/>
             <a:r>
-              <a:t>L2 Technical: techsupport@company.com</a:t>
+              <a:t>L2: techsupport@company.com</a:t>
             </a:r>
           </a:p>
           <a:p>
             <a:pPr lvl="1"/>
             <a:r>
-              <a:t>Account Manager: am@company.com | 555-123-4567</a:t>
-            </a:r>
-          </a:p>
-        </p:txBody>
-      </p:sp>
-      <p:sp>
-        <p:nvSpPr>
-          <p:cNvPr id="5" name="Text Placeholder 4"/>
+              <a:t>Account: am@company.com</a:t>
+            </a:r>
+          </a:p>
+        </p:txBody>
+      </p:sp>
+      <p:sp>
+        <p:nvSpPr>
+          <p:cNvPr id="6" name="Text Placeholder 5"/>
           <p:cNvSpPr>
             <a:spLocks noGrp="1"/>
           </p:cNvSpPr>
@@ -6415,7 +6472,7 @@
       </p:sp>
       <p:pic>
         <p:nvPicPr>
-          <p:cNvPr id="6" name="Picture 5" descr="consulting_company_logo.png"/>
+          <p:cNvPr id="7" name="Picture 6" descr="consulting_company_logo.png"/>
           <p:cNvPicPr>
             <a:picLocks noChangeAspect="1"/>
           </p:cNvPicPr>
@@ -6429,8 +6486,8 @@
         </p:blipFill>
         <p:spPr>
           <a:xfrm>
-            <a:off x="313593" y="4536078"/>
-            <a:ext cx="2143858" cy="529698"/>
+            <a:off x="313592" y="4536078"/>
+            <a:ext cx="2121877" cy="529698"/>
           </a:xfrm>
           <a:prstGeom prst="rect">
             <a:avLst/>
@@ -6506,7 +6563,7 @@
           <a:p>
             <a:pPr/>
             <a:r>
-              <a:t>Technical teams for exceptional delivery quality and problem-solving</a:t>
+              <a:t>Technical teams for exceptional delivery quality</a:t>
             </a:r>
           </a:p>
           <a:p>
@@ -6522,7 +6579,7 @@
               <a:t>This Week:</a:t>
             </a:r>
             <a:r>
-              <a:t> Final documentation handover and knowledge transfer completion</a:t>
+              <a:t> Final documentation handover</a:t>
             </a:r>
           </a:p>
           <a:p>
@@ -6542,7 +6599,7 @@
               <a:t>Next Quarter:</a:t>
             </a:r>
             <a:r>
-              <a:t> Phase 2 planning workshop and enhancement prioritization</a:t>
+              <a:t> Phase 2 planning workshop</a:t>
             </a:r>
           </a:p>
           <a:p>
@@ -6552,7 +6609,7 @@
               <a:t>Ongoing:</a:t>
             </a:r>
             <a:r>
-              <a:t> Monthly performance reviews and quarterly business reviews</a:t>
+              <a:t> Monthly and quarterly business reviews</a:t>
             </a:r>
           </a:p>
         </p:txBody>

</xml_diff>

<commit_message>
Update solution-template and IDP with content constraints and multi-sheet config
Solution Template:
- Update closeout-presentation.md with content limits (5-6 items per two-column section)
- Update project-plan.csv milestone column widths (14, 20)
- Regenerate all Office documents

AWS IDP Solution:
- Fix configuration.csv: remove Bedrock/SageMaker, add A2I parameters
- Update closeout-presentation.md with content constraints
- Update project-plan.csv milestone column widths
- Regenerate all Office documents with multi-sheet configuration
- Remove deprecated artifacts (communication-plan, requirements, roles, training-plan)
</commit_message>
<xml_diff>
--- a/solution-template/sample-provider/sample-category/sample-solution/delivery/closeout-presentation.pptx
+++ b/solution-template/sample-provider/sample-category/sample-solution/delivery/closeout-presentation.pptx
@@ -2080,7 +2080,7 @@
         <p:spPr>
           <a:xfrm>
             <a:off x="193675" y="678433"/>
-            <a:ext cx="4462463" cy="3785515"/>
+            <a:ext cx="4431079" cy="3785515"/>
           </a:xfrm>
           <a:prstGeom prst="rect">
             <a:avLst/>
@@ -2164,8 +2164,8 @@
         </p:nvSpPr>
         <p:spPr>
           <a:xfrm>
-            <a:off x="4840288" y="678433"/>
-            <a:ext cx="4110037" cy="3785515"/>
+            <a:off x="4721470" y="678433"/>
+            <a:ext cx="4228856" cy="3785515"/>
           </a:xfrm>
           <a:prstGeom prst="rect">
             <a:avLst/>
@@ -4027,7 +4027,7 @@
           <a:lstStyle/>
           <a:p>
             <a:r>
-              <a:t>Project Manager | November 26, 2025</a:t>
+              <a:t>Project Manager | November 27, 2025</a:t>
             </a:r>
           </a:p>
         </p:txBody>
@@ -4543,6 +4543,18 @@
             <a:pPr lvl="1"/>
             <a:r>
               <a:t>5 enterprise systems connected</a:t>
+            </a:r>
+          </a:p>
+          <a:p>
+            <a:pPr lvl="1"/>
+            <a:r>
+              <a:t>Event-driven messaging</a:t>
+            </a:r>
+          </a:p>
+          <a:p>
+            <a:pPr lvl="1"/>
+            <a:r>
+              <a:t>Secure API gateway</a:t>
             </a:r>
           </a:p>
         </p:txBody>
@@ -5326,6 +5338,12 @@
               <a:t>Defect Escape Rate: 0.2% (target: &lt;2%)</a:t>
             </a:r>
           </a:p>
+          <a:p>
+            <a:pPr lvl="1"/>
+            <a:r>
+              <a:t>Regression Tests: 100% automated</a:t>
+            </a:r>
+          </a:p>
         </p:txBody>
       </p:sp>
       <p:sp>
@@ -5358,19 +5376,25 @@
           <a:p>
             <a:pPr lvl="1"/>
             <a:r>
-              <a:t>Average Response Time: 1.2s (target: &lt;2s)</a:t>
+              <a:t>Response Time: 1.2s (target: &lt;2s)</a:t>
             </a:r>
           </a:p>
           <a:p>
             <a:pPr lvl="1"/>
             <a:r>
-              <a:t>Peak Load Handling: 12,000 users (target: 10,000)</a:t>
+              <a:t>Peak Load: 12,000 users (target: 10K)</a:t>
             </a:r>
           </a:p>
           <a:p>
             <a:pPr lvl="1"/>
             <a:r>
-              <a:t>Database Query Performance: 45ms avg (target: &lt;100ms)</a:t>
+              <a:t>DB Query Perf: 45ms avg (target: &lt;100ms)</a:t>
+            </a:r>
+          </a:p>
+          <a:p>
+            <a:pPr lvl="1"/>
+            <a:r>
+              <a:t>Throughput: 5,000 req/min capacity</a:t>
             </a:r>
           </a:p>
         </p:txBody>
@@ -6127,7 +6151,7 @@
           <a:p>
             <a:pPr lvl="1"/>
             <a:r>
-              <a:t>Agile methodology with rapid iteration</a:t>
+              <a:t>Agile methodology with iteration</a:t>
             </a:r>
           </a:p>
           <a:p>
@@ -6140,6 +6164,12 @@
             <a:pPr lvl="1"/>
             <a:r>
               <a:t>Comprehensive testing approach</a:t>
+            </a:r>
+          </a:p>
+          <a:p>
+            <a:pPr lvl="1"/>
+            <a:r>
+              <a:t>Weekly demo feedback loops</a:t>
             </a:r>
           </a:p>
           <a:p>
@@ -6158,13 +6188,25 @@
           <a:p>
             <a:pPr lvl="1"/>
             <a:r>
-              <a:t>Adoption: enhanced training program</a:t>
+              <a:t>Adoption: enhanced training</a:t>
             </a:r>
           </a:p>
           <a:p>
             <a:pPr lvl="1"/>
             <a:r>
-              <a:t>Integration: middleware abstraction</a:t>
+              <a:t>Integration: middleware approach</a:t>
+            </a:r>
+          </a:p>
+          <a:p>
+            <a:pPr lvl="1"/>
+            <a:r>
+              <a:t>Performance: query optimization</a:t>
+            </a:r>
+          </a:p>
+          <a:p>
+            <a:pPr lvl="1"/>
+            <a:r>
+              <a:t>Security: compliance alignment</a:t>
             </a:r>
           </a:p>
         </p:txBody>
@@ -6212,6 +6254,12 @@
             <a:pPr lvl="1"/>
             <a:r>
               <a:t>Establish quarterly reviews</a:t>
+            </a:r>
+          </a:p>
+          <a:p>
+            <a:pPr lvl="1"/>
+            <a:r>
+              <a:t>Automate more workflows</a:t>
             </a:r>
           </a:p>
         </p:txBody>
@@ -6349,46 +6397,17 @@
             </a:r>
           </a:p>
           <a:p>
-            <a:pPr/>
-            <a:r>
-              <a:rPr b="1"/>
-              <a:t>Transition (Days 31-60)</a:t>
-            </a:r>
-          </a:p>
-          <a:p>
             <a:pPr lvl="1"/>
             <a:r>
-              <a:t>Standard 8-hour response SLA</a:t>
+              <a:t>Real-time monitoring active</a:t>
             </a:r>
           </a:p>
           <a:p>
             <a:pPr lvl="1"/>
             <a:r>
-              <a:t>Weekly to bi-weekly calls</a:t>
-            </a:r>
-          </a:p>
-          <a:p>
-            <a:pPr lvl="1"/>
-            <a:r>
-              <a:t>Knowledge transfer sessions</a:t>
-            </a:r>
-          </a:p>
-        </p:txBody>
-      </p:sp>
-      <p:sp>
-        <p:nvSpPr>
-          <p:cNvPr id="5" name="Text Placeholder 4"/>
-          <p:cNvSpPr>
-            <a:spLocks noGrp="1"/>
-          </p:cNvSpPr>
-          <p:nvPr>
-            <p:ph type="body" idx="17" sz="quarter"/>
-          </p:nvPr>
-        </p:nvSpPr>
-        <p:spPr/>
-        <p:txBody>
-          <a:bodyPr/>
-          <a:lstStyle/>
+              <a:t>Issue triage within 1 hour</a:t>
+            </a:r>
+          </a:p>
           <a:p>
             <a:pPr/>
             <a:r>
@@ -6415,6 +6434,34 @@
             </a:r>
           </a:p>
           <a:p>
+            <a:pPr lvl="1"/>
+            <a:r>
+              <a:t>Automated health checks</a:t>
+            </a:r>
+          </a:p>
+          <a:p>
+            <a:pPr lvl="1"/>
+            <a:r>
+              <a:t>Cost optimization reviews</a:t>
+            </a:r>
+          </a:p>
+        </p:txBody>
+      </p:sp>
+      <p:sp>
+        <p:nvSpPr>
+          <p:cNvPr id="5" name="Text Placeholder 4"/>
+          <p:cNvSpPr>
+            <a:spLocks noGrp="1"/>
+          </p:cNvSpPr>
+          <p:nvPr>
+            <p:ph type="body" idx="17" sz="quarter"/>
+          </p:nvPr>
+        </p:nvSpPr>
+        <p:spPr/>
+        <p:txBody>
+          <a:bodyPr/>
+          <a:lstStyle/>
+          <a:p>
             <a:pPr/>
             <a:r>
               <a:rPr b="1"/>
@@ -6436,7 +6483,19 @@
           <a:p>
             <a:pPr lvl="1"/>
             <a:r>
+              <a:t>L3: engineering@company.com</a:t>
+            </a:r>
+          </a:p>
+          <a:p>
+            <a:pPr lvl="1"/>
+            <a:r>
               <a:t>Account: am@company.com</a:t>
+            </a:r>
+          </a:p>
+          <a:p>
+            <a:pPr lvl="1"/>
+            <a:r>
+              <a:t>Emergency: oncall@company.com</a:t>
             </a:r>
           </a:p>
         </p:txBody>

</xml_diff>